<commit_message>
Did a walk through and made changes based on walk through.
</commit_message>
<xml_diff>
--- a/Lessons/Lesson_III/Lesson_III_Questions.pptx
+++ b/Lessons/Lesson_III/Lesson_III_Questions.pptx
@@ -3,17 +3,17 @@
 <p:presentation xmlns:a="http://schemas.openxmlformats.org/drawingml/2006/main" xmlns:p="http://schemas.openxmlformats.org/presentationml/2006/main" xmlns:r="http://schemas.openxmlformats.org/officeDocument/2006/relationships">
   <p:sldMasterIdLst>
     <p:sldMasterId id="2147483648" r:id="rId2"/>
+    <p:sldMasterId id="2147483661" r:id="rId3"/>
   </p:sldMasterIdLst>
   <p:sldIdLst>
-    <p:sldId id="256" r:id="rId3"/>
-    <p:sldId id="257" r:id="rId4"/>
-    <p:sldId id="258" r:id="rId5"/>
-    <p:sldId id="259" r:id="rId6"/>
-    <p:sldId id="260" r:id="rId7"/>
-    <p:sldId id="261" r:id="rId8"/>
-    <p:sldId id="262" r:id="rId9"/>
-    <p:sldId id="263" r:id="rId10"/>
-    <p:sldId id="264" r:id="rId11"/>
+    <p:sldId id="256" r:id="rId4"/>
+    <p:sldId id="257" r:id="rId5"/>
+    <p:sldId id="258" r:id="rId6"/>
+    <p:sldId id="259" r:id="rId7"/>
+    <p:sldId id="260" r:id="rId8"/>
+    <p:sldId id="261" r:id="rId9"/>
+    <p:sldId id="262" r:id="rId10"/>
+    <p:sldId id="263" r:id="rId11"/>
   </p:sldIdLst>
   <p:sldSz cx="10080625" cy="7559675"/>
   <p:notesSz cx="7559675" cy="10691812"/>
@@ -61,7 +61,7 @@
       </p:grpSpPr>
       <p:sp>
         <p:nvSpPr>
-          <p:cNvPr id="26" name="PlaceHolder 1"/>
+          <p:cNvPr id="24" name="PlaceHolder 1"/>
           <p:cNvSpPr>
             <a:spLocks noGrp="1"/>
           </p:cNvSpPr>
@@ -72,7 +72,7 @@
         <p:spPr>
           <a:xfrm>
             <a:off x="504000" y="301320"/>
-            <a:ext cx="9071640" cy="1262160"/>
+            <a:ext cx="9071280" cy="1261800"/>
           </a:xfrm>
           <a:prstGeom prst="rect">
             <a:avLst/>
@@ -88,7 +88,7 @@
       </p:sp>
       <p:sp>
         <p:nvSpPr>
-          <p:cNvPr id="27" name="PlaceHolder 2"/>
+          <p:cNvPr id="25" name="PlaceHolder 2"/>
           <p:cNvSpPr>
             <a:spLocks noGrp="1"/>
           </p:cNvSpPr>
@@ -99,7 +99,7 @@
         <p:spPr>
           <a:xfrm>
             <a:off x="504000" y="1769040"/>
-            <a:ext cx="9071640" cy="2091240"/>
+            <a:ext cx="9071280" cy="2090880"/>
           </a:xfrm>
           <a:prstGeom prst="rect">
             <a:avLst/>
@@ -114,7 +114,7 @@
       </p:sp>
       <p:sp>
         <p:nvSpPr>
-          <p:cNvPr id="28" name="PlaceHolder 3"/>
+          <p:cNvPr id="26" name="PlaceHolder 3"/>
           <p:cNvSpPr>
             <a:spLocks noGrp="1"/>
           </p:cNvSpPr>
@@ -124,8 +124,8 @@
         </p:nvSpPr>
         <p:spPr>
           <a:xfrm>
-            <a:off x="504000" y="4059360"/>
-            <a:ext cx="9071640" cy="2091240"/>
+            <a:off x="504000" y="4059000"/>
+            <a:ext cx="9071280" cy="2090880"/>
           </a:xfrm>
           <a:prstGeom prst="rect">
             <a:avLst/>
@@ -162,7 +162,7 @@
       </p:grpSpPr>
       <p:sp>
         <p:nvSpPr>
-          <p:cNvPr id="29" name="PlaceHolder 1"/>
+          <p:cNvPr id="27" name="PlaceHolder 1"/>
           <p:cNvSpPr>
             <a:spLocks noGrp="1"/>
           </p:cNvSpPr>
@@ -173,7 +173,7 @@
         <p:spPr>
           <a:xfrm>
             <a:off x="504000" y="301320"/>
-            <a:ext cx="9071640" cy="1262160"/>
+            <a:ext cx="9071280" cy="1261800"/>
           </a:xfrm>
           <a:prstGeom prst="rect">
             <a:avLst/>
@@ -189,7 +189,7 @@
       </p:sp>
       <p:sp>
         <p:nvSpPr>
-          <p:cNvPr id="30" name="PlaceHolder 2"/>
+          <p:cNvPr id="28" name="PlaceHolder 2"/>
           <p:cNvSpPr>
             <a:spLocks noGrp="1"/>
           </p:cNvSpPr>
@@ -200,7 +200,7 @@
         <p:spPr>
           <a:xfrm>
             <a:off x="504000" y="1769040"/>
-            <a:ext cx="4426920" cy="2091240"/>
+            <a:ext cx="4426560" cy="2090880"/>
           </a:xfrm>
           <a:prstGeom prst="rect">
             <a:avLst/>
@@ -215,7 +215,7 @@
       </p:sp>
       <p:sp>
         <p:nvSpPr>
-          <p:cNvPr id="31" name="PlaceHolder 3"/>
+          <p:cNvPr id="29" name="PlaceHolder 3"/>
           <p:cNvSpPr>
             <a:spLocks noGrp="1"/>
           </p:cNvSpPr>
@@ -225,8 +225,8 @@
         </p:nvSpPr>
         <p:spPr>
           <a:xfrm>
-            <a:off x="5152680" y="1769040"/>
-            <a:ext cx="4426920" cy="2091240"/>
+            <a:off x="5152320" y="1769040"/>
+            <a:ext cx="4426560" cy="2090880"/>
           </a:xfrm>
           <a:prstGeom prst="rect">
             <a:avLst/>
@@ -241,7 +241,7 @@
       </p:sp>
       <p:sp>
         <p:nvSpPr>
-          <p:cNvPr id="32" name="PlaceHolder 4"/>
+          <p:cNvPr id="30" name="PlaceHolder 4"/>
           <p:cNvSpPr>
             <a:spLocks noGrp="1"/>
           </p:cNvSpPr>
@@ -251,8 +251,8 @@
         </p:nvSpPr>
         <p:spPr>
           <a:xfrm>
-            <a:off x="5152680" y="4059360"/>
-            <a:ext cx="4426920" cy="2091240"/>
+            <a:off x="5152320" y="4059000"/>
+            <a:ext cx="4426560" cy="2090880"/>
           </a:xfrm>
           <a:prstGeom prst="rect">
             <a:avLst/>
@@ -267,7 +267,7 @@
       </p:sp>
       <p:sp>
         <p:nvSpPr>
-          <p:cNvPr id="33" name="PlaceHolder 5"/>
+          <p:cNvPr id="31" name="PlaceHolder 5"/>
           <p:cNvSpPr>
             <a:spLocks noGrp="1"/>
           </p:cNvSpPr>
@@ -277,8 +277,8 @@
         </p:nvSpPr>
         <p:spPr>
           <a:xfrm>
-            <a:off x="504000" y="4059360"/>
-            <a:ext cx="4426920" cy="2091240"/>
+            <a:off x="504000" y="4059000"/>
+            <a:ext cx="4426560" cy="2090880"/>
           </a:xfrm>
           <a:prstGeom prst="rect">
             <a:avLst/>
@@ -315,7 +315,7 @@
       </p:grpSpPr>
       <p:sp>
         <p:nvSpPr>
-          <p:cNvPr id="34" name="PlaceHolder 1"/>
+          <p:cNvPr id="32" name="PlaceHolder 1"/>
           <p:cNvSpPr>
             <a:spLocks noGrp="1"/>
           </p:cNvSpPr>
@@ -326,7 +326,7 @@
         <p:spPr>
           <a:xfrm>
             <a:off x="504000" y="301320"/>
-            <a:ext cx="9071640" cy="1262160"/>
+            <a:ext cx="9071280" cy="1261800"/>
           </a:xfrm>
           <a:prstGeom prst="rect">
             <a:avLst/>
@@ -342,7 +342,7 @@
       </p:sp>
       <p:sp>
         <p:nvSpPr>
-          <p:cNvPr id="35" name="PlaceHolder 2"/>
+          <p:cNvPr id="33" name="PlaceHolder 2"/>
           <p:cNvSpPr>
             <a:spLocks noGrp="1"/>
           </p:cNvSpPr>
@@ -353,7 +353,7 @@
         <p:spPr>
           <a:xfrm>
             <a:off x="504000" y="1769040"/>
-            <a:ext cx="9071640" cy="4384440"/>
+            <a:ext cx="9071280" cy="4384080"/>
           </a:xfrm>
           <a:prstGeom prst="rect">
             <a:avLst/>
@@ -368,7 +368,7 @@
       </p:sp>
       <p:sp>
         <p:nvSpPr>
-          <p:cNvPr id="36" name="PlaceHolder 3"/>
+          <p:cNvPr id="34" name="PlaceHolder 3"/>
           <p:cNvSpPr>
             <a:spLocks noGrp="1"/>
           </p:cNvSpPr>
@@ -379,7 +379,7 @@
         <p:spPr>
           <a:xfrm>
             <a:off x="504000" y="1769040"/>
-            <a:ext cx="9071640" cy="4384440"/>
+            <a:ext cx="9071280" cy="4384080"/>
           </a:xfrm>
           <a:prstGeom prst="rect">
             <a:avLst/>
@@ -394,7 +394,7 @@
       </p:sp>
       <p:pic>
         <p:nvPicPr>
-          <p:cNvPr id="37" name="" descr=""/>
+          <p:cNvPr id="35" name="" descr=""/>
           <p:cNvPicPr/>
           <p:nvPr/>
         </p:nvPicPr>
@@ -404,8 +404,8 @@
         </p:blipFill>
         <p:spPr>
           <a:xfrm>
-            <a:off x="2291760" y="1768680"/>
-            <a:ext cx="5495400" cy="4384440"/>
+            <a:off x="2292120" y="1769040"/>
+            <a:ext cx="5494680" cy="4384080"/>
           </a:xfrm>
           <a:prstGeom prst="rect">
             <a:avLst/>
@@ -417,7 +417,7 @@
       </p:pic>
       <p:pic>
         <p:nvPicPr>
-          <p:cNvPr id="38" name="" descr=""/>
+          <p:cNvPr id="36" name="" descr=""/>
           <p:cNvPicPr/>
           <p:nvPr/>
         </p:nvPicPr>
@@ -427,8 +427,8 @@
         </p:blipFill>
         <p:spPr>
           <a:xfrm>
-            <a:off x="2291760" y="1768680"/>
-            <a:ext cx="5495400" cy="4384440"/>
+            <a:off x="2292120" y="1769040"/>
+            <a:ext cx="5494680" cy="4384080"/>
           </a:xfrm>
           <a:prstGeom prst="rect">
             <a:avLst/>
@@ -438,6 +438,505 @@
           </a:ln>
         </p:spPr>
       </p:pic>
+    </p:spTree>
+  </p:cSld>
+</p:sldLayout>
+</file>
+
+<file path=ppt/slideLayouts/slideLayout13.xml><?xml version="1.0" encoding="utf-8"?>
+<p:sldLayout xmlns:a="http://schemas.openxmlformats.org/drawingml/2006/main" xmlns:p="http://schemas.openxmlformats.org/presentationml/2006/main" xmlns:r="http://schemas.openxmlformats.org/officeDocument/2006/relationships" type="blank" preserve="1">
+  <p:cSld name="Blank Slide">
+    <p:spTree>
+      <p:nvGrpSpPr>
+        <p:cNvPr id="1" name=""/>
+        <p:cNvGrpSpPr/>
+        <p:nvPr/>
+      </p:nvGrpSpPr>
+      <p:grpSpPr>
+        <a:xfrm>
+          <a:off x="0" y="0"/>
+          <a:ext cx="0" cy="0"/>
+          <a:chOff x="0" y="0"/>
+          <a:chExt cx="0" cy="0"/>
+        </a:xfrm>
+      </p:grpSpPr>
+    </p:spTree>
+  </p:cSld>
+</p:sldLayout>
+</file>
+
+<file path=ppt/slideLayouts/slideLayout14.xml><?xml version="1.0" encoding="utf-8"?>
+<p:sldLayout xmlns:a="http://schemas.openxmlformats.org/drawingml/2006/main" xmlns:p="http://schemas.openxmlformats.org/presentationml/2006/main" xmlns:r="http://schemas.openxmlformats.org/officeDocument/2006/relationships" type="tx" preserve="1">
+  <p:cSld name="Title Slide">
+    <p:spTree>
+      <p:nvGrpSpPr>
+        <p:cNvPr id="1" name=""/>
+        <p:cNvGrpSpPr/>
+        <p:nvPr/>
+      </p:nvGrpSpPr>
+      <p:grpSpPr>
+        <a:xfrm>
+          <a:off x="0" y="0"/>
+          <a:ext cx="0" cy="0"/>
+          <a:chOff x="0" y="0"/>
+          <a:chExt cx="0" cy="0"/>
+        </a:xfrm>
+      </p:grpSpPr>
+      <p:sp>
+        <p:nvSpPr>
+          <p:cNvPr id="39" name="PlaceHolder 1"/>
+          <p:cNvSpPr>
+            <a:spLocks noGrp="1"/>
+          </p:cNvSpPr>
+          <p:nvPr>
+            <p:ph type="title"/>
+          </p:nvPr>
+        </p:nvSpPr>
+        <p:spPr>
+          <a:xfrm>
+            <a:off x="504000" y="301320"/>
+            <a:ext cx="9071280" cy="1261800"/>
+          </a:xfrm>
+          <a:prstGeom prst="rect">
+            <a:avLst/>
+          </a:prstGeom>
+        </p:spPr>
+        <p:txBody>
+          <a:bodyPr lIns="0" rIns="0" tIns="0" bIns="0" anchor="ctr"/>
+          <a:p>
+            <a:pPr algn="ctr"/>
+            <a:endParaRPr/>
+          </a:p>
+        </p:txBody>
+      </p:sp>
+      <p:sp>
+        <p:nvSpPr>
+          <p:cNvPr id="40" name="PlaceHolder 2"/>
+          <p:cNvSpPr>
+            <a:spLocks noGrp="1"/>
+          </p:cNvSpPr>
+          <p:nvPr>
+            <p:ph type="subTitle"/>
+          </p:nvPr>
+        </p:nvSpPr>
+        <p:spPr>
+          <a:xfrm>
+            <a:off x="504000" y="1769040"/>
+            <a:ext cx="9071280" cy="4384080"/>
+          </a:xfrm>
+          <a:prstGeom prst="rect">
+            <a:avLst/>
+          </a:prstGeom>
+        </p:spPr>
+        <p:txBody>
+          <a:bodyPr lIns="0" rIns="0" tIns="0" bIns="0" anchor="ctr"/>
+          <a:p>
+            <a:pPr algn="ctr"/>
+            <a:endParaRPr/>
+          </a:p>
+        </p:txBody>
+      </p:sp>
+    </p:spTree>
+  </p:cSld>
+</p:sldLayout>
+</file>
+
+<file path=ppt/slideLayouts/slideLayout15.xml><?xml version="1.0" encoding="utf-8"?>
+<p:sldLayout xmlns:a="http://schemas.openxmlformats.org/drawingml/2006/main" xmlns:p="http://schemas.openxmlformats.org/presentationml/2006/main" xmlns:r="http://schemas.openxmlformats.org/officeDocument/2006/relationships" type="obj" preserve="1">
+  <p:cSld name="Title, Content">
+    <p:spTree>
+      <p:nvGrpSpPr>
+        <p:cNvPr id="1" name=""/>
+        <p:cNvGrpSpPr/>
+        <p:nvPr/>
+      </p:nvGrpSpPr>
+      <p:grpSpPr>
+        <a:xfrm>
+          <a:off x="0" y="0"/>
+          <a:ext cx="0" cy="0"/>
+          <a:chOff x="0" y="0"/>
+          <a:chExt cx="0" cy="0"/>
+        </a:xfrm>
+      </p:grpSpPr>
+      <p:sp>
+        <p:nvSpPr>
+          <p:cNvPr id="41" name="PlaceHolder 1"/>
+          <p:cNvSpPr>
+            <a:spLocks noGrp="1"/>
+          </p:cNvSpPr>
+          <p:nvPr>
+            <p:ph type="title"/>
+          </p:nvPr>
+        </p:nvSpPr>
+        <p:spPr>
+          <a:xfrm>
+            <a:off x="504000" y="301320"/>
+            <a:ext cx="9071280" cy="1261800"/>
+          </a:xfrm>
+          <a:prstGeom prst="rect">
+            <a:avLst/>
+          </a:prstGeom>
+        </p:spPr>
+        <p:txBody>
+          <a:bodyPr lIns="0" rIns="0" tIns="0" bIns="0" anchor="ctr"/>
+          <a:p>
+            <a:pPr algn="ctr"/>
+            <a:endParaRPr/>
+          </a:p>
+        </p:txBody>
+      </p:sp>
+      <p:sp>
+        <p:nvSpPr>
+          <p:cNvPr id="42" name="PlaceHolder 2"/>
+          <p:cNvSpPr>
+            <a:spLocks noGrp="1"/>
+          </p:cNvSpPr>
+          <p:nvPr>
+            <p:ph type="body"/>
+          </p:nvPr>
+        </p:nvSpPr>
+        <p:spPr>
+          <a:xfrm>
+            <a:off x="504000" y="1769040"/>
+            <a:ext cx="9071280" cy="4384080"/>
+          </a:xfrm>
+          <a:prstGeom prst="rect">
+            <a:avLst/>
+          </a:prstGeom>
+        </p:spPr>
+        <p:txBody>
+          <a:bodyPr lIns="0" rIns="0" tIns="0" bIns="0"/>
+          <a:p>
+            <a:endParaRPr/>
+          </a:p>
+        </p:txBody>
+      </p:sp>
+    </p:spTree>
+  </p:cSld>
+</p:sldLayout>
+</file>
+
+<file path=ppt/slideLayouts/slideLayout16.xml><?xml version="1.0" encoding="utf-8"?>
+<p:sldLayout xmlns:a="http://schemas.openxmlformats.org/drawingml/2006/main" xmlns:p="http://schemas.openxmlformats.org/presentationml/2006/main" xmlns:r="http://schemas.openxmlformats.org/officeDocument/2006/relationships" type="twoObj" preserve="1">
+  <p:cSld name="Title, 2 Content">
+    <p:spTree>
+      <p:nvGrpSpPr>
+        <p:cNvPr id="1" name=""/>
+        <p:cNvGrpSpPr/>
+        <p:nvPr/>
+      </p:nvGrpSpPr>
+      <p:grpSpPr>
+        <a:xfrm>
+          <a:off x="0" y="0"/>
+          <a:ext cx="0" cy="0"/>
+          <a:chOff x="0" y="0"/>
+          <a:chExt cx="0" cy="0"/>
+        </a:xfrm>
+      </p:grpSpPr>
+      <p:sp>
+        <p:nvSpPr>
+          <p:cNvPr id="43" name="PlaceHolder 1"/>
+          <p:cNvSpPr>
+            <a:spLocks noGrp="1"/>
+          </p:cNvSpPr>
+          <p:nvPr>
+            <p:ph type="title"/>
+          </p:nvPr>
+        </p:nvSpPr>
+        <p:spPr>
+          <a:xfrm>
+            <a:off x="504000" y="301320"/>
+            <a:ext cx="9071280" cy="1261800"/>
+          </a:xfrm>
+          <a:prstGeom prst="rect">
+            <a:avLst/>
+          </a:prstGeom>
+        </p:spPr>
+        <p:txBody>
+          <a:bodyPr lIns="0" rIns="0" tIns="0" bIns="0" anchor="ctr"/>
+          <a:p>
+            <a:pPr algn="ctr"/>
+            <a:endParaRPr/>
+          </a:p>
+        </p:txBody>
+      </p:sp>
+      <p:sp>
+        <p:nvSpPr>
+          <p:cNvPr id="44" name="PlaceHolder 2"/>
+          <p:cNvSpPr>
+            <a:spLocks noGrp="1"/>
+          </p:cNvSpPr>
+          <p:nvPr>
+            <p:ph type="body"/>
+          </p:nvPr>
+        </p:nvSpPr>
+        <p:spPr>
+          <a:xfrm>
+            <a:off x="504000" y="1769040"/>
+            <a:ext cx="4426560" cy="4384080"/>
+          </a:xfrm>
+          <a:prstGeom prst="rect">
+            <a:avLst/>
+          </a:prstGeom>
+        </p:spPr>
+        <p:txBody>
+          <a:bodyPr lIns="0" rIns="0" tIns="0" bIns="0"/>
+          <a:p>
+            <a:endParaRPr/>
+          </a:p>
+        </p:txBody>
+      </p:sp>
+      <p:sp>
+        <p:nvSpPr>
+          <p:cNvPr id="45" name="PlaceHolder 3"/>
+          <p:cNvSpPr>
+            <a:spLocks noGrp="1"/>
+          </p:cNvSpPr>
+          <p:nvPr>
+            <p:ph type="body"/>
+          </p:nvPr>
+        </p:nvSpPr>
+        <p:spPr>
+          <a:xfrm>
+            <a:off x="5152320" y="1769040"/>
+            <a:ext cx="4426560" cy="4384080"/>
+          </a:xfrm>
+          <a:prstGeom prst="rect">
+            <a:avLst/>
+          </a:prstGeom>
+        </p:spPr>
+        <p:txBody>
+          <a:bodyPr lIns="0" rIns="0" tIns="0" bIns="0"/>
+          <a:p>
+            <a:endParaRPr/>
+          </a:p>
+        </p:txBody>
+      </p:sp>
+    </p:spTree>
+  </p:cSld>
+</p:sldLayout>
+</file>
+
+<file path=ppt/slideLayouts/slideLayout17.xml><?xml version="1.0" encoding="utf-8"?>
+<p:sldLayout xmlns:a="http://schemas.openxmlformats.org/drawingml/2006/main" xmlns:p="http://schemas.openxmlformats.org/presentationml/2006/main" xmlns:r="http://schemas.openxmlformats.org/officeDocument/2006/relationships" type="titleOnly" preserve="1">
+  <p:cSld name="Title Only">
+    <p:spTree>
+      <p:nvGrpSpPr>
+        <p:cNvPr id="1" name=""/>
+        <p:cNvGrpSpPr/>
+        <p:nvPr/>
+      </p:nvGrpSpPr>
+      <p:grpSpPr>
+        <a:xfrm>
+          <a:off x="0" y="0"/>
+          <a:ext cx="0" cy="0"/>
+          <a:chOff x="0" y="0"/>
+          <a:chExt cx="0" cy="0"/>
+        </a:xfrm>
+      </p:grpSpPr>
+      <p:sp>
+        <p:nvSpPr>
+          <p:cNvPr id="46" name="PlaceHolder 1"/>
+          <p:cNvSpPr>
+            <a:spLocks noGrp="1"/>
+          </p:cNvSpPr>
+          <p:nvPr>
+            <p:ph type="title"/>
+          </p:nvPr>
+        </p:nvSpPr>
+        <p:spPr>
+          <a:xfrm>
+            <a:off x="504000" y="301320"/>
+            <a:ext cx="9071280" cy="1261800"/>
+          </a:xfrm>
+          <a:prstGeom prst="rect">
+            <a:avLst/>
+          </a:prstGeom>
+        </p:spPr>
+        <p:txBody>
+          <a:bodyPr lIns="0" rIns="0" tIns="0" bIns="0" anchor="ctr"/>
+          <a:p>
+            <a:pPr algn="ctr"/>
+            <a:endParaRPr/>
+          </a:p>
+        </p:txBody>
+      </p:sp>
+    </p:spTree>
+  </p:cSld>
+</p:sldLayout>
+</file>
+
+<file path=ppt/slideLayouts/slideLayout18.xml><?xml version="1.0" encoding="utf-8"?>
+<p:sldLayout xmlns:a="http://schemas.openxmlformats.org/drawingml/2006/main" xmlns:p="http://schemas.openxmlformats.org/presentationml/2006/main" xmlns:r="http://schemas.openxmlformats.org/officeDocument/2006/relationships" type="objOnly" preserve="1">
+  <p:cSld name="Centered Text">
+    <p:spTree>
+      <p:nvGrpSpPr>
+        <p:cNvPr id="1" name=""/>
+        <p:cNvGrpSpPr/>
+        <p:nvPr/>
+      </p:nvGrpSpPr>
+      <p:grpSpPr>
+        <a:xfrm>
+          <a:off x="0" y="0"/>
+          <a:ext cx="0" cy="0"/>
+          <a:chOff x="0" y="0"/>
+          <a:chExt cx="0" cy="0"/>
+        </a:xfrm>
+      </p:grpSpPr>
+      <p:sp>
+        <p:nvSpPr>
+          <p:cNvPr id="47" name="PlaceHolder 1"/>
+          <p:cNvSpPr>
+            <a:spLocks noGrp="1"/>
+          </p:cNvSpPr>
+          <p:nvPr>
+            <p:ph type="subTitle"/>
+          </p:nvPr>
+        </p:nvSpPr>
+        <p:spPr>
+          <a:xfrm>
+            <a:off x="504000" y="301320"/>
+            <a:ext cx="9071280" cy="5850360"/>
+          </a:xfrm>
+          <a:prstGeom prst="rect">
+            <a:avLst/>
+          </a:prstGeom>
+        </p:spPr>
+        <p:txBody>
+          <a:bodyPr lIns="0" rIns="0" tIns="0" bIns="0" anchor="ctr"/>
+          <a:p>
+            <a:pPr algn="ctr"/>
+            <a:endParaRPr/>
+          </a:p>
+        </p:txBody>
+      </p:sp>
+    </p:spTree>
+  </p:cSld>
+</p:sldLayout>
+</file>
+
+<file path=ppt/slideLayouts/slideLayout19.xml><?xml version="1.0" encoding="utf-8"?>
+<p:sldLayout xmlns:a="http://schemas.openxmlformats.org/drawingml/2006/main" xmlns:p="http://schemas.openxmlformats.org/presentationml/2006/main" xmlns:r="http://schemas.openxmlformats.org/officeDocument/2006/relationships" type="twoObjAndObj" preserve="1">
+  <p:cSld name="Title, 2 Content and Content">
+    <p:spTree>
+      <p:nvGrpSpPr>
+        <p:cNvPr id="1" name=""/>
+        <p:cNvGrpSpPr/>
+        <p:nvPr/>
+      </p:nvGrpSpPr>
+      <p:grpSpPr>
+        <a:xfrm>
+          <a:off x="0" y="0"/>
+          <a:ext cx="0" cy="0"/>
+          <a:chOff x="0" y="0"/>
+          <a:chExt cx="0" cy="0"/>
+        </a:xfrm>
+      </p:grpSpPr>
+      <p:sp>
+        <p:nvSpPr>
+          <p:cNvPr id="48" name="PlaceHolder 1"/>
+          <p:cNvSpPr>
+            <a:spLocks noGrp="1"/>
+          </p:cNvSpPr>
+          <p:nvPr>
+            <p:ph type="title"/>
+          </p:nvPr>
+        </p:nvSpPr>
+        <p:spPr>
+          <a:xfrm>
+            <a:off x="504000" y="301320"/>
+            <a:ext cx="9071280" cy="1261800"/>
+          </a:xfrm>
+          <a:prstGeom prst="rect">
+            <a:avLst/>
+          </a:prstGeom>
+        </p:spPr>
+        <p:txBody>
+          <a:bodyPr lIns="0" rIns="0" tIns="0" bIns="0" anchor="ctr"/>
+          <a:p>
+            <a:pPr algn="ctr"/>
+            <a:endParaRPr/>
+          </a:p>
+        </p:txBody>
+      </p:sp>
+      <p:sp>
+        <p:nvSpPr>
+          <p:cNvPr id="49" name="PlaceHolder 2"/>
+          <p:cNvSpPr>
+            <a:spLocks noGrp="1"/>
+          </p:cNvSpPr>
+          <p:nvPr>
+            <p:ph type="body"/>
+          </p:nvPr>
+        </p:nvSpPr>
+        <p:spPr>
+          <a:xfrm>
+            <a:off x="504000" y="1769040"/>
+            <a:ext cx="4426560" cy="2090880"/>
+          </a:xfrm>
+          <a:prstGeom prst="rect">
+            <a:avLst/>
+          </a:prstGeom>
+        </p:spPr>
+        <p:txBody>
+          <a:bodyPr lIns="0" rIns="0" tIns="0" bIns="0"/>
+          <a:p>
+            <a:endParaRPr/>
+          </a:p>
+        </p:txBody>
+      </p:sp>
+      <p:sp>
+        <p:nvSpPr>
+          <p:cNvPr id="50" name="PlaceHolder 3"/>
+          <p:cNvSpPr>
+            <a:spLocks noGrp="1"/>
+          </p:cNvSpPr>
+          <p:nvPr>
+            <p:ph type="body"/>
+          </p:nvPr>
+        </p:nvSpPr>
+        <p:spPr>
+          <a:xfrm>
+            <a:off x="504000" y="4059000"/>
+            <a:ext cx="4426560" cy="2090880"/>
+          </a:xfrm>
+          <a:prstGeom prst="rect">
+            <a:avLst/>
+          </a:prstGeom>
+        </p:spPr>
+        <p:txBody>
+          <a:bodyPr lIns="0" rIns="0" tIns="0" bIns="0"/>
+          <a:p>
+            <a:endParaRPr/>
+          </a:p>
+        </p:txBody>
+      </p:sp>
+      <p:sp>
+        <p:nvSpPr>
+          <p:cNvPr id="51" name="PlaceHolder 4"/>
+          <p:cNvSpPr>
+            <a:spLocks noGrp="1"/>
+          </p:cNvSpPr>
+          <p:nvPr>
+            <p:ph type="body"/>
+          </p:nvPr>
+        </p:nvSpPr>
+        <p:spPr>
+          <a:xfrm>
+            <a:off x="5152320" y="1769040"/>
+            <a:ext cx="4426560" cy="4384080"/>
+          </a:xfrm>
+          <a:prstGeom prst="rect">
+            <a:avLst/>
+          </a:prstGeom>
+        </p:spPr>
+        <p:txBody>
+          <a:bodyPr lIns="0" rIns="0" tIns="0" bIns="0"/>
+          <a:p>
+            <a:endParaRPr/>
+          </a:p>
+        </p:txBody>
+      </p:sp>
     </p:spTree>
   </p:cSld>
 </p:sldLayout>
@@ -462,7 +961,7 @@
       </p:grpSpPr>
       <p:sp>
         <p:nvSpPr>
-          <p:cNvPr id="5" name="PlaceHolder 1"/>
+          <p:cNvPr id="3" name="PlaceHolder 1"/>
           <p:cNvSpPr>
             <a:spLocks noGrp="1"/>
           </p:cNvSpPr>
@@ -473,7 +972,7 @@
         <p:spPr>
           <a:xfrm>
             <a:off x="504000" y="301320"/>
-            <a:ext cx="9071640" cy="1262160"/>
+            <a:ext cx="9071280" cy="1261800"/>
           </a:xfrm>
           <a:prstGeom prst="rect">
             <a:avLst/>
@@ -489,7 +988,7 @@
       </p:sp>
       <p:sp>
         <p:nvSpPr>
-          <p:cNvPr id="6" name="PlaceHolder 2"/>
+          <p:cNvPr id="4" name="PlaceHolder 2"/>
           <p:cNvSpPr>
             <a:spLocks noGrp="1"/>
           </p:cNvSpPr>
@@ -500,7 +999,7 @@
         <p:spPr>
           <a:xfrm>
             <a:off x="504000" y="1769040"/>
-            <a:ext cx="9071640" cy="4384440"/>
+            <a:ext cx="9071280" cy="4384080"/>
           </a:xfrm>
           <a:prstGeom prst="rect">
             <a:avLst/>
@@ -514,6 +1013,661 @@
           </a:p>
         </p:txBody>
       </p:sp>
+    </p:spTree>
+  </p:cSld>
+</p:sldLayout>
+</file>
+
+<file path=ppt/slideLayouts/slideLayout20.xml><?xml version="1.0" encoding="utf-8"?>
+<p:sldLayout xmlns:a="http://schemas.openxmlformats.org/drawingml/2006/main" xmlns:p="http://schemas.openxmlformats.org/presentationml/2006/main" xmlns:r="http://schemas.openxmlformats.org/officeDocument/2006/relationships" type="objAndTwoObj" preserve="1">
+  <p:cSld name="Title Content and 2 Content">
+    <p:spTree>
+      <p:nvGrpSpPr>
+        <p:cNvPr id="1" name=""/>
+        <p:cNvGrpSpPr/>
+        <p:nvPr/>
+      </p:nvGrpSpPr>
+      <p:grpSpPr>
+        <a:xfrm>
+          <a:off x="0" y="0"/>
+          <a:ext cx="0" cy="0"/>
+          <a:chOff x="0" y="0"/>
+          <a:chExt cx="0" cy="0"/>
+        </a:xfrm>
+      </p:grpSpPr>
+      <p:sp>
+        <p:nvSpPr>
+          <p:cNvPr id="52" name="PlaceHolder 1"/>
+          <p:cNvSpPr>
+            <a:spLocks noGrp="1"/>
+          </p:cNvSpPr>
+          <p:nvPr>
+            <p:ph type="title"/>
+          </p:nvPr>
+        </p:nvSpPr>
+        <p:spPr>
+          <a:xfrm>
+            <a:off x="504000" y="301320"/>
+            <a:ext cx="9071280" cy="1261800"/>
+          </a:xfrm>
+          <a:prstGeom prst="rect">
+            <a:avLst/>
+          </a:prstGeom>
+        </p:spPr>
+        <p:txBody>
+          <a:bodyPr lIns="0" rIns="0" tIns="0" bIns="0" anchor="ctr"/>
+          <a:p>
+            <a:pPr algn="ctr"/>
+            <a:endParaRPr/>
+          </a:p>
+        </p:txBody>
+      </p:sp>
+      <p:sp>
+        <p:nvSpPr>
+          <p:cNvPr id="53" name="PlaceHolder 2"/>
+          <p:cNvSpPr>
+            <a:spLocks noGrp="1"/>
+          </p:cNvSpPr>
+          <p:nvPr>
+            <p:ph type="body"/>
+          </p:nvPr>
+        </p:nvSpPr>
+        <p:spPr>
+          <a:xfrm>
+            <a:off x="504000" y="1769040"/>
+            <a:ext cx="4426560" cy="4384080"/>
+          </a:xfrm>
+          <a:prstGeom prst="rect">
+            <a:avLst/>
+          </a:prstGeom>
+        </p:spPr>
+        <p:txBody>
+          <a:bodyPr lIns="0" rIns="0" tIns="0" bIns="0"/>
+          <a:p>
+            <a:endParaRPr/>
+          </a:p>
+        </p:txBody>
+      </p:sp>
+      <p:sp>
+        <p:nvSpPr>
+          <p:cNvPr id="54" name="PlaceHolder 3"/>
+          <p:cNvSpPr>
+            <a:spLocks noGrp="1"/>
+          </p:cNvSpPr>
+          <p:nvPr>
+            <p:ph type="body"/>
+          </p:nvPr>
+        </p:nvSpPr>
+        <p:spPr>
+          <a:xfrm>
+            <a:off x="5152320" y="1769040"/>
+            <a:ext cx="4426560" cy="2090880"/>
+          </a:xfrm>
+          <a:prstGeom prst="rect">
+            <a:avLst/>
+          </a:prstGeom>
+        </p:spPr>
+        <p:txBody>
+          <a:bodyPr lIns="0" rIns="0" tIns="0" bIns="0"/>
+          <a:p>
+            <a:endParaRPr/>
+          </a:p>
+        </p:txBody>
+      </p:sp>
+      <p:sp>
+        <p:nvSpPr>
+          <p:cNvPr id="55" name="PlaceHolder 4"/>
+          <p:cNvSpPr>
+            <a:spLocks noGrp="1"/>
+          </p:cNvSpPr>
+          <p:nvPr>
+            <p:ph type="body"/>
+          </p:nvPr>
+        </p:nvSpPr>
+        <p:spPr>
+          <a:xfrm>
+            <a:off x="5152320" y="4059000"/>
+            <a:ext cx="4426560" cy="2090880"/>
+          </a:xfrm>
+          <a:prstGeom prst="rect">
+            <a:avLst/>
+          </a:prstGeom>
+        </p:spPr>
+        <p:txBody>
+          <a:bodyPr lIns="0" rIns="0" tIns="0" bIns="0"/>
+          <a:p>
+            <a:endParaRPr/>
+          </a:p>
+        </p:txBody>
+      </p:sp>
+    </p:spTree>
+  </p:cSld>
+</p:sldLayout>
+</file>
+
+<file path=ppt/slideLayouts/slideLayout21.xml><?xml version="1.0" encoding="utf-8"?>
+<p:sldLayout xmlns:a="http://schemas.openxmlformats.org/drawingml/2006/main" xmlns:p="http://schemas.openxmlformats.org/presentationml/2006/main" xmlns:r="http://schemas.openxmlformats.org/officeDocument/2006/relationships" type="twoObjOverTx" preserve="1">
+  <p:cSld name="Title, 2 Content over Content">
+    <p:spTree>
+      <p:nvGrpSpPr>
+        <p:cNvPr id="1" name=""/>
+        <p:cNvGrpSpPr/>
+        <p:nvPr/>
+      </p:nvGrpSpPr>
+      <p:grpSpPr>
+        <a:xfrm>
+          <a:off x="0" y="0"/>
+          <a:ext cx="0" cy="0"/>
+          <a:chOff x="0" y="0"/>
+          <a:chExt cx="0" cy="0"/>
+        </a:xfrm>
+      </p:grpSpPr>
+      <p:sp>
+        <p:nvSpPr>
+          <p:cNvPr id="56" name="PlaceHolder 1"/>
+          <p:cNvSpPr>
+            <a:spLocks noGrp="1"/>
+          </p:cNvSpPr>
+          <p:nvPr>
+            <p:ph type="title"/>
+          </p:nvPr>
+        </p:nvSpPr>
+        <p:spPr>
+          <a:xfrm>
+            <a:off x="504000" y="301320"/>
+            <a:ext cx="9071280" cy="1261800"/>
+          </a:xfrm>
+          <a:prstGeom prst="rect">
+            <a:avLst/>
+          </a:prstGeom>
+        </p:spPr>
+        <p:txBody>
+          <a:bodyPr lIns="0" rIns="0" tIns="0" bIns="0" anchor="ctr"/>
+          <a:p>
+            <a:pPr algn="ctr"/>
+            <a:endParaRPr/>
+          </a:p>
+        </p:txBody>
+      </p:sp>
+      <p:sp>
+        <p:nvSpPr>
+          <p:cNvPr id="57" name="PlaceHolder 2"/>
+          <p:cNvSpPr>
+            <a:spLocks noGrp="1"/>
+          </p:cNvSpPr>
+          <p:nvPr>
+            <p:ph type="body"/>
+          </p:nvPr>
+        </p:nvSpPr>
+        <p:spPr>
+          <a:xfrm>
+            <a:off x="504000" y="1769040"/>
+            <a:ext cx="4426560" cy="2090880"/>
+          </a:xfrm>
+          <a:prstGeom prst="rect">
+            <a:avLst/>
+          </a:prstGeom>
+        </p:spPr>
+        <p:txBody>
+          <a:bodyPr lIns="0" rIns="0" tIns="0" bIns="0"/>
+          <a:p>
+            <a:endParaRPr/>
+          </a:p>
+        </p:txBody>
+      </p:sp>
+      <p:sp>
+        <p:nvSpPr>
+          <p:cNvPr id="58" name="PlaceHolder 3"/>
+          <p:cNvSpPr>
+            <a:spLocks noGrp="1"/>
+          </p:cNvSpPr>
+          <p:nvPr>
+            <p:ph type="body"/>
+          </p:nvPr>
+        </p:nvSpPr>
+        <p:spPr>
+          <a:xfrm>
+            <a:off x="5152320" y="1769040"/>
+            <a:ext cx="4426560" cy="2090880"/>
+          </a:xfrm>
+          <a:prstGeom prst="rect">
+            <a:avLst/>
+          </a:prstGeom>
+        </p:spPr>
+        <p:txBody>
+          <a:bodyPr lIns="0" rIns="0" tIns="0" bIns="0"/>
+          <a:p>
+            <a:endParaRPr/>
+          </a:p>
+        </p:txBody>
+      </p:sp>
+      <p:sp>
+        <p:nvSpPr>
+          <p:cNvPr id="59" name="PlaceHolder 4"/>
+          <p:cNvSpPr>
+            <a:spLocks noGrp="1"/>
+          </p:cNvSpPr>
+          <p:nvPr>
+            <p:ph type="body"/>
+          </p:nvPr>
+        </p:nvSpPr>
+        <p:spPr>
+          <a:xfrm>
+            <a:off x="504000" y="4059000"/>
+            <a:ext cx="9071280" cy="2090880"/>
+          </a:xfrm>
+          <a:prstGeom prst="rect">
+            <a:avLst/>
+          </a:prstGeom>
+        </p:spPr>
+        <p:txBody>
+          <a:bodyPr lIns="0" rIns="0" tIns="0" bIns="0"/>
+          <a:p>
+            <a:endParaRPr/>
+          </a:p>
+        </p:txBody>
+      </p:sp>
+    </p:spTree>
+  </p:cSld>
+</p:sldLayout>
+</file>
+
+<file path=ppt/slideLayouts/slideLayout22.xml><?xml version="1.0" encoding="utf-8"?>
+<p:sldLayout xmlns:a="http://schemas.openxmlformats.org/drawingml/2006/main" xmlns:p="http://schemas.openxmlformats.org/presentationml/2006/main" xmlns:r="http://schemas.openxmlformats.org/officeDocument/2006/relationships" type="objOverTx" preserve="1">
+  <p:cSld name="Title, Content over Content">
+    <p:spTree>
+      <p:nvGrpSpPr>
+        <p:cNvPr id="1" name=""/>
+        <p:cNvGrpSpPr/>
+        <p:nvPr/>
+      </p:nvGrpSpPr>
+      <p:grpSpPr>
+        <a:xfrm>
+          <a:off x="0" y="0"/>
+          <a:ext cx="0" cy="0"/>
+          <a:chOff x="0" y="0"/>
+          <a:chExt cx="0" cy="0"/>
+        </a:xfrm>
+      </p:grpSpPr>
+      <p:sp>
+        <p:nvSpPr>
+          <p:cNvPr id="60" name="PlaceHolder 1"/>
+          <p:cNvSpPr>
+            <a:spLocks noGrp="1"/>
+          </p:cNvSpPr>
+          <p:nvPr>
+            <p:ph type="title"/>
+          </p:nvPr>
+        </p:nvSpPr>
+        <p:spPr>
+          <a:xfrm>
+            <a:off x="504000" y="301320"/>
+            <a:ext cx="9071280" cy="1261800"/>
+          </a:xfrm>
+          <a:prstGeom prst="rect">
+            <a:avLst/>
+          </a:prstGeom>
+        </p:spPr>
+        <p:txBody>
+          <a:bodyPr lIns="0" rIns="0" tIns="0" bIns="0" anchor="ctr"/>
+          <a:p>
+            <a:pPr algn="ctr"/>
+            <a:endParaRPr/>
+          </a:p>
+        </p:txBody>
+      </p:sp>
+      <p:sp>
+        <p:nvSpPr>
+          <p:cNvPr id="61" name="PlaceHolder 2"/>
+          <p:cNvSpPr>
+            <a:spLocks noGrp="1"/>
+          </p:cNvSpPr>
+          <p:nvPr>
+            <p:ph type="body"/>
+          </p:nvPr>
+        </p:nvSpPr>
+        <p:spPr>
+          <a:xfrm>
+            <a:off x="504000" y="1769040"/>
+            <a:ext cx="9071280" cy="2090880"/>
+          </a:xfrm>
+          <a:prstGeom prst="rect">
+            <a:avLst/>
+          </a:prstGeom>
+        </p:spPr>
+        <p:txBody>
+          <a:bodyPr lIns="0" rIns="0" tIns="0" bIns="0"/>
+          <a:p>
+            <a:endParaRPr/>
+          </a:p>
+        </p:txBody>
+      </p:sp>
+      <p:sp>
+        <p:nvSpPr>
+          <p:cNvPr id="62" name="PlaceHolder 3"/>
+          <p:cNvSpPr>
+            <a:spLocks noGrp="1"/>
+          </p:cNvSpPr>
+          <p:nvPr>
+            <p:ph type="body"/>
+          </p:nvPr>
+        </p:nvSpPr>
+        <p:spPr>
+          <a:xfrm>
+            <a:off x="504000" y="4059000"/>
+            <a:ext cx="9071280" cy="2090880"/>
+          </a:xfrm>
+          <a:prstGeom prst="rect">
+            <a:avLst/>
+          </a:prstGeom>
+        </p:spPr>
+        <p:txBody>
+          <a:bodyPr lIns="0" rIns="0" tIns="0" bIns="0"/>
+          <a:p>
+            <a:endParaRPr/>
+          </a:p>
+        </p:txBody>
+      </p:sp>
+    </p:spTree>
+  </p:cSld>
+</p:sldLayout>
+</file>
+
+<file path=ppt/slideLayouts/slideLayout23.xml><?xml version="1.0" encoding="utf-8"?>
+<p:sldLayout xmlns:a="http://schemas.openxmlformats.org/drawingml/2006/main" xmlns:p="http://schemas.openxmlformats.org/presentationml/2006/main" xmlns:r="http://schemas.openxmlformats.org/officeDocument/2006/relationships" type="fourObj" preserve="1">
+  <p:cSld name="Title, 4 Content">
+    <p:spTree>
+      <p:nvGrpSpPr>
+        <p:cNvPr id="1" name=""/>
+        <p:cNvGrpSpPr/>
+        <p:nvPr/>
+      </p:nvGrpSpPr>
+      <p:grpSpPr>
+        <a:xfrm>
+          <a:off x="0" y="0"/>
+          <a:ext cx="0" cy="0"/>
+          <a:chOff x="0" y="0"/>
+          <a:chExt cx="0" cy="0"/>
+        </a:xfrm>
+      </p:grpSpPr>
+      <p:sp>
+        <p:nvSpPr>
+          <p:cNvPr id="63" name="PlaceHolder 1"/>
+          <p:cNvSpPr>
+            <a:spLocks noGrp="1"/>
+          </p:cNvSpPr>
+          <p:nvPr>
+            <p:ph type="title"/>
+          </p:nvPr>
+        </p:nvSpPr>
+        <p:spPr>
+          <a:xfrm>
+            <a:off x="504000" y="301320"/>
+            <a:ext cx="9071280" cy="1261800"/>
+          </a:xfrm>
+          <a:prstGeom prst="rect">
+            <a:avLst/>
+          </a:prstGeom>
+        </p:spPr>
+        <p:txBody>
+          <a:bodyPr lIns="0" rIns="0" tIns="0" bIns="0" anchor="ctr"/>
+          <a:p>
+            <a:pPr algn="ctr"/>
+            <a:endParaRPr/>
+          </a:p>
+        </p:txBody>
+      </p:sp>
+      <p:sp>
+        <p:nvSpPr>
+          <p:cNvPr id="64" name="PlaceHolder 2"/>
+          <p:cNvSpPr>
+            <a:spLocks noGrp="1"/>
+          </p:cNvSpPr>
+          <p:nvPr>
+            <p:ph type="body"/>
+          </p:nvPr>
+        </p:nvSpPr>
+        <p:spPr>
+          <a:xfrm>
+            <a:off x="504000" y="1769040"/>
+            <a:ext cx="4426560" cy="2090880"/>
+          </a:xfrm>
+          <a:prstGeom prst="rect">
+            <a:avLst/>
+          </a:prstGeom>
+        </p:spPr>
+        <p:txBody>
+          <a:bodyPr lIns="0" rIns="0" tIns="0" bIns="0"/>
+          <a:p>
+            <a:endParaRPr/>
+          </a:p>
+        </p:txBody>
+      </p:sp>
+      <p:sp>
+        <p:nvSpPr>
+          <p:cNvPr id="65" name="PlaceHolder 3"/>
+          <p:cNvSpPr>
+            <a:spLocks noGrp="1"/>
+          </p:cNvSpPr>
+          <p:nvPr>
+            <p:ph type="body"/>
+          </p:nvPr>
+        </p:nvSpPr>
+        <p:spPr>
+          <a:xfrm>
+            <a:off x="5152320" y="1769040"/>
+            <a:ext cx="4426560" cy="2090880"/>
+          </a:xfrm>
+          <a:prstGeom prst="rect">
+            <a:avLst/>
+          </a:prstGeom>
+        </p:spPr>
+        <p:txBody>
+          <a:bodyPr lIns="0" rIns="0" tIns="0" bIns="0"/>
+          <a:p>
+            <a:endParaRPr/>
+          </a:p>
+        </p:txBody>
+      </p:sp>
+      <p:sp>
+        <p:nvSpPr>
+          <p:cNvPr id="66" name="PlaceHolder 4"/>
+          <p:cNvSpPr>
+            <a:spLocks noGrp="1"/>
+          </p:cNvSpPr>
+          <p:nvPr>
+            <p:ph type="body"/>
+          </p:nvPr>
+        </p:nvSpPr>
+        <p:spPr>
+          <a:xfrm>
+            <a:off x="5152320" y="4059000"/>
+            <a:ext cx="4426560" cy="2090880"/>
+          </a:xfrm>
+          <a:prstGeom prst="rect">
+            <a:avLst/>
+          </a:prstGeom>
+        </p:spPr>
+        <p:txBody>
+          <a:bodyPr lIns="0" rIns="0" tIns="0" bIns="0"/>
+          <a:p>
+            <a:endParaRPr/>
+          </a:p>
+        </p:txBody>
+      </p:sp>
+      <p:sp>
+        <p:nvSpPr>
+          <p:cNvPr id="67" name="PlaceHolder 5"/>
+          <p:cNvSpPr>
+            <a:spLocks noGrp="1"/>
+          </p:cNvSpPr>
+          <p:nvPr>
+            <p:ph type="body"/>
+          </p:nvPr>
+        </p:nvSpPr>
+        <p:spPr>
+          <a:xfrm>
+            <a:off x="504000" y="4059000"/>
+            <a:ext cx="4426560" cy="2090880"/>
+          </a:xfrm>
+          <a:prstGeom prst="rect">
+            <a:avLst/>
+          </a:prstGeom>
+        </p:spPr>
+        <p:txBody>
+          <a:bodyPr lIns="0" rIns="0" tIns="0" bIns="0"/>
+          <a:p>
+            <a:endParaRPr/>
+          </a:p>
+        </p:txBody>
+      </p:sp>
+    </p:spTree>
+  </p:cSld>
+</p:sldLayout>
+</file>
+
+<file path=ppt/slideLayouts/slideLayout24.xml><?xml version="1.0" encoding="utf-8"?>
+<p:sldLayout xmlns:a="http://schemas.openxmlformats.org/drawingml/2006/main" xmlns:p="http://schemas.openxmlformats.org/presentationml/2006/main" xmlns:r="http://schemas.openxmlformats.org/officeDocument/2006/relationships" type="blank" preserve="1">
+  <p:cSld name="Title, 6 Content">
+    <p:spTree>
+      <p:nvGrpSpPr>
+        <p:cNvPr id="1" name=""/>
+        <p:cNvGrpSpPr/>
+        <p:nvPr/>
+      </p:nvGrpSpPr>
+      <p:grpSpPr>
+        <a:xfrm>
+          <a:off x="0" y="0"/>
+          <a:ext cx="0" cy="0"/>
+          <a:chOff x="0" y="0"/>
+          <a:chExt cx="0" cy="0"/>
+        </a:xfrm>
+      </p:grpSpPr>
+      <p:sp>
+        <p:nvSpPr>
+          <p:cNvPr id="68" name="PlaceHolder 1"/>
+          <p:cNvSpPr>
+            <a:spLocks noGrp="1"/>
+          </p:cNvSpPr>
+          <p:nvPr>
+            <p:ph type="title"/>
+          </p:nvPr>
+        </p:nvSpPr>
+        <p:spPr>
+          <a:xfrm>
+            <a:off x="504000" y="301320"/>
+            <a:ext cx="9071280" cy="1261800"/>
+          </a:xfrm>
+          <a:prstGeom prst="rect">
+            <a:avLst/>
+          </a:prstGeom>
+        </p:spPr>
+        <p:txBody>
+          <a:bodyPr lIns="0" rIns="0" tIns="0" bIns="0" anchor="ctr"/>
+          <a:p>
+            <a:pPr algn="ctr"/>
+            <a:endParaRPr/>
+          </a:p>
+        </p:txBody>
+      </p:sp>
+      <p:sp>
+        <p:nvSpPr>
+          <p:cNvPr id="69" name="PlaceHolder 2"/>
+          <p:cNvSpPr>
+            <a:spLocks noGrp="1"/>
+          </p:cNvSpPr>
+          <p:nvPr>
+            <p:ph type="body"/>
+          </p:nvPr>
+        </p:nvSpPr>
+        <p:spPr>
+          <a:xfrm>
+            <a:off x="504000" y="1769040"/>
+            <a:ext cx="9071280" cy="4384080"/>
+          </a:xfrm>
+          <a:prstGeom prst="rect">
+            <a:avLst/>
+          </a:prstGeom>
+        </p:spPr>
+        <p:txBody>
+          <a:bodyPr lIns="0" rIns="0" tIns="0" bIns="0"/>
+          <a:p>
+            <a:endParaRPr/>
+          </a:p>
+        </p:txBody>
+      </p:sp>
+      <p:sp>
+        <p:nvSpPr>
+          <p:cNvPr id="70" name="PlaceHolder 3"/>
+          <p:cNvSpPr>
+            <a:spLocks noGrp="1"/>
+          </p:cNvSpPr>
+          <p:nvPr>
+            <p:ph type="body"/>
+          </p:nvPr>
+        </p:nvSpPr>
+        <p:spPr>
+          <a:xfrm>
+            <a:off x="504000" y="1769040"/>
+            <a:ext cx="9071280" cy="4384080"/>
+          </a:xfrm>
+          <a:prstGeom prst="rect">
+            <a:avLst/>
+          </a:prstGeom>
+        </p:spPr>
+        <p:txBody>
+          <a:bodyPr lIns="0" rIns="0" tIns="0" bIns="0"/>
+          <a:p>
+            <a:endParaRPr/>
+          </a:p>
+        </p:txBody>
+      </p:sp>
+      <p:pic>
+        <p:nvPicPr>
+          <p:cNvPr id="71" name="" descr=""/>
+          <p:cNvPicPr/>
+          <p:nvPr/>
+        </p:nvPicPr>
+        <p:blipFill>
+          <a:blip r:embed="rId2"/>
+          <a:stretch/>
+        </p:blipFill>
+        <p:spPr>
+          <a:xfrm>
+            <a:off x="2292120" y="1769040"/>
+            <a:ext cx="5494680" cy="4384080"/>
+          </a:xfrm>
+          <a:prstGeom prst="rect">
+            <a:avLst/>
+          </a:prstGeom>
+          <a:ln>
+            <a:noFill/>
+          </a:ln>
+        </p:spPr>
+      </p:pic>
+      <p:pic>
+        <p:nvPicPr>
+          <p:cNvPr id="72" name="" descr=""/>
+          <p:cNvPicPr/>
+          <p:nvPr/>
+        </p:nvPicPr>
+        <p:blipFill>
+          <a:blip r:embed="rId3"/>
+          <a:stretch/>
+        </p:blipFill>
+        <p:spPr>
+          <a:xfrm>
+            <a:off x="2292120" y="1769040"/>
+            <a:ext cx="5494680" cy="4384080"/>
+          </a:xfrm>
+          <a:prstGeom prst="rect">
+            <a:avLst/>
+          </a:prstGeom>
+          <a:ln>
+            <a:noFill/>
+          </a:ln>
+        </p:spPr>
+      </p:pic>
     </p:spTree>
   </p:cSld>
 </p:sldLayout>
@@ -538,7 +1692,7 @@
       </p:grpSpPr>
       <p:sp>
         <p:nvSpPr>
-          <p:cNvPr id="7" name="PlaceHolder 1"/>
+          <p:cNvPr id="5" name="PlaceHolder 1"/>
           <p:cNvSpPr>
             <a:spLocks noGrp="1"/>
           </p:cNvSpPr>
@@ -549,7 +1703,7 @@
         <p:spPr>
           <a:xfrm>
             <a:off x="504000" y="301320"/>
-            <a:ext cx="9071640" cy="1262160"/>
+            <a:ext cx="9071280" cy="1261800"/>
           </a:xfrm>
           <a:prstGeom prst="rect">
             <a:avLst/>
@@ -565,7 +1719,7 @@
       </p:sp>
       <p:sp>
         <p:nvSpPr>
-          <p:cNvPr id="8" name="PlaceHolder 2"/>
+          <p:cNvPr id="6" name="PlaceHolder 2"/>
           <p:cNvSpPr>
             <a:spLocks noGrp="1"/>
           </p:cNvSpPr>
@@ -576,7 +1730,7 @@
         <p:spPr>
           <a:xfrm>
             <a:off x="504000" y="1769040"/>
-            <a:ext cx="9071640" cy="4384440"/>
+            <a:ext cx="9071280" cy="4384080"/>
           </a:xfrm>
           <a:prstGeom prst="rect">
             <a:avLst/>
@@ -613,7 +1767,7 @@
       </p:grpSpPr>
       <p:sp>
         <p:nvSpPr>
-          <p:cNvPr id="9" name="PlaceHolder 1"/>
+          <p:cNvPr id="7" name="PlaceHolder 1"/>
           <p:cNvSpPr>
             <a:spLocks noGrp="1"/>
           </p:cNvSpPr>
@@ -624,7 +1778,7 @@
         <p:spPr>
           <a:xfrm>
             <a:off x="504000" y="301320"/>
-            <a:ext cx="9071640" cy="1262160"/>
+            <a:ext cx="9071280" cy="1261800"/>
           </a:xfrm>
           <a:prstGeom prst="rect">
             <a:avLst/>
@@ -640,7 +1794,7 @@
       </p:sp>
       <p:sp>
         <p:nvSpPr>
-          <p:cNvPr id="10" name="PlaceHolder 2"/>
+          <p:cNvPr id="8" name="PlaceHolder 2"/>
           <p:cNvSpPr>
             <a:spLocks noGrp="1"/>
           </p:cNvSpPr>
@@ -651,7 +1805,7 @@
         <p:spPr>
           <a:xfrm>
             <a:off x="504000" y="1769040"/>
-            <a:ext cx="4426920" cy="4384440"/>
+            <a:ext cx="4426560" cy="4384080"/>
           </a:xfrm>
           <a:prstGeom prst="rect">
             <a:avLst/>
@@ -666,7 +1820,7 @@
       </p:sp>
       <p:sp>
         <p:nvSpPr>
-          <p:cNvPr id="11" name="PlaceHolder 3"/>
+          <p:cNvPr id="9" name="PlaceHolder 3"/>
           <p:cNvSpPr>
             <a:spLocks noGrp="1"/>
           </p:cNvSpPr>
@@ -676,8 +1830,8 @@
         </p:nvSpPr>
         <p:spPr>
           <a:xfrm>
-            <a:off x="5152680" y="1769040"/>
-            <a:ext cx="4426920" cy="4384440"/>
+            <a:off x="5152320" y="1769040"/>
+            <a:ext cx="4426560" cy="4384080"/>
           </a:xfrm>
           <a:prstGeom prst="rect">
             <a:avLst/>
@@ -714,7 +1868,7 @@
       </p:grpSpPr>
       <p:sp>
         <p:nvSpPr>
-          <p:cNvPr id="12" name="PlaceHolder 1"/>
+          <p:cNvPr id="10" name="PlaceHolder 1"/>
           <p:cNvSpPr>
             <a:spLocks noGrp="1"/>
           </p:cNvSpPr>
@@ -725,7 +1879,7 @@
         <p:spPr>
           <a:xfrm>
             <a:off x="504000" y="301320"/>
-            <a:ext cx="9071640" cy="1262160"/>
+            <a:ext cx="9071280" cy="1261800"/>
           </a:xfrm>
           <a:prstGeom prst="rect">
             <a:avLst/>
@@ -763,7 +1917,7 @@
       </p:grpSpPr>
       <p:sp>
         <p:nvSpPr>
-          <p:cNvPr id="13" name="PlaceHolder 1"/>
+          <p:cNvPr id="11" name="PlaceHolder 1"/>
           <p:cNvSpPr>
             <a:spLocks noGrp="1"/>
           </p:cNvSpPr>
@@ -774,7 +1928,7 @@
         <p:spPr>
           <a:xfrm>
             <a:off x="504000" y="301320"/>
-            <a:ext cx="9071640" cy="5851800"/>
+            <a:ext cx="9071280" cy="5850360"/>
           </a:xfrm>
           <a:prstGeom prst="rect">
             <a:avLst/>
@@ -812,7 +1966,7 @@
       </p:grpSpPr>
       <p:sp>
         <p:nvSpPr>
-          <p:cNvPr id="14" name="PlaceHolder 1"/>
+          <p:cNvPr id="12" name="PlaceHolder 1"/>
           <p:cNvSpPr>
             <a:spLocks noGrp="1"/>
           </p:cNvSpPr>
@@ -823,7 +1977,7 @@
         <p:spPr>
           <a:xfrm>
             <a:off x="504000" y="301320"/>
-            <a:ext cx="9071640" cy="1262160"/>
+            <a:ext cx="9071280" cy="1261800"/>
           </a:xfrm>
           <a:prstGeom prst="rect">
             <a:avLst/>
@@ -839,7 +1993,7 @@
       </p:sp>
       <p:sp>
         <p:nvSpPr>
-          <p:cNvPr id="15" name="PlaceHolder 2"/>
+          <p:cNvPr id="13" name="PlaceHolder 2"/>
           <p:cNvSpPr>
             <a:spLocks noGrp="1"/>
           </p:cNvSpPr>
@@ -850,7 +2004,7 @@
         <p:spPr>
           <a:xfrm>
             <a:off x="504000" y="1769040"/>
-            <a:ext cx="4426920" cy="2091240"/>
+            <a:ext cx="4426560" cy="2090880"/>
           </a:xfrm>
           <a:prstGeom prst="rect">
             <a:avLst/>
@@ -865,7 +2019,7 @@
       </p:sp>
       <p:sp>
         <p:nvSpPr>
-          <p:cNvPr id="16" name="PlaceHolder 3"/>
+          <p:cNvPr id="14" name="PlaceHolder 3"/>
           <p:cNvSpPr>
             <a:spLocks noGrp="1"/>
           </p:cNvSpPr>
@@ -875,8 +2029,8 @@
         </p:nvSpPr>
         <p:spPr>
           <a:xfrm>
-            <a:off x="504000" y="4059360"/>
-            <a:ext cx="4426920" cy="2091240"/>
+            <a:off x="504000" y="4059000"/>
+            <a:ext cx="4426560" cy="2090880"/>
           </a:xfrm>
           <a:prstGeom prst="rect">
             <a:avLst/>
@@ -891,7 +2045,7 @@
       </p:sp>
       <p:sp>
         <p:nvSpPr>
-          <p:cNvPr id="17" name="PlaceHolder 4"/>
+          <p:cNvPr id="15" name="PlaceHolder 4"/>
           <p:cNvSpPr>
             <a:spLocks noGrp="1"/>
           </p:cNvSpPr>
@@ -901,8 +2055,8 @@
         </p:nvSpPr>
         <p:spPr>
           <a:xfrm>
-            <a:off x="5152680" y="1769040"/>
-            <a:ext cx="4426920" cy="4384440"/>
+            <a:off x="5152320" y="1769040"/>
+            <a:ext cx="4426560" cy="4384080"/>
           </a:xfrm>
           <a:prstGeom prst="rect">
             <a:avLst/>
@@ -939,7 +2093,7 @@
       </p:grpSpPr>
       <p:sp>
         <p:nvSpPr>
-          <p:cNvPr id="18" name="PlaceHolder 1"/>
+          <p:cNvPr id="16" name="PlaceHolder 1"/>
           <p:cNvSpPr>
             <a:spLocks noGrp="1"/>
           </p:cNvSpPr>
@@ -950,7 +2104,7 @@
         <p:spPr>
           <a:xfrm>
             <a:off x="504000" y="301320"/>
-            <a:ext cx="9071640" cy="1262160"/>
+            <a:ext cx="9071280" cy="1261800"/>
           </a:xfrm>
           <a:prstGeom prst="rect">
             <a:avLst/>
@@ -966,7 +2120,7 @@
       </p:sp>
       <p:sp>
         <p:nvSpPr>
-          <p:cNvPr id="19" name="PlaceHolder 2"/>
+          <p:cNvPr id="17" name="PlaceHolder 2"/>
           <p:cNvSpPr>
             <a:spLocks noGrp="1"/>
           </p:cNvSpPr>
@@ -977,7 +2131,7 @@
         <p:spPr>
           <a:xfrm>
             <a:off x="504000" y="1769040"/>
-            <a:ext cx="4426920" cy="4384440"/>
+            <a:ext cx="4426560" cy="4384080"/>
           </a:xfrm>
           <a:prstGeom prst="rect">
             <a:avLst/>
@@ -992,7 +2146,7 @@
       </p:sp>
       <p:sp>
         <p:nvSpPr>
-          <p:cNvPr id="20" name="PlaceHolder 3"/>
+          <p:cNvPr id="18" name="PlaceHolder 3"/>
           <p:cNvSpPr>
             <a:spLocks noGrp="1"/>
           </p:cNvSpPr>
@@ -1002,8 +2156,8 @@
         </p:nvSpPr>
         <p:spPr>
           <a:xfrm>
-            <a:off x="5152680" y="1769040"/>
-            <a:ext cx="4426920" cy="2091240"/>
+            <a:off x="5152320" y="1769040"/>
+            <a:ext cx="4426560" cy="2090880"/>
           </a:xfrm>
           <a:prstGeom prst="rect">
             <a:avLst/>
@@ -1018,7 +2172,7 @@
       </p:sp>
       <p:sp>
         <p:nvSpPr>
-          <p:cNvPr id="21" name="PlaceHolder 4"/>
+          <p:cNvPr id="19" name="PlaceHolder 4"/>
           <p:cNvSpPr>
             <a:spLocks noGrp="1"/>
           </p:cNvSpPr>
@@ -1028,8 +2182,8 @@
         </p:nvSpPr>
         <p:spPr>
           <a:xfrm>
-            <a:off x="5152680" y="4059360"/>
-            <a:ext cx="4426920" cy="2091240"/>
+            <a:off x="5152320" y="4059000"/>
+            <a:ext cx="4426560" cy="2090880"/>
           </a:xfrm>
           <a:prstGeom prst="rect">
             <a:avLst/>
@@ -1066,7 +2220,7 @@
       </p:grpSpPr>
       <p:sp>
         <p:nvSpPr>
-          <p:cNvPr id="22" name="PlaceHolder 1"/>
+          <p:cNvPr id="20" name="PlaceHolder 1"/>
           <p:cNvSpPr>
             <a:spLocks noGrp="1"/>
           </p:cNvSpPr>
@@ -1077,7 +2231,7 @@
         <p:spPr>
           <a:xfrm>
             <a:off x="504000" y="301320"/>
-            <a:ext cx="9071640" cy="1262160"/>
+            <a:ext cx="9071280" cy="1261800"/>
           </a:xfrm>
           <a:prstGeom prst="rect">
             <a:avLst/>
@@ -1093,7 +2247,7 @@
       </p:sp>
       <p:sp>
         <p:nvSpPr>
-          <p:cNvPr id="23" name="PlaceHolder 2"/>
+          <p:cNvPr id="21" name="PlaceHolder 2"/>
           <p:cNvSpPr>
             <a:spLocks noGrp="1"/>
           </p:cNvSpPr>
@@ -1104,7 +2258,7 @@
         <p:spPr>
           <a:xfrm>
             <a:off x="504000" y="1769040"/>
-            <a:ext cx="4426920" cy="2091240"/>
+            <a:ext cx="4426560" cy="2090880"/>
           </a:xfrm>
           <a:prstGeom prst="rect">
             <a:avLst/>
@@ -1119,7 +2273,7 @@
       </p:sp>
       <p:sp>
         <p:nvSpPr>
-          <p:cNvPr id="24" name="PlaceHolder 3"/>
+          <p:cNvPr id="22" name="PlaceHolder 3"/>
           <p:cNvSpPr>
             <a:spLocks noGrp="1"/>
           </p:cNvSpPr>
@@ -1129,8 +2283,8 @@
         </p:nvSpPr>
         <p:spPr>
           <a:xfrm>
-            <a:off x="5152680" y="1769040"/>
-            <a:ext cx="4426920" cy="2091240"/>
+            <a:off x="5152320" y="1769040"/>
+            <a:ext cx="4426560" cy="2090880"/>
           </a:xfrm>
           <a:prstGeom prst="rect">
             <a:avLst/>
@@ -1145,7 +2299,7 @@
       </p:sp>
       <p:sp>
         <p:nvSpPr>
-          <p:cNvPr id="25" name="PlaceHolder 4"/>
+          <p:cNvPr id="23" name="PlaceHolder 4"/>
           <p:cNvSpPr>
             <a:spLocks noGrp="1"/>
           </p:cNvSpPr>
@@ -1155,8 +2309,8 @@
         </p:nvSpPr>
         <p:spPr>
           <a:xfrm>
-            <a:off x="504000" y="4059360"/>
-            <a:ext cx="9071640" cy="2091240"/>
+            <a:off x="504000" y="4059000"/>
+            <a:ext cx="9071280" cy="2090880"/>
           </a:xfrm>
           <a:prstGeom prst="rect">
             <a:avLst/>
@@ -1204,7 +2358,7 @@
         <p:spPr>
           <a:xfrm>
             <a:off x="504000" y="301320"/>
-            <a:ext cx="9071640" cy="1262160"/>
+            <a:ext cx="9071280" cy="1261800"/>
           </a:xfrm>
           <a:prstGeom prst="rect">
             <a:avLst/>
@@ -1214,12 +2368,6 @@
           <a:bodyPr lIns="0" rIns="0" tIns="0" bIns="0" anchor="ctr"/>
           <a:p>
             <a:pPr algn="ctr"/>
-            <a:r>
-              <a:rPr lang="en-US" sz="4400">
-                <a:latin typeface="Arial"/>
-              </a:rPr>
-              <a:t>Click to edit the title text format</a:t>
-            </a:r>
             <a:endParaRPr/>
           </a:p>
         </p:txBody>
@@ -1231,13 +2379,40 @@
             <a:spLocks noGrp="1"/>
           </p:cNvSpPr>
           <p:nvPr>
+            <p:ph type="subTitle"/>
+          </p:nvPr>
+        </p:nvSpPr>
+        <p:spPr>
+          <a:xfrm>
+            <a:off x="504000" y="1769040"/>
+            <a:ext cx="9071280" cy="4384080"/>
+          </a:xfrm>
+          <a:prstGeom prst="rect">
+            <a:avLst/>
+          </a:prstGeom>
+        </p:spPr>
+        <p:txBody>
+          <a:bodyPr lIns="0" rIns="0" tIns="0" bIns="0" anchor="ctr"/>
+          <a:p>
+            <a:pPr algn="ctr"/>
+            <a:endParaRPr/>
+          </a:p>
+        </p:txBody>
+      </p:sp>
+      <p:sp>
+        <p:nvSpPr>
+          <p:cNvPr id="2" name="PlaceHolder 3"/>
+          <p:cNvSpPr>
+            <a:spLocks noGrp="1"/>
+          </p:cNvSpPr>
+          <p:nvPr>
             <p:ph type="body"/>
           </p:nvPr>
         </p:nvSpPr>
         <p:spPr>
           <a:xfrm>
-            <a:off x="504000" y="1769040"/>
-            <a:ext cx="9071640" cy="4384440"/>
+            <a:off x="504000" y="1768680"/>
+            <a:ext cx="9072000" cy="4384080"/>
           </a:xfrm>
           <a:prstGeom prst="rect">
             <a:avLst/>
@@ -1341,104 +2516,6 @@
               </a:rPr>
               <a:t>Seventh Outline Level</a:t>
             </a:r>
-            <a:endParaRPr/>
-          </a:p>
-        </p:txBody>
-      </p:sp>
-      <p:sp>
-        <p:nvSpPr>
-          <p:cNvPr id="2" name="PlaceHolder 3"/>
-          <p:cNvSpPr>
-            <a:spLocks noGrp="1"/>
-          </p:cNvSpPr>
-          <p:nvPr>
-            <p:ph type="dt"/>
-          </p:nvPr>
-        </p:nvSpPr>
-        <p:spPr>
-          <a:xfrm>
-            <a:off x="504000" y="6887160"/>
-            <a:ext cx="2348280" cy="521280"/>
-          </a:xfrm>
-          <a:prstGeom prst="rect">
-            <a:avLst/>
-          </a:prstGeom>
-        </p:spPr>
-        <p:txBody>
-          <a:bodyPr lIns="0" rIns="0" tIns="0" bIns="0"/>
-          <a:p>
-            <a:r>
-              <a:rPr lang="en-US" sz="1400">
-                <a:latin typeface="Times New Roman"/>
-              </a:rPr>
-              <a:t>&lt;date/time&gt;</a:t>
-            </a:r>
-            <a:endParaRPr/>
-          </a:p>
-        </p:txBody>
-      </p:sp>
-      <p:sp>
-        <p:nvSpPr>
-          <p:cNvPr id="3" name="PlaceHolder 4"/>
-          <p:cNvSpPr>
-            <a:spLocks noGrp="1"/>
-          </p:cNvSpPr>
-          <p:nvPr>
-            <p:ph type="ftr"/>
-          </p:nvPr>
-        </p:nvSpPr>
-        <p:spPr>
-          <a:xfrm>
-            <a:off x="3447360" y="6887160"/>
-            <a:ext cx="3195000" cy="521280"/>
-          </a:xfrm>
-          <a:prstGeom prst="rect">
-            <a:avLst/>
-          </a:prstGeom>
-        </p:spPr>
-        <p:txBody>
-          <a:bodyPr lIns="0" rIns="0" tIns="0" bIns="0"/>
-          <a:p>
-            <a:pPr algn="ctr"/>
-            <a:r>
-              <a:rPr lang="en-US" sz="1400">
-                <a:latin typeface="Times New Roman"/>
-              </a:rPr>
-              <a:t>&lt;footer&gt;</a:t>
-            </a:r>
-            <a:endParaRPr/>
-          </a:p>
-        </p:txBody>
-      </p:sp>
-      <p:sp>
-        <p:nvSpPr>
-          <p:cNvPr id="4" name="PlaceHolder 5"/>
-          <p:cNvSpPr>
-            <a:spLocks noGrp="1"/>
-          </p:cNvSpPr>
-          <p:nvPr>
-            <p:ph type="sldNum"/>
-          </p:nvPr>
-        </p:nvSpPr>
-        <p:spPr>
-          <a:xfrm>
-            <a:off x="7227360" y="6887160"/>
-            <a:ext cx="2348280" cy="521280"/>
-          </a:xfrm>
-          <a:prstGeom prst="rect">
-            <a:avLst/>
-          </a:prstGeom>
-        </p:spPr>
-        <p:txBody>
-          <a:bodyPr lIns="0" rIns="0" tIns="0" bIns="0"/>
-          <a:p>
-            <a:pPr algn="r"/>
-            <a:fld id="{06D0F9EE-F8AD-48AD-A10F-4407CC2A2FED}" type="slidenum">
-              <a:rPr lang="en-US" sz="1400">
-                <a:latin typeface="Times New Roman"/>
-              </a:rPr>
-              <a:t>&lt;number&gt;</a:t>
-            </a:fld>
             <a:endParaRPr/>
           </a:p>
         </p:txBody>
@@ -1459,6 +2536,191 @@
     <p:sldLayoutId id="2147483658" r:id="rId11"/>
     <p:sldLayoutId id="2147483659" r:id="rId12"/>
     <p:sldLayoutId id="2147483660" r:id="rId13"/>
+  </p:sldLayoutIdLst>
+</p:sldMaster>
+</file>
+
+<file path=ppt/slideMasters/slideMaster2.xml><?xml version="1.0" encoding="utf-8"?>
+<p:sldMaster xmlns:a="http://schemas.openxmlformats.org/drawingml/2006/main" xmlns:p="http://schemas.openxmlformats.org/presentationml/2006/main" xmlns:r="http://schemas.openxmlformats.org/officeDocument/2006/relationships">
+  <p:cSld>
+    <p:spTree>
+      <p:nvGrpSpPr>
+        <p:cNvPr id="1" name=""/>
+        <p:cNvGrpSpPr/>
+        <p:nvPr/>
+      </p:nvGrpSpPr>
+      <p:grpSpPr>
+        <a:xfrm>
+          <a:off x="0" y="0"/>
+          <a:ext cx="0" cy="0"/>
+          <a:chOff x="0" y="0"/>
+          <a:chExt cx="0" cy="0"/>
+        </a:xfrm>
+      </p:grpSpPr>
+      <p:sp>
+        <p:nvSpPr>
+          <p:cNvPr id="37" name="PlaceHolder 1"/>
+          <p:cNvSpPr>
+            <a:spLocks noGrp="1"/>
+          </p:cNvSpPr>
+          <p:nvPr>
+            <p:ph type="title"/>
+          </p:nvPr>
+        </p:nvSpPr>
+        <p:spPr>
+          <a:xfrm>
+            <a:off x="504000" y="301320"/>
+            <a:ext cx="9071280" cy="1261800"/>
+          </a:xfrm>
+          <a:prstGeom prst="rect">
+            <a:avLst/>
+          </a:prstGeom>
+        </p:spPr>
+        <p:txBody>
+          <a:bodyPr lIns="0" rIns="0" tIns="0" bIns="0" anchor="ctr"/>
+          <a:p>
+            <a:pPr algn="ctr"/>
+            <a:endParaRPr/>
+          </a:p>
+        </p:txBody>
+      </p:sp>
+      <p:sp>
+        <p:nvSpPr>
+          <p:cNvPr id="38" name="PlaceHolder 2"/>
+          <p:cNvSpPr>
+            <a:spLocks noGrp="1"/>
+          </p:cNvSpPr>
+          <p:nvPr>
+            <p:ph type="body"/>
+          </p:nvPr>
+        </p:nvSpPr>
+        <p:spPr>
+          <a:xfrm>
+            <a:off x="504000" y="1769040"/>
+            <a:ext cx="9071280" cy="4384080"/>
+          </a:xfrm>
+          <a:prstGeom prst="rect">
+            <a:avLst/>
+          </a:prstGeom>
+        </p:spPr>
+        <p:txBody>
+          <a:bodyPr lIns="0" rIns="0" tIns="0" bIns="0"/>
+          <a:p>
+            <a:pPr>
+              <a:buSzPct val="45000"/>
+              <a:buFont typeface="StarSymbol"/>
+              <a:buChar char=""/>
+            </a:pPr>
+            <a:r>
+              <a:rPr lang="en-US">
+                <a:latin typeface="Arial"/>
+              </a:rPr>
+              <a:t>Click to edit the outline text format</a:t>
+            </a:r>
+            <a:endParaRPr/>
+          </a:p>
+          <a:p>
+            <a:pPr lvl="1">
+              <a:buSzPct val="75000"/>
+              <a:buFont typeface="StarSymbol"/>
+              <a:buChar char=""/>
+            </a:pPr>
+            <a:r>
+              <a:rPr lang="en-US">
+                <a:latin typeface="Arial"/>
+              </a:rPr>
+              <a:t>Second Outline Level</a:t>
+            </a:r>
+            <a:endParaRPr/>
+          </a:p>
+          <a:p>
+            <a:pPr lvl="2">
+              <a:buSzPct val="45000"/>
+              <a:buFont typeface="StarSymbol"/>
+              <a:buChar char=""/>
+            </a:pPr>
+            <a:r>
+              <a:rPr lang="en-US">
+                <a:latin typeface="Arial"/>
+              </a:rPr>
+              <a:t>Third Outline Level</a:t>
+            </a:r>
+            <a:endParaRPr/>
+          </a:p>
+          <a:p>
+            <a:pPr lvl="3">
+              <a:buSzPct val="75000"/>
+              <a:buFont typeface="StarSymbol"/>
+              <a:buChar char=""/>
+            </a:pPr>
+            <a:r>
+              <a:rPr lang="en-US">
+                <a:latin typeface="Arial"/>
+              </a:rPr>
+              <a:t>Fourth Outline Level</a:t>
+            </a:r>
+            <a:endParaRPr/>
+          </a:p>
+          <a:p>
+            <a:pPr lvl="4">
+              <a:buSzPct val="45000"/>
+              <a:buFont typeface="StarSymbol"/>
+              <a:buChar char=""/>
+            </a:pPr>
+            <a:r>
+              <a:rPr lang="en-US">
+                <a:latin typeface="Arial"/>
+              </a:rPr>
+              <a:t>Fifth Outline Level</a:t>
+            </a:r>
+            <a:endParaRPr/>
+          </a:p>
+          <a:p>
+            <a:pPr lvl="5">
+              <a:buSzPct val="45000"/>
+              <a:buFont typeface="StarSymbol"/>
+              <a:buChar char=""/>
+            </a:pPr>
+            <a:r>
+              <a:rPr lang="en-US">
+                <a:latin typeface="Arial"/>
+              </a:rPr>
+              <a:t>Sixth Outline Level</a:t>
+            </a:r>
+            <a:endParaRPr/>
+          </a:p>
+          <a:p>
+            <a:pPr lvl="6">
+              <a:buSzPct val="45000"/>
+              <a:buFont typeface="StarSymbol"/>
+              <a:buChar char=""/>
+            </a:pPr>
+            <a:r>
+              <a:rPr lang="en-US">
+                <a:latin typeface="Arial"/>
+              </a:rPr>
+              <a:t>Seventh Outline Level</a:t>
+            </a:r>
+            <a:endParaRPr/>
+          </a:p>
+        </p:txBody>
+      </p:sp>
+    </p:spTree>
+  </p:cSld>
+  <p:clrMap bg1="lt1" bg2="lt2" tx1="dk1" tx2="dk2" accent1="accent1" accent2="accent2" accent3="accent3" accent4="accent4" accent5="accent5" accent6="accent6" hlink="hlink" folHlink="folHlink"/>
+  <p:sldLayoutIdLst>
+    <p:sldLayoutId id="2147483662" r:id="rId2"/>
+    <p:sldLayoutId id="2147483663" r:id="rId3"/>
+    <p:sldLayoutId id="2147483664" r:id="rId4"/>
+    <p:sldLayoutId id="2147483665" r:id="rId5"/>
+    <p:sldLayoutId id="2147483666" r:id="rId6"/>
+    <p:sldLayoutId id="2147483667" r:id="rId7"/>
+    <p:sldLayoutId id="2147483668" r:id="rId8"/>
+    <p:sldLayoutId id="2147483669" r:id="rId9"/>
+    <p:sldLayoutId id="2147483670" r:id="rId10"/>
+    <p:sldLayoutId id="2147483671" r:id="rId11"/>
+    <p:sldLayoutId id="2147483672" r:id="rId12"/>
+    <p:sldLayoutId id="2147483673" r:id="rId13"/>
   </p:sldLayoutIdLst>
 </p:sldMaster>
 </file>
@@ -1482,14 +2744,14 @@
       </p:grpSpPr>
       <p:sp>
         <p:nvSpPr>
-          <p:cNvPr id="39" name="TextShape 1"/>
-          <p:cNvSpPr txBox="1"/>
+          <p:cNvPr id="73" name="CustomShape 1"/>
+          <p:cNvSpPr/>
           <p:nvPr/>
         </p:nvSpPr>
         <p:spPr>
           <a:xfrm>
             <a:off x="504000" y="301320"/>
-            <a:ext cx="9071640" cy="1262160"/>
+            <a:ext cx="9071280" cy="1261800"/>
           </a:xfrm>
           <a:prstGeom prst="rect">
             <a:avLst/>
@@ -1499,11 +2761,17 @@
             <a:noFill/>
           </a:ln>
         </p:spPr>
+        <p:style>
+          <a:lnRef idx="0"/>
+          <a:fillRef idx="0"/>
+          <a:effectRef idx="0"/>
+          <a:fontRef idx="minor"/>
+        </p:style>
         <p:txBody>
           <a:bodyPr lIns="0" rIns="0" tIns="0" bIns="0" anchor="ctr"/>
           <a:p>
             <a:r>
-              <a:rPr b="1" lang="en-US" sz="4400">
+              <a:rPr b="1" lang="en-US" sz="4400" strike="noStrike">
                 <a:latin typeface="Arial"/>
               </a:rPr>
               <a:t>Question 1</a:t>
@@ -1514,14 +2782,14 @@
       </p:sp>
       <p:sp>
         <p:nvSpPr>
-          <p:cNvPr id="40" name="TextShape 2"/>
-          <p:cNvSpPr txBox="1"/>
+          <p:cNvPr id="74" name="CustomShape 2"/>
+          <p:cNvSpPr/>
           <p:nvPr/>
         </p:nvSpPr>
         <p:spPr>
           <a:xfrm>
             <a:off x="504000" y="1769040"/>
-            <a:ext cx="9071640" cy="4384440"/>
+            <a:ext cx="9071280" cy="4384080"/>
           </a:xfrm>
           <a:prstGeom prst="rect">
             <a:avLst/>
@@ -1531,11 +2799,17 @@
             <a:noFill/>
           </a:ln>
         </p:spPr>
+        <p:style>
+          <a:lnRef idx="0"/>
+          <a:fillRef idx="0"/>
+          <a:effectRef idx="0"/>
+          <a:fontRef idx="minor"/>
+        </p:style>
         <p:txBody>
           <a:bodyPr lIns="0" rIns="0" tIns="0" bIns="0" anchor="ctr"/>
           <a:p>
             <a:r>
-              <a:rPr lang="en-US" sz="4000">
+              <a:rPr lang="en-US" sz="4000" strike="noStrike">
                 <a:latin typeface="Arial"/>
               </a:rPr>
               <a:t>Who here is running Windows?</a:t>
@@ -1547,9 +2821,12 @@
           </a:p>
           <a:p>
             <a:pPr>
+              <a:lnSpc>
+                <a:spcPct val="100000"/>
+              </a:lnSpc>
               <a:buSzPct val="45000"/>
               <a:buFont typeface="StarSymbol"/>
-              <a:buChar char=""/>
+              <a:buChar char="l"/>
             </a:pPr>
             <a:r>
               <a:rPr lang="en-US" sz="3200" strike="noStrike">
@@ -1565,9 +2842,12 @@
           </a:p>
           <a:p>
             <a:pPr>
+              <a:lnSpc>
+                <a:spcPct val="100000"/>
+              </a:lnSpc>
               <a:buSzPct val="45000"/>
               <a:buFont typeface="StarSymbol"/>
-              <a:buChar char=""/>
+              <a:buChar char="l"/>
             </a:pPr>
             <a:r>
               <a:rPr lang="en-US" sz="3200" strike="noStrike">
@@ -1634,14 +2914,14 @@
       </p:grpSpPr>
       <p:sp>
         <p:nvSpPr>
-          <p:cNvPr id="41" name="TextShape 1"/>
-          <p:cNvSpPr txBox="1"/>
+          <p:cNvPr id="75" name="CustomShape 1"/>
+          <p:cNvSpPr/>
           <p:nvPr/>
         </p:nvSpPr>
         <p:spPr>
           <a:xfrm>
             <a:off x="504000" y="301320"/>
-            <a:ext cx="9071640" cy="1262160"/>
+            <a:ext cx="9071280" cy="1261800"/>
           </a:xfrm>
           <a:prstGeom prst="rect">
             <a:avLst/>
@@ -1651,30 +2931,64 @@
             <a:noFill/>
           </a:ln>
         </p:spPr>
+        <p:style>
+          <a:lnRef idx="0"/>
+          <a:fillRef idx="0"/>
+          <a:effectRef idx="0"/>
+          <a:fontRef idx="minor"/>
+        </p:style>
         <p:txBody>
           <a:bodyPr lIns="0" rIns="0" tIns="0" bIns="0" anchor="ctr"/>
           <a:p>
-            <a:pPr algn="ctr"/>
-            <a:r>
-              <a:rPr b="1" lang="en-US" sz="4400">
-                <a:latin typeface="Arial"/>
-              </a:rPr>
-              <a:t>Commands to try</a:t>
-            </a:r>
-            <a:endParaRPr/>
-          </a:p>
-        </p:txBody>
-      </p:sp>
-      <p:sp>
-        <p:nvSpPr>
-          <p:cNvPr id="42" name="TextShape 2"/>
-          <p:cNvSpPr txBox="1"/>
+            <a:pPr algn="ctr">
+              <a:lnSpc>
+                <a:spcPct val="100000"/>
+              </a:lnSpc>
+            </a:pPr>
+            <a:r>
+              <a:rPr lang="en-US" sz="4400" strike="noStrike">
+                <a:latin typeface="Arial"/>
+              </a:rPr>
+              <a:t>ssh (</a:t>
+            </a:r>
+            <a:r>
+              <a:rPr b="1" lang="en-US" sz="4400" strike="noStrike">
+                <a:latin typeface="Arial"/>
+              </a:rPr>
+              <a:t>s</a:t>
+            </a:r>
+            <a:r>
+              <a:rPr lang="en-US" sz="4400" strike="noStrike">
+                <a:latin typeface="Arial"/>
+              </a:rPr>
+              <a:t>ecure </a:t>
+            </a:r>
+            <a:r>
+              <a:rPr b="1" lang="en-US" sz="4400" strike="noStrike">
+                <a:latin typeface="Arial"/>
+              </a:rPr>
+              <a:t>sh</a:t>
+            </a:r>
+            <a:r>
+              <a:rPr lang="en-US" sz="4400" strike="noStrike">
+                <a:latin typeface="Arial"/>
+              </a:rPr>
+              <a:t>ell)</a:t>
+            </a:r>
+            <a:endParaRPr/>
+          </a:p>
+        </p:txBody>
+      </p:sp>
+      <p:sp>
+        <p:nvSpPr>
+          <p:cNvPr id="76" name="CustomShape 2"/>
+          <p:cNvSpPr/>
           <p:nvPr/>
         </p:nvSpPr>
         <p:spPr>
           <a:xfrm>
             <a:off x="504000" y="1769040"/>
-            <a:ext cx="9071640" cy="4384440"/>
+            <a:ext cx="9071280" cy="4384080"/>
           </a:xfrm>
           <a:prstGeom prst="rect">
             <a:avLst/>
@@ -1684,167 +2998,53 @@
             <a:noFill/>
           </a:ln>
         </p:spPr>
+        <p:style>
+          <a:lnRef idx="0"/>
+          <a:fillRef idx="0"/>
+          <a:effectRef idx="0"/>
+          <a:fontRef idx="minor"/>
+        </p:style>
         <p:txBody>
           <a:bodyPr lIns="0" rIns="0" tIns="0" bIns="0"/>
           <a:p>
-            <a:pPr>
-              <a:buSzPct val="45000"/>
-              <a:buFont typeface="StarSymbol"/>
-              <a:buChar char=""/>
-            </a:pPr>
-            <a:r>
-              <a:rPr lang="en-US" sz="3600">
-                <a:latin typeface="Arial"/>
-              </a:rPr>
-              <a:t>pwd  </a:t>
-            </a:r>
-            <a:r>
-              <a:rPr lang="en-US" sz="3600">
-                <a:latin typeface="Arial"/>
-              </a:rPr>
-              <a:t>	</a:t>
-            </a:r>
-            <a:r>
-              <a:rPr lang="en-US" sz="3600">
-                <a:latin typeface="Arial"/>
-              </a:rPr>
-              <a:t>(</a:t>
-            </a:r>
-            <a:r>
-              <a:rPr b="1" lang="en-US" sz="3600">
-                <a:latin typeface="Arial"/>
-              </a:rPr>
-              <a:t>p</a:t>
-            </a:r>
-            <a:r>
-              <a:rPr lang="en-US" sz="3600">
-                <a:latin typeface="Arial"/>
-              </a:rPr>
-              <a:t>rint </a:t>
-            </a:r>
-            <a:r>
-              <a:rPr b="1" lang="en-US" sz="3600">
-                <a:latin typeface="Arial"/>
-              </a:rPr>
-              <a:t>w</a:t>
-            </a:r>
-            <a:r>
-              <a:rPr lang="en-US" sz="3600">
-                <a:latin typeface="Arial"/>
-              </a:rPr>
-              <a:t>orking </a:t>
-            </a:r>
-            <a:r>
-              <a:rPr b="1" lang="en-US" sz="3600">
-                <a:latin typeface="Arial"/>
-              </a:rPr>
-              <a:t>d</a:t>
-            </a:r>
-            <a:r>
-              <a:rPr lang="en-US" sz="3600">
-                <a:latin typeface="Arial"/>
-              </a:rPr>
-              <a:t>irectory)</a:t>
-            </a:r>
-            <a:endParaRPr/>
-          </a:p>
-          <a:p>
-            <a:pPr>
-              <a:buSzPct val="45000"/>
-              <a:buFont typeface="StarSymbol"/>
-              <a:buChar char=""/>
-            </a:pPr>
-            <a:r>
-              <a:rPr lang="en-US" sz="3600">
-                <a:latin typeface="Arial"/>
-              </a:rPr>
-              <a:t>ls </a:t>
-            </a:r>
-            <a:r>
-              <a:rPr lang="en-US" sz="3600">
-                <a:latin typeface="Arial"/>
-              </a:rPr>
-              <a:t>	</a:t>
-            </a:r>
-            <a:r>
-              <a:rPr lang="en-US" sz="3600">
-                <a:latin typeface="Arial"/>
-              </a:rPr>
-              <a:t>	</a:t>
-            </a:r>
-            <a:r>
-              <a:rPr lang="en-US" sz="3600">
-                <a:latin typeface="Arial"/>
-              </a:rPr>
-              <a:t>	</a:t>
-            </a:r>
-            <a:r>
-              <a:rPr lang="en-US" sz="3600">
-                <a:latin typeface="Arial"/>
-              </a:rPr>
-              <a:t>(</a:t>
-            </a:r>
-            <a:r>
-              <a:rPr b="1" lang="en-US" sz="3600">
-                <a:latin typeface="Arial"/>
-              </a:rPr>
-              <a:t>l</a:t>
-            </a:r>
-            <a:r>
-              <a:rPr lang="en-US" sz="3600">
-                <a:latin typeface="Arial"/>
-              </a:rPr>
-              <a:t>i</a:t>
-            </a:r>
-            <a:r>
-              <a:rPr b="1" lang="en-US" sz="3600">
-                <a:latin typeface="Arial"/>
-              </a:rPr>
-              <a:t>s</a:t>
-            </a:r>
-            <a:r>
-              <a:rPr lang="en-US" sz="3600">
-                <a:latin typeface="Arial"/>
-              </a:rPr>
-              <a:t>t directory contents)</a:t>
-            </a:r>
-            <a:endParaRPr/>
-          </a:p>
-          <a:p>
-            <a:pPr>
-              <a:buSzPct val="45000"/>
-              <a:buFont typeface="StarSymbol"/>
-              <a:buChar char=""/>
-            </a:pPr>
-            <a:r>
-              <a:rPr lang="en-US" sz="3600">
-                <a:latin typeface="Arial"/>
-              </a:rPr>
-              <a:t>man ls </a:t>
-            </a:r>
-            <a:r>
-              <a:rPr lang="en-US" sz="3600">
-                <a:latin typeface="Arial"/>
-              </a:rPr>
-              <a:t>	</a:t>
-            </a:r>
-            <a:r>
-              <a:rPr lang="en-US" sz="3600">
-                <a:latin typeface="Arial"/>
-              </a:rPr>
-              <a:t>(</a:t>
-            </a:r>
-            <a:r>
-              <a:rPr b="1" lang="en-US" sz="3600">
-                <a:latin typeface="Arial"/>
-              </a:rPr>
-              <a:t>man</a:t>
-            </a:r>
-            <a:r>
-              <a:rPr lang="en-US" sz="3600">
-                <a:latin typeface="Arial"/>
-              </a:rPr>
-              <a:t>ual ls: 'q' to quit)</a:t>
+            <a:endParaRPr/>
+          </a:p>
+          <a:p>
+            <a:r>
+              <a:rPr i="1" lang="en-US" sz="3200" strike="noStrike">
+                <a:solidFill>
+                  <a:srgbClr val="000000"/>
+                </a:solidFill>
+                <a:latin typeface="Menlo"/>
+                <a:ea typeface="Menlo"/>
+              </a:rPr>
+              <a:t>ssh  -i &lt;key&gt; &lt;user_id&gt;@&lt;address&gt;</a:t>
+            </a:r>
+            <a:endParaRPr/>
+          </a:p>
+          <a:p>
+            <a:r>
+              <a:rPr b="1" lang="en-US" sz="3200" strike="noStrike">
+                <a:solidFill>
+                  <a:srgbClr val="000000"/>
+                </a:solidFill>
+                <a:latin typeface="Menlo"/>
+                <a:ea typeface="Menlo"/>
+              </a:rPr>
+              <a:t>Eg, for Anna's Drupal server:</a:t>
+            </a:r>
+            <a:endParaRPr/>
+          </a:p>
+          <a:p>
+            <a:r>
+              <a:rPr i="1" lang="en-US" sz="3200" strike="noStrike">
+                <a:solidFill>
+                  <a:srgbClr val="000000"/>
+                </a:solidFill>
+                <a:latin typeface="Menlo"/>
+                <a:ea typeface="Menlo"/>
+              </a:rPr>
+              <a:t>ssh -i tut.pem ubuntu@144.6.225.224</a:t>
             </a:r>
             <a:endParaRPr/>
           </a:p>
@@ -1901,14 +3101,14 @@
       </p:grpSpPr>
       <p:sp>
         <p:nvSpPr>
-          <p:cNvPr id="43" name="TextShape 1"/>
-          <p:cNvSpPr txBox="1"/>
+          <p:cNvPr id="77" name="CustomShape 1"/>
+          <p:cNvSpPr/>
           <p:nvPr/>
         </p:nvSpPr>
         <p:spPr>
           <a:xfrm>
             <a:off x="504000" y="301320"/>
-            <a:ext cx="9071640" cy="1262160"/>
+            <a:ext cx="9071280" cy="1261800"/>
           </a:xfrm>
           <a:prstGeom prst="rect">
             <a:avLst/>
@@ -1918,54 +3118,35 @@
             <a:noFill/>
           </a:ln>
         </p:spPr>
+        <p:style>
+          <a:lnRef idx="0"/>
+          <a:fillRef idx="0"/>
+          <a:effectRef idx="0"/>
+          <a:fontRef idx="minor"/>
+        </p:style>
         <p:txBody>
           <a:bodyPr lIns="0" rIns="0" tIns="0" bIns="0" anchor="ctr"/>
           <a:p>
-            <a:pPr algn="ctr"/>
-            <a:r>
-              <a:rPr lang="en-US" sz="4400">
-                <a:latin typeface="Arial"/>
-              </a:rPr>
-              <a:t>ssh (</a:t>
-            </a:r>
-            <a:r>
-              <a:rPr b="1" lang="en-US" sz="4400">
-                <a:latin typeface="Arial"/>
-              </a:rPr>
-              <a:t>s</a:t>
-            </a:r>
-            <a:r>
-              <a:rPr lang="en-US" sz="4400">
-                <a:latin typeface="Arial"/>
-              </a:rPr>
-              <a:t>ecure </a:t>
-            </a:r>
-            <a:r>
-              <a:rPr b="1" lang="en-US" sz="4400">
-                <a:latin typeface="Arial"/>
-              </a:rPr>
-              <a:t>sh</a:t>
-            </a:r>
-            <a:r>
-              <a:rPr lang="en-US" sz="4400">
-                <a:latin typeface="Arial"/>
-              </a:rPr>
-              <a:t>ell)</a:t>
-            </a:r>
-            <a:endParaRPr/>
-          </a:p>
-        </p:txBody>
-      </p:sp>
-      <p:sp>
-        <p:nvSpPr>
-          <p:cNvPr id="44" name="TextShape 2"/>
-          <p:cNvSpPr txBox="1"/>
+            <a:r>
+              <a:rPr b="1" lang="en-US" sz="4400" strike="noStrike">
+                <a:latin typeface="Arial"/>
+              </a:rPr>
+              <a:t>Question 2</a:t>
+            </a:r>
+            <a:endParaRPr/>
+          </a:p>
+        </p:txBody>
+      </p:sp>
+      <p:sp>
+        <p:nvSpPr>
+          <p:cNvPr id="78" name="CustomShape 2"/>
+          <p:cNvSpPr/>
           <p:nvPr/>
         </p:nvSpPr>
         <p:spPr>
           <a:xfrm>
-            <a:off x="504000" y="1769040"/>
-            <a:ext cx="9071640" cy="4384440"/>
+            <a:off x="504000" y="1563480"/>
+            <a:ext cx="9071280" cy="5477040"/>
           </a:xfrm>
           <a:prstGeom prst="rect">
             <a:avLst/>
@@ -1975,47 +3156,162 @@
             <a:noFill/>
           </a:ln>
         </p:spPr>
+        <p:style>
+          <a:lnRef idx="0"/>
+          <a:fillRef idx="0"/>
+          <a:effectRef idx="0"/>
+          <a:fontRef idx="minor"/>
+        </p:style>
         <p:txBody>
           <a:bodyPr lIns="0" rIns="0" tIns="0" bIns="0"/>
           <a:p>
-            <a:endParaRPr/>
-          </a:p>
-          <a:p>
-            <a:r>
-              <a:rPr i="1" lang="en-US" sz="3200" strike="noStrike">
-                <a:solidFill>
-                  <a:srgbClr val="000000"/>
-                </a:solidFill>
-                <a:latin typeface="Menlo"/>
-                <a:ea typeface="Menlo"/>
-              </a:rPr>
-              <a:t>ssh  -i &lt;key&gt; &lt;user_id&gt;@&lt;address&gt;</a:t>
-            </a:r>
-            <a:endParaRPr/>
-          </a:p>
-          <a:p>
-            <a:r>
-              <a:rPr b="1" lang="en-US" sz="3200" strike="noStrike">
-                <a:solidFill>
-                  <a:srgbClr val="000000"/>
-                </a:solidFill>
-                <a:latin typeface="Menlo"/>
-                <a:ea typeface="Menlo"/>
-              </a:rPr>
-              <a:t>Eg, for Anna's Drupal server:</a:t>
-            </a:r>
-            <a:endParaRPr/>
-          </a:p>
-          <a:p>
-            <a:r>
-              <a:rPr i="1" lang="en-US" sz="3200" strike="noStrike">
-                <a:solidFill>
-                  <a:srgbClr val="000000"/>
-                </a:solidFill>
-                <a:latin typeface="Menlo"/>
-                <a:ea typeface="Menlo"/>
-              </a:rPr>
-              <a:t>ssh -i tut.pem ubuntu@144.6.225.224</a:t>
+            <a:r>
+              <a:rPr lang="en-US" sz="3200" strike="noStrike">
+                <a:latin typeface="Arial"/>
+              </a:rPr>
+              <a:t>The NeCTAR image catalogue can be found at:</a:t>
+            </a:r>
+            <a:endParaRPr/>
+          </a:p>
+          <a:p>
+            <a:r>
+              <a:rPr lang="en-US" sz="3200" strike="noStrike">
+                <a:latin typeface="Arial"/>
+              </a:rPr>
+              <a:t>https://wiki.rc.nectar.org.au/wiki/Image_Catalog</a:t>
+            </a:r>
+            <a:endParaRPr/>
+          </a:p>
+          <a:p>
+            <a:r>
+              <a:rPr lang="en-US" sz="3200" strike="noStrike">
+                <a:latin typeface="Arial"/>
+              </a:rPr>
+              <a:t>What Operating system is the Drupal server based on?</a:t>
+            </a:r>
+            <a:endParaRPr/>
+          </a:p>
+          <a:p>
+            <a:pPr>
+              <a:lnSpc>
+                <a:spcPct val="100000"/>
+              </a:lnSpc>
+              <a:buFont typeface="StarSymbol"/>
+              <a:buAutoNum type="alphaUcParenR"/>
+            </a:pPr>
+            <a:r>
+              <a:rPr lang="en-US" sz="3200" strike="noStrike">
+                <a:latin typeface="Arial"/>
+              </a:rPr>
+              <a:t> </a:t>
+            </a:r>
+            <a:r>
+              <a:rPr lang="en-US" sz="3200" strike="noStrike">
+                <a:latin typeface="Arial"/>
+              </a:rPr>
+              <a:t>Fedora</a:t>
+            </a:r>
+            <a:endParaRPr/>
+          </a:p>
+          <a:p>
+            <a:pPr>
+              <a:lnSpc>
+                <a:spcPct val="100000"/>
+              </a:lnSpc>
+              <a:buFont typeface="StarSymbol"/>
+              <a:buAutoNum type="alphaUcParenR"/>
+            </a:pPr>
+            <a:r>
+              <a:rPr lang="en-US" sz="3200" strike="noStrike">
+                <a:latin typeface="Arial"/>
+              </a:rPr>
+              <a:t> </a:t>
+            </a:r>
+            <a:r>
+              <a:rPr lang="en-US" sz="3200" strike="noStrike">
+                <a:latin typeface="Arial"/>
+              </a:rPr>
+              <a:t>Debian</a:t>
+            </a:r>
+            <a:endParaRPr/>
+          </a:p>
+          <a:p>
+            <a:pPr>
+              <a:lnSpc>
+                <a:spcPct val="100000"/>
+              </a:lnSpc>
+              <a:buFont typeface="StarSymbol"/>
+              <a:buAutoNum type="alphaUcParenR"/>
+            </a:pPr>
+            <a:r>
+              <a:rPr lang="en-US" sz="3200" strike="noStrike">
+                <a:latin typeface="Arial"/>
+              </a:rPr>
+              <a:t> </a:t>
+            </a:r>
+            <a:r>
+              <a:rPr lang="en-US" sz="3200" strike="noStrike">
+                <a:latin typeface="Arial"/>
+              </a:rPr>
+              <a:t>Centos</a:t>
+            </a:r>
+            <a:endParaRPr/>
+          </a:p>
+          <a:p>
+            <a:pPr>
+              <a:lnSpc>
+                <a:spcPct val="100000"/>
+              </a:lnSpc>
+              <a:buFont typeface="StarSymbol"/>
+              <a:buAutoNum type="alphaUcParenR"/>
+            </a:pPr>
+            <a:r>
+              <a:rPr lang="en-US" sz="3200" strike="noStrike">
+                <a:latin typeface="Arial"/>
+              </a:rPr>
+              <a:t> </a:t>
+            </a:r>
+            <a:r>
+              <a:rPr lang="en-US" sz="3200" strike="noStrike">
+                <a:latin typeface="Arial"/>
+              </a:rPr>
+              <a:t>Ubuntu</a:t>
+            </a:r>
+            <a:endParaRPr/>
+          </a:p>
+          <a:p>
+            <a:pPr>
+              <a:lnSpc>
+                <a:spcPct val="100000"/>
+              </a:lnSpc>
+              <a:buFont typeface="StarSymbol"/>
+              <a:buAutoNum type="alphaUcParenR"/>
+            </a:pPr>
+            <a:r>
+              <a:rPr lang="en-US" sz="3200" strike="noStrike">
+                <a:latin typeface="Arial"/>
+              </a:rPr>
+              <a:t> </a:t>
+            </a:r>
+            <a:r>
+              <a:rPr lang="en-US" sz="3200" strike="noStrike">
+                <a:latin typeface="Arial"/>
+              </a:rPr>
+              <a:t>Scientific Linux</a:t>
+            </a:r>
+            <a:endParaRPr/>
+          </a:p>
+          <a:p>
+            <a:pPr algn="ctr">
+              <a:lnSpc>
+                <a:spcPct val="100000"/>
+              </a:lnSpc>
+            </a:pPr>
+            <a:r>
+              <a:rPr b="1" lang="en-US" sz="3600" strike="noStrike">
+                <a:latin typeface="Arial"/>
+              </a:rPr>
+              <a:t>? </a:t>
             </a:r>
             <a:endParaRPr/>
           </a:p>
@@ -2072,14 +3368,14 @@
       </p:grpSpPr>
       <p:sp>
         <p:nvSpPr>
-          <p:cNvPr id="45" name="TextShape 1"/>
-          <p:cNvSpPr txBox="1"/>
+          <p:cNvPr id="79" name="CustomShape 1"/>
+          <p:cNvSpPr/>
           <p:nvPr/>
         </p:nvSpPr>
         <p:spPr>
           <a:xfrm>
             <a:off x="504000" y="301320"/>
-            <a:ext cx="9071640" cy="1262160"/>
+            <a:ext cx="9071280" cy="1261800"/>
           </a:xfrm>
           <a:prstGeom prst="rect">
             <a:avLst/>
@@ -2089,29 +3385,40 @@
             <a:noFill/>
           </a:ln>
         </p:spPr>
+        <p:style>
+          <a:lnRef idx="0"/>
+          <a:fillRef idx="0"/>
+          <a:effectRef idx="0"/>
+          <a:fontRef idx="minor"/>
+        </p:style>
         <p:txBody>
           <a:bodyPr lIns="0" rIns="0" tIns="0" bIns="0" anchor="ctr"/>
           <a:p>
-            <a:r>
-              <a:rPr b="1" lang="en-US" sz="4400">
-                <a:latin typeface="Arial"/>
-              </a:rPr>
-              <a:t>Question 2</a:t>
-            </a:r>
-            <a:endParaRPr/>
-          </a:p>
-        </p:txBody>
-      </p:sp>
-      <p:sp>
-        <p:nvSpPr>
-          <p:cNvPr id="46" name="TextShape 2"/>
-          <p:cNvSpPr txBox="1"/>
+            <a:pPr algn="ctr">
+              <a:lnSpc>
+                <a:spcPct val="100000"/>
+              </a:lnSpc>
+            </a:pPr>
+            <a:r>
+              <a:rPr b="1" lang="en-US" sz="4400" strike="noStrike">
+                <a:latin typeface="Arial"/>
+              </a:rPr>
+              <a:t>Is this a your error message?</a:t>
+            </a:r>
+            <a:endParaRPr/>
+          </a:p>
+        </p:txBody>
+      </p:sp>
+      <p:sp>
+        <p:nvSpPr>
+          <p:cNvPr id="80" name="CustomShape 2"/>
+          <p:cNvSpPr/>
           <p:nvPr/>
         </p:nvSpPr>
         <p:spPr>
           <a:xfrm>
-            <a:off x="504000" y="1563480"/>
-            <a:ext cx="9071640" cy="5477400"/>
+            <a:off x="504000" y="1769040"/>
+            <a:ext cx="9071280" cy="4384080"/>
           </a:xfrm>
           <a:prstGeom prst="rect">
             <a:avLst/>
@@ -2121,137 +3428,128 @@
             <a:noFill/>
           </a:ln>
         </p:spPr>
+        <p:style>
+          <a:lnRef idx="0"/>
+          <a:fillRef idx="0"/>
+          <a:effectRef idx="0"/>
+          <a:fontRef idx="minor"/>
+        </p:style>
         <p:txBody>
           <a:bodyPr lIns="0" rIns="0" tIns="0" bIns="0"/>
           <a:p>
             <a:r>
-              <a:rPr lang="en-US" sz="3200">
-                <a:latin typeface="Arial"/>
-              </a:rPr>
-              <a:t>The NeCTAR image catalogue can be found at:</a:t>
-            </a:r>
-            <a:endParaRPr/>
-          </a:p>
-          <a:p>
-            <a:r>
-              <a:rPr lang="en-US" sz="3200">
-                <a:latin typeface="Arial"/>
-              </a:rPr>
-              <a:t>https://wiki.rc.nectar.org.au/wiki/Image_Catalog</a:t>
-            </a:r>
-            <a:endParaRPr/>
-          </a:p>
-          <a:p>
-            <a:r>
-              <a:rPr lang="en-US" sz="3200">
-                <a:latin typeface="Arial"/>
-              </a:rPr>
-              <a:t>What Operating system is the Drupal server based on?</a:t>
-            </a:r>
-            <a:endParaRPr/>
-          </a:p>
-          <a:p>
-            <a:pPr>
-              <a:buFont typeface="StarSymbol"/>
-              <a:buAutoNum type="alphaUcParenR"/>
-            </a:pPr>
-            <a:r>
-              <a:rPr lang="en-US" sz="3200">
-                <a:latin typeface="Arial"/>
-              </a:rPr>
-              <a:t> </a:t>
-            </a:r>
-            <a:r>
-              <a:rPr lang="en-US" sz="3200">
-                <a:latin typeface="Arial"/>
-              </a:rPr>
-              <a:t>Fedora</a:t>
-            </a:r>
-            <a:endParaRPr/>
-          </a:p>
-          <a:p>
-            <a:pPr>
-              <a:buFont typeface="StarSymbol"/>
-              <a:buAutoNum type="alphaUcParenR"/>
-            </a:pPr>
-            <a:r>
-              <a:rPr lang="en-US" sz="3200">
-                <a:latin typeface="Arial"/>
-              </a:rPr>
-              <a:t> </a:t>
-            </a:r>
-            <a:r>
-              <a:rPr lang="en-US" sz="3200">
-                <a:latin typeface="Arial"/>
-              </a:rPr>
-              <a:t>Debian</a:t>
-            </a:r>
-            <a:endParaRPr/>
-          </a:p>
-          <a:p>
-            <a:pPr>
-              <a:buFont typeface="StarSymbol"/>
-              <a:buAutoNum type="alphaUcParenR"/>
-            </a:pPr>
-            <a:r>
-              <a:rPr lang="en-US" sz="3200">
-                <a:latin typeface="Arial"/>
-              </a:rPr>
-              <a:t> </a:t>
-            </a:r>
-            <a:r>
-              <a:rPr lang="en-US" sz="3200">
-                <a:latin typeface="Arial"/>
-              </a:rPr>
-              <a:t>Centos</a:t>
-            </a:r>
-            <a:endParaRPr/>
-          </a:p>
-          <a:p>
-            <a:pPr>
-              <a:buFont typeface="StarSymbol"/>
-              <a:buAutoNum type="alphaUcParenR"/>
-            </a:pPr>
-            <a:r>
-              <a:rPr lang="en-US" sz="3200">
-                <a:latin typeface="Arial"/>
-              </a:rPr>
-              <a:t> </a:t>
-            </a:r>
-            <a:r>
-              <a:rPr lang="en-US" sz="3200">
-                <a:latin typeface="Arial"/>
-              </a:rPr>
-              <a:t>Ubuntu</a:t>
-            </a:r>
-            <a:endParaRPr/>
-          </a:p>
-          <a:p>
-            <a:pPr>
-              <a:buFont typeface="StarSymbol"/>
-              <a:buAutoNum type="alphaUcParenR"/>
-            </a:pPr>
-            <a:r>
-              <a:rPr lang="en-US" sz="3200">
-                <a:latin typeface="Arial"/>
-              </a:rPr>
-              <a:t> </a:t>
-            </a:r>
-            <a:r>
-              <a:rPr lang="en-US" sz="3200">
-                <a:latin typeface="Arial"/>
-              </a:rPr>
-              <a:t>Scientific Linux</a:t>
-            </a:r>
-            <a:endParaRPr/>
-          </a:p>
-          <a:p>
-            <a:pPr algn="ctr"/>
-            <a:r>
-              <a:rPr b="1" lang="en-US" sz="3600">
-                <a:latin typeface="Arial"/>
-              </a:rPr>
-              <a:t>? </a:t>
+              <a:rPr i="1" lang="en-US" sz="2000" strike="noStrike">
+                <a:solidFill>
+                  <a:srgbClr val="808080"/>
+                </a:solidFill>
+                <a:latin typeface="Menlo"/>
+                <a:ea typeface="Menlo"/>
+              </a:rPr>
+              <a:t>```bash</a:t>
+            </a:r>
+            <a:endParaRPr/>
+          </a:p>
+          <a:p>
+            <a:r>
+              <a:rPr i="1" lang="en-US" sz="2000" strike="noStrike">
+                <a:solidFill>
+                  <a:srgbClr val="808080"/>
+                </a:solidFill>
+                <a:latin typeface="Menlo"/>
+                <a:ea typeface="Menlo"/>
+              </a:rPr>
+              <a:t>@@@@@@@@@@@@@@@@@@@@@@@@@@@@@@@@@@@@@@@@@@@@@@@@@@@@@@@@@@@</a:t>
+            </a:r>
+            <a:endParaRPr/>
+          </a:p>
+          <a:p>
+            <a:r>
+              <a:rPr i="1" lang="en-US" sz="2000" strike="noStrike">
+                <a:solidFill>
+                  <a:srgbClr val="808080"/>
+                </a:solidFill>
+                <a:latin typeface="Menlo"/>
+                <a:ea typeface="Menlo"/>
+              </a:rPr>
+              <a:t>@         WARNING: UNPROTECTED PRIVATE KEY FILE!          @</a:t>
+            </a:r>
+            <a:endParaRPr/>
+          </a:p>
+          <a:p>
+            <a:r>
+              <a:rPr i="1" lang="en-US" sz="2000" strike="noStrike">
+                <a:solidFill>
+                  <a:srgbClr val="808080"/>
+                </a:solidFill>
+                <a:latin typeface="Menlo"/>
+                <a:ea typeface="Menlo"/>
+              </a:rPr>
+              <a:t>@@@@@@@@@@@@@@@@@@@@@@@@@@@@@@@@@@@@@@@@@@@@@@@@@@@@@@@@@@@</a:t>
+            </a:r>
+            <a:endParaRPr/>
+          </a:p>
+          <a:p>
+            <a:r>
+              <a:rPr i="1" lang="en-US" sz="2000" strike="noStrike">
+                <a:solidFill>
+                  <a:srgbClr val="808080"/>
+                </a:solidFill>
+                <a:latin typeface="Menlo"/>
+                <a:ea typeface="Menlo"/>
+              </a:rPr>
+              <a:t>Permissions 0777 for '.ssh/tut_dev.pem' are too open.</a:t>
+            </a:r>
+            <a:endParaRPr/>
+          </a:p>
+          <a:p>
+            <a:r>
+              <a:rPr i="1" lang="en-US" sz="2000" strike="noStrike">
+                <a:solidFill>
+                  <a:srgbClr val="808080"/>
+                </a:solidFill>
+                <a:latin typeface="Menlo"/>
+                <a:ea typeface="Menlo"/>
+              </a:rPr>
+              <a:t>It is required that your private key files are NOT accessible by others.</a:t>
+            </a:r>
+            <a:endParaRPr/>
+          </a:p>
+          <a:p>
+            <a:r>
+              <a:rPr i="1" lang="en-US" sz="2000" strike="noStrike">
+                <a:solidFill>
+                  <a:srgbClr val="808080"/>
+                </a:solidFill>
+                <a:latin typeface="Menlo"/>
+                <a:ea typeface="Menlo"/>
+              </a:rPr>
+              <a:t>This private key will be ignored.</a:t>
+            </a:r>
+            <a:endParaRPr/>
+          </a:p>
+          <a:p>
+            <a:r>
+              <a:rPr i="1" lang="en-US" sz="2000" strike="noStrike">
+                <a:solidFill>
+                  <a:srgbClr val="808080"/>
+                </a:solidFill>
+                <a:latin typeface="Menlo"/>
+                <a:ea typeface="Menlo"/>
+              </a:rPr>
+              <a:t>bad permissions: ignore key: .ssh/nectar_dev.pem</a:t>
+            </a:r>
+            <a:endParaRPr/>
+          </a:p>
+          <a:p>
+            <a:r>
+              <a:rPr i="1" lang="en-US" sz="2000" strike="noStrike">
+                <a:solidFill>
+                  <a:srgbClr val="808080"/>
+                </a:solidFill>
+                <a:latin typeface="Menlo"/>
+                <a:ea typeface="Menlo"/>
+              </a:rPr>
+              <a:t>ubuntu@144.6.225.224's password: </a:t>
             </a:r>
             <a:endParaRPr/>
           </a:p>
@@ -2308,14 +3606,14 @@
       </p:grpSpPr>
       <p:sp>
         <p:nvSpPr>
-          <p:cNvPr id="47" name="TextShape 1"/>
-          <p:cNvSpPr txBox="1"/>
+          <p:cNvPr id="81" name="CustomShape 1"/>
+          <p:cNvSpPr/>
           <p:nvPr/>
         </p:nvSpPr>
         <p:spPr>
           <a:xfrm>
             <a:off x="504000" y="301320"/>
-            <a:ext cx="9071640" cy="1262160"/>
+            <a:ext cx="9071280" cy="1261800"/>
           </a:xfrm>
           <a:prstGeom prst="rect">
             <a:avLst/>
@@ -2325,30 +3623,40 @@
             <a:noFill/>
           </a:ln>
         </p:spPr>
+        <p:style>
+          <a:lnRef idx="0"/>
+          <a:fillRef idx="0"/>
+          <a:effectRef idx="0"/>
+          <a:fontRef idx="minor"/>
+        </p:style>
         <p:txBody>
           <a:bodyPr lIns="0" rIns="0" tIns="0" bIns="0" anchor="ctr"/>
           <a:p>
-            <a:pPr algn="ctr"/>
-            <a:r>
-              <a:rPr b="1" lang="en-US" sz="4400">
-                <a:latin typeface="Arial"/>
-              </a:rPr>
-              <a:t>Is this a your error message?</a:t>
-            </a:r>
-            <a:endParaRPr/>
-          </a:p>
-        </p:txBody>
-      </p:sp>
-      <p:sp>
-        <p:nvSpPr>
-          <p:cNvPr id="48" name="TextShape 2"/>
-          <p:cNvSpPr txBox="1"/>
+            <a:pPr algn="ctr">
+              <a:lnSpc>
+                <a:spcPct val="100000"/>
+              </a:lnSpc>
+            </a:pPr>
+            <a:r>
+              <a:rPr b="1" lang="en-US" sz="4400" strike="noStrike">
+                <a:latin typeface="Arial"/>
+              </a:rPr>
+              <a:t>Another command!</a:t>
+            </a:r>
+            <a:endParaRPr/>
+          </a:p>
+        </p:txBody>
+      </p:sp>
+      <p:sp>
+        <p:nvSpPr>
+          <p:cNvPr id="82" name="CustomShape 2"/>
+          <p:cNvSpPr/>
           <p:nvPr/>
         </p:nvSpPr>
         <p:spPr>
           <a:xfrm>
             <a:off x="504000" y="1769040"/>
-            <a:ext cx="9071640" cy="4384440"/>
+            <a:ext cx="9071280" cy="4384080"/>
           </a:xfrm>
           <a:prstGeom prst="rect">
             <a:avLst/>
@@ -2358,187 +3666,102 @@
             <a:noFill/>
           </a:ln>
         </p:spPr>
+        <p:style>
+          <a:lnRef idx="0"/>
+          <a:fillRef idx="0"/>
+          <a:effectRef idx="0"/>
+          <a:fontRef idx="minor"/>
+        </p:style>
         <p:txBody>
           <a:bodyPr lIns="0" rIns="0" tIns="0" bIns="0"/>
           <a:p>
             <a:r>
-              <a:rPr i="1" lang="en-US" sz="2000" strike="noStrike">
+              <a:rPr lang="en-US" sz="3200" strike="noStrike">
+                <a:latin typeface="Arial"/>
+              </a:rPr>
+              <a:t>chmod (</a:t>
+            </a:r>
+            <a:r>
+              <a:rPr b="1" lang="en-US" sz="3200" strike="noStrike">
+                <a:latin typeface="Arial"/>
+              </a:rPr>
+              <a:t>ch</a:t>
+            </a:r>
+            <a:r>
+              <a:rPr lang="en-US" sz="3200" strike="noStrike">
+                <a:latin typeface="Arial"/>
+              </a:rPr>
+              <a:t>ange file </a:t>
+            </a:r>
+            <a:r>
+              <a:rPr b="1" lang="en-US" sz="3200" strike="noStrike">
+                <a:latin typeface="Arial"/>
+              </a:rPr>
+              <a:t>mod</a:t>
+            </a:r>
+            <a:r>
+              <a:rPr lang="en-US" sz="3200" strike="noStrike">
+                <a:latin typeface="Arial"/>
+              </a:rPr>
+              <a:t>e)</a:t>
+            </a:r>
+            <a:endParaRPr/>
+          </a:p>
+          <a:p>
+            <a:endParaRPr/>
+          </a:p>
+          <a:p>
+            <a:r>
+              <a:rPr lang="en-US" sz="3200" strike="noStrike">
+                <a:latin typeface="Arial"/>
+              </a:rPr>
+              <a:t>Form:</a:t>
+            </a:r>
+            <a:endParaRPr/>
+          </a:p>
+          <a:p>
+            <a:r>
+              <a:rPr i="1" lang="en-US" sz="3200" strike="noStrike">
                 <a:solidFill>
                   <a:srgbClr val="808080"/>
                 </a:solidFill>
                 <a:latin typeface="Menlo"/>
                 <a:ea typeface="Menlo"/>
               </a:rPr>
-              <a:t>```bash</a:t>
-            </a:r>
-            <a:r>
-              <a:rPr i="1" lang="en-US" sz="2000" strike="noStrike">
+              <a:t>chmod &lt;mode&gt; &lt;file&gt;</a:t>
+            </a:r>
+            <a:endParaRPr/>
+          </a:p>
+          <a:p>
+            <a:endParaRPr/>
+          </a:p>
+          <a:p>
+            <a:r>
+              <a:rPr lang="en-US" sz="3200" strike="noStrike">
+                <a:solidFill>
+                  <a:srgbClr val="000000"/>
+                </a:solidFill>
+                <a:latin typeface="Arial"/>
+                <a:ea typeface="Menlo"/>
+              </a:rPr>
+              <a:t>Eg:</a:t>
+            </a:r>
+            <a:endParaRPr/>
+          </a:p>
+          <a:p>
+            <a:r>
+              <a:rPr lang="en-US" sz="3200" strike="noStrike">
                 <a:solidFill>
                   <a:srgbClr val="808080"/>
                 </a:solidFill>
                 <a:latin typeface="Menlo"/>
                 <a:ea typeface="Menlo"/>
               </a:rPr>
-              <a:t>
-</a:t>
-            </a:r>
-            <a:r>
-              <a:rPr i="1" lang="en-US" sz="2000" strike="noStrike">
-                <a:solidFill>
-                  <a:srgbClr val="808080"/>
-                </a:solidFill>
-                <a:latin typeface="Menlo"/>
-                <a:ea typeface="Menlo"/>
-              </a:rPr>
-              <a:t>@@@@@@@@@@@@@@@@@@@@@@@@@@@@@@@@@@@@@@@@@@@@@@@@@@@@@@@@@@@</a:t>
-            </a:r>
-            <a:r>
-              <a:rPr i="1" lang="en-US" sz="2000" strike="noStrike">
-                <a:solidFill>
-                  <a:srgbClr val="808080"/>
-                </a:solidFill>
-                <a:latin typeface="Menlo"/>
-                <a:ea typeface="Menlo"/>
-              </a:rPr>
-              <a:t>
-</a:t>
-            </a:r>
-            <a:r>
-              <a:rPr i="1" lang="en-US" sz="2000" strike="noStrike">
-                <a:solidFill>
-                  <a:srgbClr val="808080"/>
-                </a:solidFill>
-                <a:latin typeface="Menlo"/>
-                <a:ea typeface="Menlo"/>
-              </a:rPr>
-              <a:t>@         WARNING: UNPROTECTED PRIVATE KEY FILE!          @</a:t>
-            </a:r>
-            <a:r>
-              <a:rPr i="1" lang="en-US" sz="2000" strike="noStrike">
-                <a:solidFill>
-                  <a:srgbClr val="808080"/>
-                </a:solidFill>
-                <a:latin typeface="Menlo"/>
-                <a:ea typeface="Menlo"/>
-              </a:rPr>
-              <a:t>
-</a:t>
-            </a:r>
-            <a:r>
-              <a:rPr i="1" lang="en-US" sz="2000" strike="noStrike">
-                <a:solidFill>
-                  <a:srgbClr val="808080"/>
-                </a:solidFill>
-                <a:latin typeface="Menlo"/>
-                <a:ea typeface="Menlo"/>
-              </a:rPr>
-              <a:t>@@@@@@@@@@@@@@@@@@@@@@@@@@@@@@@@@@@@@@@@@@@@@@@@@@@@@@@@@@@</a:t>
-            </a:r>
-            <a:r>
-              <a:rPr i="1" lang="en-US" sz="2000" strike="noStrike">
-                <a:solidFill>
-                  <a:srgbClr val="808080"/>
-                </a:solidFill>
-                <a:latin typeface="Menlo"/>
-                <a:ea typeface="Menlo"/>
-              </a:rPr>
-              <a:t>
-</a:t>
-            </a:r>
-            <a:r>
-              <a:rPr i="1" lang="en-US" sz="2000" strike="noStrike">
-                <a:solidFill>
-                  <a:srgbClr val="808080"/>
-                </a:solidFill>
-                <a:latin typeface="Menlo"/>
-                <a:ea typeface="Menlo"/>
-              </a:rPr>
-              <a:t>Permissions 0777 for '.ssh/tut_dev.pem' are too open.</a:t>
-            </a:r>
-            <a:r>
-              <a:rPr i="1" lang="en-US" sz="2000" strike="noStrike">
-                <a:solidFill>
-                  <a:srgbClr val="808080"/>
-                </a:solidFill>
-                <a:latin typeface="Menlo"/>
-                <a:ea typeface="Menlo"/>
-              </a:rPr>
-              <a:t>
-</a:t>
-            </a:r>
-            <a:r>
-              <a:rPr i="1" lang="en-US" sz="2000" strike="noStrike">
-                <a:solidFill>
-                  <a:srgbClr val="808080"/>
-                </a:solidFill>
-                <a:latin typeface="Menlo"/>
-                <a:ea typeface="Menlo"/>
-              </a:rPr>
-              <a:t>It is required that your private key files are NOT accessible by others.</a:t>
-            </a:r>
-            <a:r>
-              <a:rPr i="1" lang="en-US" sz="2000" strike="noStrike">
-                <a:solidFill>
-                  <a:srgbClr val="808080"/>
-                </a:solidFill>
-                <a:latin typeface="Menlo"/>
-                <a:ea typeface="Menlo"/>
-              </a:rPr>
-              <a:t>
-</a:t>
-            </a:r>
-            <a:r>
-              <a:rPr i="1" lang="en-US" sz="2000" strike="noStrike">
-                <a:solidFill>
-                  <a:srgbClr val="808080"/>
-                </a:solidFill>
-                <a:latin typeface="Menlo"/>
-                <a:ea typeface="Menlo"/>
-              </a:rPr>
-              <a:t>This private key will be ignored.</a:t>
-            </a:r>
-            <a:r>
-              <a:rPr i="1" lang="en-US" sz="2000" strike="noStrike">
-                <a:solidFill>
-                  <a:srgbClr val="808080"/>
-                </a:solidFill>
-                <a:latin typeface="Menlo"/>
-                <a:ea typeface="Menlo"/>
-              </a:rPr>
-              <a:t>
-</a:t>
-            </a:r>
-            <a:r>
-              <a:rPr i="1" lang="en-US" sz="2000" strike="noStrike">
-                <a:solidFill>
-                  <a:srgbClr val="808080"/>
-                </a:solidFill>
-                <a:latin typeface="Menlo"/>
-                <a:ea typeface="Menlo"/>
-              </a:rPr>
-              <a:t>bad permissions: ignore key: .ssh/nectar_dev.pem</a:t>
-            </a:r>
-            <a:r>
-              <a:rPr i="1" lang="en-US" sz="2000" strike="noStrike">
-                <a:solidFill>
-                  <a:srgbClr val="808080"/>
-                </a:solidFill>
-                <a:latin typeface="Menlo"/>
-                <a:ea typeface="Menlo"/>
-              </a:rPr>
-              <a:t>
-</a:t>
-            </a:r>
-            <a:r>
-              <a:rPr i="1" lang="en-US" sz="2000" strike="noStrike">
-                <a:solidFill>
-                  <a:srgbClr val="808080"/>
-                </a:solidFill>
-                <a:latin typeface="Menlo"/>
-                <a:ea typeface="Menlo"/>
-              </a:rPr>
-              <a:t>ubuntu@144.6.225.224's password: </a:t>
-            </a:r>
+              <a:t>chmod u=rw,go-rwx tut_dev.pem </a:t>
+            </a:r>
+            <a:endParaRPr/>
+          </a:p>
+          <a:p>
             <a:endParaRPr/>
           </a:p>
         </p:txBody>
@@ -2594,14 +3817,14 @@
       </p:grpSpPr>
       <p:sp>
         <p:nvSpPr>
-          <p:cNvPr id="49" name="TextShape 1"/>
-          <p:cNvSpPr txBox="1"/>
+          <p:cNvPr id="83" name="CustomShape 1"/>
+          <p:cNvSpPr/>
           <p:nvPr/>
         </p:nvSpPr>
         <p:spPr>
           <a:xfrm>
             <a:off x="504000" y="301320"/>
-            <a:ext cx="9071640" cy="1262160"/>
+            <a:ext cx="9071280" cy="1261800"/>
           </a:xfrm>
           <a:prstGeom prst="rect">
             <a:avLst/>
@@ -2611,30 +3834,40 @@
             <a:noFill/>
           </a:ln>
         </p:spPr>
+        <p:style>
+          <a:lnRef idx="0"/>
+          <a:fillRef idx="0"/>
+          <a:effectRef idx="0"/>
+          <a:fontRef idx="minor"/>
+        </p:style>
         <p:txBody>
           <a:bodyPr lIns="0" rIns="0" tIns="0" bIns="0" anchor="ctr"/>
           <a:p>
-            <a:pPr algn="ctr"/>
-            <a:r>
-              <a:rPr b="1" lang="en-US" sz="4400">
-                <a:latin typeface="Arial"/>
-              </a:rPr>
-              <a:t>Another command!</a:t>
-            </a:r>
-            <a:endParaRPr/>
-          </a:p>
-        </p:txBody>
-      </p:sp>
-      <p:sp>
-        <p:nvSpPr>
-          <p:cNvPr id="50" name="TextShape 2"/>
-          <p:cNvSpPr txBox="1"/>
+            <a:pPr algn="ctr">
+              <a:lnSpc>
+                <a:spcPct val="100000"/>
+              </a:lnSpc>
+            </a:pPr>
+            <a:r>
+              <a:rPr b="1" lang="en-US" sz="4400" strike="noStrike">
+                <a:latin typeface="Arial"/>
+              </a:rPr>
+              <a:t>Are you there yet?</a:t>
+            </a:r>
+            <a:endParaRPr/>
+          </a:p>
+        </p:txBody>
+      </p:sp>
+      <p:sp>
+        <p:nvSpPr>
+          <p:cNvPr id="84" name="CustomShape 2"/>
+          <p:cNvSpPr/>
           <p:nvPr/>
         </p:nvSpPr>
         <p:spPr>
           <a:xfrm>
             <a:off x="504000" y="1769040"/>
-            <a:ext cx="9071640" cy="4384440"/>
+            <a:ext cx="9071280" cy="4384080"/>
           </a:xfrm>
           <a:prstGeom prst="rect">
             <a:avLst/>
@@ -2644,96 +3877,77 @@
             <a:noFill/>
           </a:ln>
         </p:spPr>
+        <p:style>
+          <a:lnRef idx="0"/>
+          <a:fillRef idx="0"/>
+          <a:effectRef idx="0"/>
+          <a:fontRef idx="minor"/>
+        </p:style>
         <p:txBody>
           <a:bodyPr lIns="0" rIns="0" tIns="0" bIns="0"/>
           <a:p>
             <a:r>
-              <a:rPr lang="en-US" sz="3200">
-                <a:latin typeface="Arial"/>
-              </a:rPr>
-              <a:t>chmod (</a:t>
-            </a:r>
-            <a:r>
-              <a:rPr b="1" lang="en-US" sz="3200">
-                <a:latin typeface="Arial"/>
-              </a:rPr>
-              <a:t>ch</a:t>
-            </a:r>
-            <a:r>
-              <a:rPr lang="en-US" sz="3200">
-                <a:latin typeface="Arial"/>
-              </a:rPr>
-              <a:t>ange file </a:t>
-            </a:r>
-            <a:r>
-              <a:rPr b="1" lang="en-US" sz="3200">
-                <a:latin typeface="Arial"/>
-              </a:rPr>
-              <a:t>mod</a:t>
-            </a:r>
-            <a:r>
-              <a:rPr lang="en-US" sz="3200">
-                <a:latin typeface="Arial"/>
-              </a:rPr>
-              <a:t>e)</a:t>
-            </a:r>
-            <a:endParaRPr/>
-          </a:p>
-          <a:p>
-            <a:endParaRPr/>
-          </a:p>
-          <a:p>
-            <a:r>
-              <a:rPr lang="en-US" sz="3200">
-                <a:latin typeface="Arial"/>
-              </a:rPr>
-              <a:t>Form:</a:t>
-            </a:r>
-            <a:endParaRPr/>
-          </a:p>
-          <a:p>
-            <a:r>
-              <a:rPr i="1" lang="en-US" sz="3200" strike="noStrike">
+              <a:rPr i="1" lang="en-US" sz="2000" strike="noStrike">
                 <a:solidFill>
                   <a:srgbClr val="808080"/>
                 </a:solidFill>
                 <a:latin typeface="Menlo"/>
                 <a:ea typeface="Menlo"/>
               </a:rPr>
-              <a:t>chmod &lt;mode&gt; &lt;file&gt;</a:t>
-            </a:r>
-            <a:endParaRPr/>
-          </a:p>
-          <a:p>
-            <a:endParaRPr/>
-          </a:p>
-          <a:p>
-            <a:r>
-              <a:rPr lang="en-US" sz="3200" strike="noStrike">
-                <a:solidFill>
-                  <a:srgbClr val="000000"/>
-                </a:solidFill>
-                <a:latin typeface="Arial"/>
-                <a:ea typeface="Menlo"/>
-              </a:rPr>
-              <a:t>Eg:</a:t>
-            </a:r>
-            <a:endParaRPr/>
-          </a:p>
-          <a:p>
-            <a:r>
-              <a:rPr lang="en-US" sz="3200" strike="noStrike">
+              <a:t>Welcome to Ubuntu 14.04.2 LTS (GNU/Linux 3.13.0-36-generic x86_64)</a:t>
+            </a:r>
+            <a:endParaRPr/>
+          </a:p>
+          <a:p>
+            <a:endParaRPr/>
+          </a:p>
+          <a:p>
+            <a:r>
+              <a:rPr i="1" lang="en-US" sz="2000" strike="noStrike">
                 <a:solidFill>
                   <a:srgbClr val="808080"/>
                 </a:solidFill>
                 <a:latin typeface="Menlo"/>
                 <a:ea typeface="Menlo"/>
               </a:rPr>
-              <a:t>chmod u=rw,go-rwx tut_dev.pem </a:t>
-            </a:r>
-            <a:endParaRPr/>
-          </a:p>
-          <a:p>
+              <a:t> </a:t>
+            </a:r>
+            <a:r>
+              <a:rPr i="1" lang="en-US" sz="2000" strike="noStrike">
+                <a:solidFill>
+                  <a:srgbClr val="808080"/>
+                </a:solidFill>
+                <a:latin typeface="Menlo"/>
+                <a:ea typeface="Menlo"/>
+              </a:rPr>
+              <a:t>* Documentation:  https://help.ubuntu.com/</a:t>
+            </a:r>
+            <a:endParaRPr/>
+          </a:p>
+          <a:p>
+            <a:r>
+              <a:rPr i="1" lang="en-US" sz="2000" strike="noStrike">
+                <a:solidFill>
+                  <a:srgbClr val="808080"/>
+                </a:solidFill>
+                <a:latin typeface="Menlo"/>
+                <a:ea typeface="Menlo"/>
+              </a:rPr>
+              <a:t>Last login: Mon Mar 30 01:27:13 2015 from vpac.org</a:t>
+            </a:r>
+            <a:endParaRPr/>
+          </a:p>
+          <a:p>
+            <a:r>
+              <a:rPr i="1" lang="en-US" sz="2000" strike="noStrike">
+                <a:solidFill>
+                  <a:srgbClr val="808080"/>
+                </a:solidFill>
+                <a:latin typeface="Menlo"/>
+                <a:ea typeface="Menlo"/>
+              </a:rPr>
+              <a:t>ubuntu@rstudio:~$ </a:t>
+            </a:r>
             <a:endParaRPr/>
           </a:p>
         </p:txBody>
@@ -2789,14 +4003,14 @@
       </p:grpSpPr>
       <p:sp>
         <p:nvSpPr>
-          <p:cNvPr id="51" name="TextShape 1"/>
-          <p:cNvSpPr txBox="1"/>
+          <p:cNvPr id="85" name="CustomShape 1"/>
+          <p:cNvSpPr/>
           <p:nvPr/>
         </p:nvSpPr>
         <p:spPr>
           <a:xfrm>
             <a:off x="504000" y="301320"/>
-            <a:ext cx="9071640" cy="1262160"/>
+            <a:ext cx="9071280" cy="1261800"/>
           </a:xfrm>
           <a:prstGeom prst="rect">
             <a:avLst/>
@@ -2806,30 +4020,40 @@
             <a:noFill/>
           </a:ln>
         </p:spPr>
+        <p:style>
+          <a:lnRef idx="0"/>
+          <a:fillRef idx="0"/>
+          <a:effectRef idx="0"/>
+          <a:fontRef idx="minor"/>
+        </p:style>
         <p:txBody>
           <a:bodyPr lIns="0" rIns="0" tIns="0" bIns="0" anchor="ctr"/>
           <a:p>
-            <a:pPr algn="ctr"/>
-            <a:r>
-              <a:rPr b="1" lang="en-US" sz="4400">
-                <a:latin typeface="Arial"/>
-              </a:rPr>
-              <a:t>Are you there yet?</a:t>
-            </a:r>
-            <a:endParaRPr/>
-          </a:p>
-        </p:txBody>
-      </p:sp>
-      <p:sp>
-        <p:nvSpPr>
-          <p:cNvPr id="52" name="TextShape 2"/>
-          <p:cNvSpPr txBox="1"/>
+            <a:pPr algn="ctr">
+              <a:lnSpc>
+                <a:spcPct val="100000"/>
+              </a:lnSpc>
+            </a:pPr>
+            <a:r>
+              <a:rPr b="1" lang="en-US" sz="4400" strike="noStrike">
+                <a:latin typeface="Arial"/>
+              </a:rPr>
+              <a:t>Did you get?</a:t>
+            </a:r>
+            <a:endParaRPr/>
+          </a:p>
+        </p:txBody>
+      </p:sp>
+      <p:sp>
+        <p:nvSpPr>
+          <p:cNvPr id="86" name="CustomShape 2"/>
+          <p:cNvSpPr/>
           <p:nvPr/>
         </p:nvSpPr>
         <p:spPr>
           <a:xfrm>
             <a:off x="504000" y="1769040"/>
-            <a:ext cx="9071640" cy="4384440"/>
+            <a:ext cx="9071280" cy="4384080"/>
           </a:xfrm>
           <a:prstGeom prst="rect">
             <a:avLst/>
@@ -2839,93 +4063,76 @@
             <a:noFill/>
           </a:ln>
         </p:spPr>
+        <p:style>
+          <a:lnRef idx="0"/>
+          <a:fillRef idx="0"/>
+          <a:effectRef idx="0"/>
+          <a:fontRef idx="minor"/>
+        </p:style>
         <p:txBody>
           <a:bodyPr lIns="0" rIns="0" tIns="0" bIns="0"/>
           <a:p>
             <a:r>
-              <a:rPr i="1" lang="en-US" sz="2000" strike="noStrike">
+              <a:rPr lang="en-US" sz="3200" strike="noStrike">
+                <a:latin typeface="Menlo"/>
+              </a:rPr>
+              <a:t>$ apt-get update</a:t>
+            </a:r>
+            <a:endParaRPr/>
+          </a:p>
+          <a:p>
+            <a:r>
+              <a:rPr i="1" lang="en-US" strike="noStrike">
                 <a:solidFill>
                   <a:srgbClr val="808080"/>
                 </a:solidFill>
                 <a:latin typeface="Menlo"/>
                 <a:ea typeface="Menlo"/>
               </a:rPr>
-              <a:t>Welcome to Ubuntu 14.04.2 LTS (GNU/Linux 3.13.0-36-generic x86_64)</a:t>
-            </a:r>
-            <a:r>
-              <a:rPr i="1" lang="en-US" sz="2000" strike="noStrike">
+              <a:t>E: Could not open lock file /var/lib/apt/lists/lock - open (13: Permission denied)</a:t>
+            </a:r>
+            <a:endParaRPr/>
+          </a:p>
+          <a:p>
+            <a:r>
+              <a:rPr i="1" lang="en-US" strike="noStrike">
                 <a:solidFill>
                   <a:srgbClr val="808080"/>
                 </a:solidFill>
                 <a:latin typeface="Menlo"/>
                 <a:ea typeface="Menlo"/>
               </a:rPr>
-              <a:t>
-</a:t>
-            </a:r>
-            <a:r>
-              <a:rPr i="1" lang="en-US" sz="2000" strike="noStrike">
+              <a:t>E: Unable to lock directory /var/lib/apt/lists/</a:t>
+            </a:r>
+            <a:endParaRPr/>
+          </a:p>
+          <a:p>
+            <a:r>
+              <a:rPr i="1" lang="en-US" strike="noStrike">
                 <a:solidFill>
                   <a:srgbClr val="808080"/>
                 </a:solidFill>
                 <a:latin typeface="Menlo"/>
                 <a:ea typeface="Menlo"/>
               </a:rPr>
-              <a:t>
-</a:t>
-            </a:r>
-            <a:r>
-              <a:rPr i="1" lang="en-US" sz="2000" strike="noStrike">
+              <a:t>E: Could not open lock file /var/lib/dpkg/lock - open (13: Permission denied)</a:t>
+            </a:r>
+            <a:endParaRPr/>
+          </a:p>
+          <a:p>
+            <a:r>
+              <a:rPr i="1" lang="en-US" strike="noStrike">
                 <a:solidFill>
                   <a:srgbClr val="808080"/>
                 </a:solidFill>
                 <a:latin typeface="Menlo"/>
                 <a:ea typeface="Menlo"/>
               </a:rPr>
-              <a:t> * Documentation:  https://help.ubuntu.com/</a:t>
-            </a:r>
-            <a:r>
-              <a:rPr i="1" lang="en-US" sz="2000" strike="noStrike">
-                <a:solidFill>
-                  <a:srgbClr val="808080"/>
-                </a:solidFill>
-                <a:latin typeface="Menlo"/>
-                <a:ea typeface="Menlo"/>
-              </a:rPr>
-              <a:t>
-</a:t>
-            </a:r>
-            <a:r>
-              <a:rPr i="1" lang="en-US" sz="2000" strike="noStrike">
-                <a:solidFill>
-                  <a:srgbClr val="808080"/>
-                </a:solidFill>
-                <a:latin typeface="Menlo"/>
-                <a:ea typeface="Menlo"/>
-              </a:rPr>
-              <a:t>Last login: Mon Mar 30 01:27:13 2015 from vpac.org</a:t>
-            </a:r>
-            <a:r>
-              <a:rPr i="1" lang="en-US" sz="2000" strike="noStrike">
-                <a:solidFill>
-                  <a:srgbClr val="808080"/>
-                </a:solidFill>
-                <a:latin typeface="Menlo"/>
-                <a:ea typeface="Menlo"/>
-              </a:rPr>
-              <a:t>
-</a:t>
-            </a:r>
-            <a:r>
-              <a:rPr i="1" lang="en-US" sz="2000" strike="noStrike">
-                <a:solidFill>
-                  <a:srgbClr val="808080"/>
-                </a:solidFill>
-                <a:latin typeface="Menlo"/>
-                <a:ea typeface="Menlo"/>
-              </a:rPr>
-              <a:t>ubuntu@rstudio:~$ </a:t>
-            </a:r>
+              <a:t>E: Unable to lock the administration directory (/var/lib/dpkg/), are you root?</a:t>
+            </a:r>
+            <a:endParaRPr/>
+          </a:p>
+          <a:p>
             <a:endParaRPr/>
           </a:p>
         </p:txBody>
@@ -2981,14 +4188,14 @@
       </p:grpSpPr>
       <p:sp>
         <p:nvSpPr>
-          <p:cNvPr id="53" name="TextShape 1"/>
-          <p:cNvSpPr txBox="1"/>
+          <p:cNvPr id="87" name="CustomShape 1"/>
+          <p:cNvSpPr/>
           <p:nvPr/>
         </p:nvSpPr>
         <p:spPr>
           <a:xfrm>
             <a:off x="504000" y="301320"/>
-            <a:ext cx="9071640" cy="1262160"/>
+            <a:ext cx="9071280" cy="1261800"/>
           </a:xfrm>
           <a:prstGeom prst="rect">
             <a:avLst/>
@@ -2998,30 +4205,46 @@
             <a:noFill/>
           </a:ln>
         </p:spPr>
+        <p:style>
+          <a:lnRef idx="0"/>
+          <a:fillRef idx="0"/>
+          <a:effectRef idx="0"/>
+          <a:fontRef idx="minor"/>
+        </p:style>
         <p:txBody>
           <a:bodyPr lIns="0" rIns="0" tIns="0" bIns="0" anchor="ctr"/>
           <a:p>
-            <a:pPr algn="ctr"/>
-            <a:r>
-              <a:rPr b="1" lang="en-US" sz="4400">
-                <a:latin typeface="Arial"/>
-              </a:rPr>
-              <a:t>Did you get?</a:t>
-            </a:r>
-            <a:endParaRPr/>
-          </a:p>
-        </p:txBody>
-      </p:sp>
-      <p:sp>
-        <p:nvSpPr>
-          <p:cNvPr id="54" name="TextShape 2"/>
-          <p:cNvSpPr txBox="1"/>
+            <a:pPr algn="ctr">
+              <a:lnSpc>
+                <a:spcPct val="100000"/>
+              </a:lnSpc>
+            </a:pPr>
+            <a:r>
+              <a:rPr b="1" lang="en-US" sz="4400" strike="noStrike">
+                <a:latin typeface="Arial"/>
+              </a:rPr>
+              <a:t>sudo</a:t>
+            </a:r>
+            <a:r>
+              <a:rPr lang="en-US" sz="4400" strike="noStrike">
+                <a:latin typeface="Arial"/>
+              </a:rPr>
+              <a:t> to the rescue!</a:t>
+            </a:r>
+            <a:endParaRPr/>
+          </a:p>
+        </p:txBody>
+      </p:sp>
+      <p:sp>
+        <p:nvSpPr>
+          <p:cNvPr id="88" name="CustomShape 2"/>
+          <p:cNvSpPr/>
           <p:nvPr/>
         </p:nvSpPr>
         <p:spPr>
           <a:xfrm>
-            <a:off x="504000" y="1769040"/>
-            <a:ext cx="9071640" cy="4384440"/>
+            <a:off x="504000" y="1805040"/>
+            <a:ext cx="9071280" cy="4384080"/>
           </a:xfrm>
           <a:prstGeom prst="rect">
             <a:avLst/>
@@ -3031,90 +4254,97 @@
             <a:noFill/>
           </a:ln>
         </p:spPr>
+        <p:style>
+          <a:lnRef idx="0"/>
+          <a:fillRef idx="0"/>
+          <a:effectRef idx="0"/>
+          <a:fontRef idx="minor"/>
+        </p:style>
         <p:txBody>
           <a:bodyPr lIns="0" rIns="0" tIns="0" bIns="0"/>
           <a:p>
             <a:r>
-              <a:rPr lang="en-US" sz="3200">
+              <a:rPr lang="en-US" sz="3200" strike="noStrike">
                 <a:latin typeface="Menlo"/>
               </a:rPr>
-              <a:t>$ apt-get update</a:t>
-            </a:r>
-            <a:endParaRPr/>
-          </a:p>
-          <a:p>
-            <a:r>
-              <a:rPr i="1" lang="en-US" strike="noStrike">
+              <a:t>sudo</a:t>
+            </a:r>
+            <a:r>
+              <a:rPr lang="en-US" sz="3200" strike="noStrike">
+                <a:latin typeface="Arial"/>
+              </a:rPr>
+              <a:t> (</a:t>
+            </a:r>
+            <a:r>
+              <a:rPr b="1" lang="en-US" sz="3200" strike="noStrike">
+                <a:latin typeface="Arial"/>
+              </a:rPr>
+              <a:t>s</a:t>
+            </a:r>
+            <a:r>
+              <a:rPr lang="en-US" sz="3200" strike="noStrike">
+                <a:latin typeface="Arial"/>
+              </a:rPr>
+              <a:t>uper </a:t>
+            </a:r>
+            <a:r>
+              <a:rPr b="1" lang="en-US" sz="3200" strike="noStrike">
+                <a:latin typeface="Arial"/>
+              </a:rPr>
+              <a:t>u</a:t>
+            </a:r>
+            <a:r>
+              <a:rPr lang="en-US" sz="3200" strike="noStrike">
+                <a:latin typeface="Arial"/>
+              </a:rPr>
+              <a:t>ser </a:t>
+            </a:r>
+            <a:r>
+              <a:rPr b="1" lang="en-US" sz="3200" strike="noStrike">
+                <a:latin typeface="Arial"/>
+              </a:rPr>
+              <a:t>do</a:t>
+            </a:r>
+            <a:r>
+              <a:rPr lang="en-US" sz="3200" strike="noStrike">
+                <a:latin typeface="Arial"/>
+              </a:rPr>
+              <a:t>)</a:t>
+            </a:r>
+            <a:endParaRPr/>
+          </a:p>
+          <a:p>
+            <a:r>
+              <a:rPr lang="en-US" sz="3200" strike="noStrike">
+                <a:latin typeface="Arial"/>
+              </a:rPr>
+              <a:t>So:</a:t>
+            </a:r>
+            <a:endParaRPr/>
+          </a:p>
+          <a:p>
+            <a:r>
+              <a:rPr i="1" lang="en-US" sz="3200" strike="noStrike">
                 <a:solidFill>
                   <a:srgbClr val="808080"/>
                 </a:solidFill>
                 <a:latin typeface="Menlo"/>
                 <a:ea typeface="Menlo"/>
               </a:rPr>
-              <a:t>E: Could not open lock file /var/lib/apt/lists/lock - open (13: Permission denied)</a:t>
-            </a:r>
-            <a:r>
-              <a:rPr i="1" lang="en-US" strike="noStrike">
+              <a:t>sudo apt-get update</a:t>
+            </a:r>
+            <a:endParaRPr/>
+          </a:p>
+          <a:p>
+            <a:r>
+              <a:rPr i="1" lang="en-US" sz="3200" strike="noStrike">
                 <a:solidFill>
                   <a:srgbClr val="808080"/>
                 </a:solidFill>
                 <a:latin typeface="Menlo"/>
                 <a:ea typeface="Menlo"/>
               </a:rPr>
-              <a:t>
-</a:t>
-            </a:r>
-            <a:r>
-              <a:rPr i="1" lang="en-US" strike="noStrike">
-                <a:solidFill>
-                  <a:srgbClr val="808080"/>
-                </a:solidFill>
-                <a:latin typeface="Menlo"/>
-                <a:ea typeface="Menlo"/>
-              </a:rPr>
-              <a:t>E: Unable to lock directory /var/lib/apt/lists/</a:t>
-            </a:r>
-            <a:r>
-              <a:rPr i="1" lang="en-US" strike="noStrike">
-                <a:solidFill>
-                  <a:srgbClr val="808080"/>
-                </a:solidFill>
-                <a:latin typeface="Menlo"/>
-                <a:ea typeface="Menlo"/>
-              </a:rPr>
-              <a:t>
-</a:t>
-            </a:r>
-            <a:r>
-              <a:rPr i="1" lang="en-US" strike="noStrike">
-                <a:solidFill>
-                  <a:srgbClr val="808080"/>
-                </a:solidFill>
-                <a:latin typeface="Menlo"/>
-                <a:ea typeface="Menlo"/>
-              </a:rPr>
-              <a:t>E: Could not open lock file /var/lib/dpkg/lock - open (13: Permission denied)</a:t>
-            </a:r>
-            <a:r>
-              <a:rPr i="1" lang="en-US" strike="noStrike">
-                <a:solidFill>
-                  <a:srgbClr val="808080"/>
-                </a:solidFill>
-                <a:latin typeface="Menlo"/>
-                <a:ea typeface="Menlo"/>
-              </a:rPr>
-              <a:t>
-</a:t>
-            </a:r>
-            <a:r>
-              <a:rPr i="1" lang="en-US" strike="noStrike">
-                <a:solidFill>
-                  <a:srgbClr val="808080"/>
-                </a:solidFill>
-                <a:latin typeface="Menlo"/>
-                <a:ea typeface="Menlo"/>
-              </a:rPr>
-              <a:t>E: Unable to lock the administration directory (/var/lib/dpkg/), are you root?</a:t>
+              <a:t>sudo apt-get upgrade</a:t>
             </a:r>
             <a:endParaRPr/>
           </a:p>
@@ -3132,206 +4362,6 @@
           <p:childTnLst>
             <p:seq>
               <p:cTn id="16" nodeType="mainSeq"/>
-              <p:prevCondLst>
-                <p:cond delay="0" evt="onPrev">
-                  <p:tgtEl>
-                    <p:sldTgt/>
-                  </p:tgtEl>
-                </p:cond>
-              </p:prevCondLst>
-              <p:nextCondLst>
-                <p:cond delay="0" evt="onNext">
-                  <p:tgtEl>
-                    <p:sldTgt/>
-                  </p:tgtEl>
-                </p:cond>
-              </p:nextCondLst>
-            </p:seq>
-          </p:childTnLst>
-        </p:cTn>
-      </p:par>
-    </p:tnLst>
-  </p:timing>
-</p:sld>
-</file>
-
-<file path=ppt/slides/slide9.xml><?xml version="1.0" encoding="utf-8"?>
-<p:sld xmlns:a="http://schemas.openxmlformats.org/drawingml/2006/main" xmlns:p="http://schemas.openxmlformats.org/presentationml/2006/main" xmlns:r="http://schemas.openxmlformats.org/officeDocument/2006/relationships">
-  <p:cSld>
-    <p:spTree>
-      <p:nvGrpSpPr>
-        <p:cNvPr id="1" name=""/>
-        <p:cNvGrpSpPr/>
-        <p:nvPr/>
-      </p:nvGrpSpPr>
-      <p:grpSpPr>
-        <a:xfrm>
-          <a:off x="0" y="0"/>
-          <a:ext cx="0" cy="0"/>
-          <a:chOff x="0" y="0"/>
-          <a:chExt cx="0" cy="0"/>
-        </a:xfrm>
-      </p:grpSpPr>
-      <p:sp>
-        <p:nvSpPr>
-          <p:cNvPr id="55" name="TextShape 1"/>
-          <p:cNvSpPr txBox="1"/>
-          <p:nvPr/>
-        </p:nvSpPr>
-        <p:spPr>
-          <a:xfrm>
-            <a:off x="504000" y="301320"/>
-            <a:ext cx="9071640" cy="1262160"/>
-          </a:xfrm>
-          <a:prstGeom prst="rect">
-            <a:avLst/>
-          </a:prstGeom>
-          <a:noFill/>
-          <a:ln>
-            <a:noFill/>
-          </a:ln>
-        </p:spPr>
-        <p:txBody>
-          <a:bodyPr lIns="0" rIns="0" tIns="0" bIns="0" anchor="ctr"/>
-          <a:p>
-            <a:pPr algn="ctr"/>
-            <a:r>
-              <a:rPr b="1" lang="en-US" sz="4400">
-                <a:latin typeface="Arial"/>
-              </a:rPr>
-              <a:t>sudo</a:t>
-            </a:r>
-            <a:r>
-              <a:rPr lang="en-US" sz="4400">
-                <a:latin typeface="Arial"/>
-              </a:rPr>
-              <a:t> to the rescue!</a:t>
-            </a:r>
-            <a:endParaRPr/>
-          </a:p>
-        </p:txBody>
-      </p:sp>
-      <p:sp>
-        <p:nvSpPr>
-          <p:cNvPr id="56" name="TextShape 2"/>
-          <p:cNvSpPr txBox="1"/>
-          <p:nvPr/>
-        </p:nvSpPr>
-        <p:spPr>
-          <a:xfrm>
-            <a:off x="504000" y="1805040"/>
-            <a:ext cx="9071640" cy="4384440"/>
-          </a:xfrm>
-          <a:prstGeom prst="rect">
-            <a:avLst/>
-          </a:prstGeom>
-          <a:noFill/>
-          <a:ln>
-            <a:noFill/>
-          </a:ln>
-        </p:spPr>
-        <p:txBody>
-          <a:bodyPr lIns="0" rIns="0" tIns="0" bIns="0"/>
-          <a:p>
-            <a:r>
-              <a:rPr lang="en-US" sz="3200">
-                <a:latin typeface="Menlo"/>
-              </a:rPr>
-              <a:t>sudo</a:t>
-            </a:r>
-            <a:r>
-              <a:rPr lang="en-US" sz="3200">
-                <a:latin typeface="Arial"/>
-              </a:rPr>
-              <a:t> (</a:t>
-            </a:r>
-            <a:r>
-              <a:rPr b="1" lang="en-US" sz="3200">
-                <a:latin typeface="Arial"/>
-              </a:rPr>
-              <a:t>s</a:t>
-            </a:r>
-            <a:r>
-              <a:rPr lang="en-US" sz="3200">
-                <a:latin typeface="Arial"/>
-              </a:rPr>
-              <a:t>uper </a:t>
-            </a:r>
-            <a:r>
-              <a:rPr b="1" lang="en-US" sz="3200">
-                <a:latin typeface="Arial"/>
-              </a:rPr>
-              <a:t>u</a:t>
-            </a:r>
-            <a:r>
-              <a:rPr lang="en-US" sz="3200">
-                <a:latin typeface="Arial"/>
-              </a:rPr>
-              <a:t>ser </a:t>
-            </a:r>
-            <a:r>
-              <a:rPr b="1" lang="en-US" sz="3200">
-                <a:latin typeface="Arial"/>
-              </a:rPr>
-              <a:t>do</a:t>
-            </a:r>
-            <a:r>
-              <a:rPr lang="en-US" sz="3200">
-                <a:latin typeface="Arial"/>
-              </a:rPr>
-              <a:t>)</a:t>
-            </a:r>
-            <a:endParaRPr/>
-          </a:p>
-          <a:p>
-            <a:r>
-              <a:rPr lang="en-US" sz="3200">
-                <a:latin typeface="Arial"/>
-              </a:rPr>
-              <a:t>So:</a:t>
-            </a:r>
-            <a:endParaRPr/>
-          </a:p>
-          <a:p>
-            <a:r>
-              <a:rPr i="1" lang="en-US" sz="3200" strike="noStrike">
-                <a:solidFill>
-                  <a:srgbClr val="808080"/>
-                </a:solidFill>
-                <a:latin typeface="Menlo"/>
-                <a:ea typeface="Menlo"/>
-              </a:rPr>
-              <a:t>sudo apt-get update</a:t>
-            </a:r>
-            <a:endParaRPr/>
-          </a:p>
-          <a:p>
-            <a:r>
-              <a:rPr i="1" lang="en-US" sz="3200" strike="noStrike">
-                <a:solidFill>
-                  <a:srgbClr val="808080"/>
-                </a:solidFill>
-                <a:latin typeface="Menlo"/>
-                <a:ea typeface="Menlo"/>
-              </a:rPr>
-              <a:t>sudo apt-get upgrade</a:t>
-            </a:r>
-            <a:endParaRPr/>
-          </a:p>
-          <a:p>
-            <a:endParaRPr/>
-          </a:p>
-        </p:txBody>
-      </p:sp>
-    </p:spTree>
-  </p:cSld>
-  <p:timing>
-    <p:tnLst>
-      <p:par>
-        <p:cTn id="17" dur="indefinite" restart="never" nodeType="tmRoot">
-          <p:childTnLst>
-            <p:seq>
-              <p:cTn id="18" nodeType="mainSeq"/>
               <p:prevCondLst>
                 <p:cond delay="0" evt="onPrev">
                   <p:tgtEl>
@@ -3576,4 +4606,227 @@
     </a:fmtScheme>
   </a:themeElements>
 </a:theme>
+</file>
+
+<file path=ppt/theme/theme2.xml><?xml version="1.0" encoding="utf-8"?>
+<a:theme xmlns:a="http://schemas.openxmlformats.org/drawingml/2006/main" name="Office Theme">
+  <a:themeElements>
+    <a:clrScheme name="Office">
+      <a:dk1>
+        <a:sysClr val="windowText" lastClr="000000"/>
+      </a:dk1>
+      <a:lt1>
+        <a:sysClr val="window" lastClr="FFFFFF"/>
+      </a:lt1>
+      <a:dk2>
+        <a:srgbClr val="1F497D"/>
+      </a:dk2>
+      <a:lt2>
+        <a:srgbClr val="EEECE1"/>
+      </a:lt2>
+      <a:accent1>
+        <a:srgbClr val="4F81BD"/>
+      </a:accent1>
+      <a:accent2>
+        <a:srgbClr val="C0504D"/>
+      </a:accent2>
+      <a:accent3>
+        <a:srgbClr val="9BBB59"/>
+      </a:accent3>
+      <a:accent4>
+        <a:srgbClr val="8064A2"/>
+      </a:accent4>
+      <a:accent5>
+        <a:srgbClr val="4BACC6"/>
+      </a:accent5>
+      <a:accent6>
+        <a:srgbClr val="F79646"/>
+      </a:accent6>
+      <a:hlink>
+        <a:srgbClr val="0000FF"/>
+      </a:hlink>
+      <a:folHlink>
+        <a:srgbClr val="800080"/>
+      </a:folHlink>
+    </a:clrScheme>
+    <a:fontScheme name="Office">
+      <a:majorFont>
+        <a:latin typeface="Arial"/>
+        <a:ea typeface="DejaVu Sans"/>
+        <a:cs typeface="DejaVu Sans"/>
+      </a:majorFont>
+      <a:minorFont>
+        <a:latin typeface="Arial"/>
+        <a:ea typeface="DejaVu Sans"/>
+        <a:cs typeface="DejaVu Sans"/>
+      </a:minorFont>
+    </a:fontScheme>
+    <a:fmtScheme name="Office">
+      <a:fillStyleLst>
+        <a:solidFill>
+          <a:schemeClr val="phClr"/>
+        </a:solidFill>
+        <a:gradFill rotWithShape="1">
+          <a:gsLst>
+            <a:gs pos="0">
+              <a:schemeClr val="phClr">
+                <a:tint val="50000"/>
+                <a:satMod val="300000"/>
+              </a:schemeClr>
+            </a:gs>
+            <a:gs pos="35000">
+              <a:schemeClr val="phClr">
+                <a:tint val="37000"/>
+                <a:satMod val="300000"/>
+              </a:schemeClr>
+            </a:gs>
+            <a:gs pos="100000">
+              <a:schemeClr val="phClr">
+                <a:tint val="15000"/>
+                <a:satMod val="350000"/>
+              </a:schemeClr>
+            </a:gs>
+          </a:gsLst>
+          <a:lin ang="16200000" scaled="1"/>
+        </a:gradFill>
+        <a:gradFill rotWithShape="1">
+          <a:gsLst>
+            <a:gs pos="0">
+              <a:schemeClr val="phClr">
+                <a:shade val="51000"/>
+                <a:satMod val="130000"/>
+              </a:schemeClr>
+            </a:gs>
+            <a:gs pos="80000">
+              <a:schemeClr val="phClr">
+                <a:shade val="93000"/>
+                <a:satMod val="130000"/>
+              </a:schemeClr>
+            </a:gs>
+            <a:gs pos="100000">
+              <a:schemeClr val="phClr">
+                <a:shade val="94000"/>
+                <a:satMod val="135000"/>
+              </a:schemeClr>
+            </a:gs>
+          </a:gsLst>
+          <a:lin ang="16200000" scaled="0"/>
+        </a:gradFill>
+      </a:fillStyleLst>
+      <a:lnStyleLst>
+        <a:ln w="9525" cap="flat" cmpd="sng" algn="ctr">
+          <a:solidFill>
+            <a:schemeClr val="phClr">
+              <a:shade val="95000"/>
+              <a:satMod val="105000"/>
+            </a:schemeClr>
+          </a:solidFill>
+          <a:prstDash val="solid"/>
+        </a:ln>
+        <a:ln w="25400" cap="flat" cmpd="sng" algn="ctr">
+          <a:solidFill>
+            <a:schemeClr val="phClr"/>
+          </a:solidFill>
+          <a:prstDash val="solid"/>
+        </a:ln>
+        <a:ln w="38100" cap="flat" cmpd="sng" algn="ctr">
+          <a:solidFill>
+            <a:schemeClr val="phClr"/>
+          </a:solidFill>
+          <a:prstDash val="solid"/>
+        </a:ln>
+      </a:lnStyleLst>
+      <a:effectStyleLst>
+        <a:effectStyle>
+          <a:effectLst>
+            <a:outerShdw blurRad="40000" dist="20000" dir="5400000" rotWithShape="0">
+              <a:srgbClr val="000000">
+                <a:alpha val="38000"/>
+              </a:srgbClr>
+            </a:outerShdw>
+          </a:effectLst>
+        </a:effectStyle>
+        <a:effectStyle>
+          <a:effectLst>
+            <a:outerShdw blurRad="40000" dist="23000" dir="5400000" rotWithShape="0">
+              <a:srgbClr val="000000">
+                <a:alpha val="35000"/>
+              </a:srgbClr>
+            </a:outerShdw>
+          </a:effectLst>
+        </a:effectStyle>
+        <a:effectStyle>
+          <a:effectLst>
+            <a:outerShdw blurRad="40000" dist="23000" dir="5400000" rotWithShape="0">
+              <a:srgbClr val="000000">
+                <a:alpha val="35000"/>
+              </a:srgbClr>
+            </a:outerShdw>
+          </a:effectLst>
+          <a:scene3d>
+            <a:camera prst="orthographicFront">
+              <a:rot lat="0" lon="0" rev="0"/>
+            </a:camera>
+            <a:lightRig rig="threePt" dir="t">
+              <a:rot lat="0" lon="0" rev="1200000"/>
+            </a:lightRig>
+          </a:scene3d>
+          <a:sp3d>
+            <a:bevelT w="63500" h="25400"/>
+          </a:sp3d>
+        </a:effectStyle>
+      </a:effectStyleLst>
+      <a:bgFillStyleLst>
+        <a:solidFill>
+          <a:schemeClr val="phClr"/>
+        </a:solidFill>
+        <a:gradFill rotWithShape="1">
+          <a:gsLst>
+            <a:gs pos="0">
+              <a:schemeClr val="phClr">
+                <a:tint val="40000"/>
+                <a:satMod val="350000"/>
+              </a:schemeClr>
+            </a:gs>
+            <a:gs pos="40000">
+              <a:schemeClr val="phClr">
+                <a:tint val="45000"/>
+                <a:shade val="99000"/>
+                <a:satMod val="350000"/>
+              </a:schemeClr>
+            </a:gs>
+            <a:gs pos="100000">
+              <a:schemeClr val="phClr">
+                <a:shade val="20000"/>
+                <a:satMod val="255000"/>
+              </a:schemeClr>
+            </a:gs>
+          </a:gsLst>
+          <a:path path="circle">
+            <a:fillToRect l="50000" t="-80000" r="50000" b="180000"/>
+          </a:path>
+        </a:gradFill>
+        <a:gradFill rotWithShape="1">
+          <a:gsLst>
+            <a:gs pos="0">
+              <a:schemeClr val="phClr">
+                <a:tint val="80000"/>
+                <a:satMod val="300000"/>
+              </a:schemeClr>
+            </a:gs>
+            <a:gs pos="100000">
+              <a:schemeClr val="phClr">
+                <a:shade val="30000"/>
+                <a:satMod val="200000"/>
+              </a:schemeClr>
+            </a:gs>
+          </a:gsLst>
+          <a:path path="circle">
+            <a:fillToRect l="50000" t="50000" r="50000" b="50000"/>
+          </a:path>
+        </a:gradFill>
+      </a:bgFillStyleLst>
+    </a:fmtScheme>
+  </a:themeElements>
+</a:theme>
 </file>
</xml_diff>

<commit_message>
Updated to take into account the prerequisites
</commit_message>
<xml_diff>
--- a/Lessons/Lesson_III/Lesson_III_Questions.pptx
+++ b/Lessons/Lesson_III/Lesson_III_Questions.pptx
@@ -408,8 +408,8 @@
         </p:blipFill>
         <p:spPr>
           <a:xfrm>
-            <a:off x="2292480" y="1768680"/>
-            <a:ext cx="5494680" cy="4384080"/>
+            <a:off x="2291760" y="1768680"/>
+            <a:ext cx="5496480" cy="4384080"/>
           </a:xfrm>
           <a:prstGeom prst="rect">
             <a:avLst/>
@@ -431,8 +431,8 @@
         </p:blipFill>
         <p:spPr>
           <a:xfrm>
-            <a:off x="2292480" y="1768680"/>
-            <a:ext cx="5494680" cy="4384080"/>
+            <a:off x="2291760" y="1768680"/>
+            <a:ext cx="5496480" cy="4384080"/>
           </a:xfrm>
           <a:prstGeom prst="rect">
             <a:avLst/>
@@ -1638,8 +1638,8 @@
         </p:blipFill>
         <p:spPr>
           <a:xfrm>
-            <a:off x="2292480" y="1768680"/>
-            <a:ext cx="5494680" cy="4384080"/>
+            <a:off x="2291760" y="1768680"/>
+            <a:ext cx="5496480" cy="4384080"/>
           </a:xfrm>
           <a:prstGeom prst="rect">
             <a:avLst/>
@@ -1661,8 +1661,8 @@
         </p:blipFill>
         <p:spPr>
           <a:xfrm>
-            <a:off x="2292480" y="1768680"/>
-            <a:ext cx="5494680" cy="4384080"/>
+            <a:off x="2291760" y="1768680"/>
+            <a:ext cx="5496480" cy="4384080"/>
           </a:xfrm>
           <a:prstGeom prst="rect">
             <a:avLst/>
@@ -2867,8 +2867,8 @@
         </p:blipFill>
         <p:spPr>
           <a:xfrm>
-            <a:off x="2292480" y="1768680"/>
-            <a:ext cx="5494680" cy="4384080"/>
+            <a:off x="2291760" y="1768680"/>
+            <a:ext cx="5496480" cy="4384080"/>
           </a:xfrm>
           <a:prstGeom prst="rect">
             <a:avLst/>
@@ -2890,8 +2890,8 @@
         </p:blipFill>
         <p:spPr>
           <a:xfrm>
-            <a:off x="2292480" y="1768680"/>
-            <a:ext cx="5494680" cy="4384080"/>
+            <a:off x="2291760" y="1768680"/>
+            <a:ext cx="5496480" cy="4384080"/>
           </a:xfrm>
           <a:prstGeom prst="rect">
             <a:avLst/>
@@ -3527,7 +3527,7 @@
           <a:p>
             <a:pPr algn="ctr"/>
             <a:r>
-              <a:rPr lang="en-AU" sz="4400">
+              <a:rPr lang="en-AU" sz="4400" spc="-1">
                 <a:latin typeface="Arial"/>
               </a:rPr>
               <a:t>Click to edit the title text format</a:t>
@@ -3558,13 +3558,16 @@
         <p:txBody>
           <a:bodyPr lIns="0" rIns="0" tIns="0" bIns="0"/>
           <a:p>
-            <a:pPr>
+            <a:pPr marL="432000" indent="-324000">
+              <a:buClr>
+                <a:srgbClr val="ffffff"/>
+              </a:buClr>
               <a:buSzPct val="45000"/>
               <a:buFont typeface="StarSymbol"/>
               <a:buChar char=""/>
             </a:pPr>
             <a:r>
-              <a:rPr lang="en-AU" sz="3200">
+              <a:rPr lang="en-AU" sz="3200" spc="-1">
                 <a:latin typeface="Arial"/>
               </a:rPr>
               <a:t>Click to edit the outline text format</a:t>
@@ -3572,13 +3575,16 @@
             <a:endParaRPr/>
           </a:p>
           <a:p>
-            <a:pPr lvl="1">
+            <a:pPr lvl="1" marL="864000" indent="-324000">
+              <a:buClr>
+                <a:srgbClr val="ffffff"/>
+              </a:buClr>
               <a:buSzPct val="75000"/>
               <a:buFont typeface="StarSymbol"/>
               <a:buChar char=""/>
             </a:pPr>
             <a:r>
-              <a:rPr lang="en-AU" sz="2800">
+              <a:rPr lang="en-AU" sz="2800" spc="-1">
                 <a:latin typeface="Arial"/>
               </a:rPr>
               <a:t>Second Outline Level</a:t>
@@ -3586,13 +3592,16 @@
             <a:endParaRPr/>
           </a:p>
           <a:p>
-            <a:pPr lvl="2">
+            <a:pPr lvl="2" marL="1296000" indent="-288000">
+              <a:buClr>
+                <a:srgbClr val="ffffff"/>
+              </a:buClr>
               <a:buSzPct val="45000"/>
               <a:buFont typeface="StarSymbol"/>
               <a:buChar char=""/>
             </a:pPr>
             <a:r>
-              <a:rPr lang="en-AU" sz="2400">
+              <a:rPr lang="en-AU" sz="2400" spc="-1">
                 <a:latin typeface="Arial"/>
               </a:rPr>
               <a:t>Third Outline Level</a:t>
@@ -3600,13 +3609,16 @@
             <a:endParaRPr/>
           </a:p>
           <a:p>
-            <a:pPr lvl="3">
+            <a:pPr lvl="3" marL="1728000" indent="-216000">
+              <a:buClr>
+                <a:srgbClr val="ffffff"/>
+              </a:buClr>
               <a:buSzPct val="75000"/>
               <a:buFont typeface="StarSymbol"/>
               <a:buChar char=""/>
             </a:pPr>
             <a:r>
-              <a:rPr lang="en-AU" sz="2000">
+              <a:rPr lang="en-AU" sz="2000" spc="-1">
                 <a:latin typeface="Arial"/>
               </a:rPr>
               <a:t>Fourth Outline Level</a:t>
@@ -3614,13 +3626,16 @@
             <a:endParaRPr/>
           </a:p>
           <a:p>
-            <a:pPr lvl="4">
+            <a:pPr lvl="4" marL="2160000" indent="-216000">
+              <a:buClr>
+                <a:srgbClr val="ffffff"/>
+              </a:buClr>
               <a:buSzPct val="45000"/>
               <a:buFont typeface="StarSymbol"/>
               <a:buChar char=""/>
             </a:pPr>
             <a:r>
-              <a:rPr lang="en-AU" sz="2000">
+              <a:rPr lang="en-AU" sz="2000" spc="-1">
                 <a:latin typeface="Arial"/>
               </a:rPr>
               <a:t>Fifth Outline Level</a:t>
@@ -3628,13 +3643,16 @@
             <a:endParaRPr/>
           </a:p>
           <a:p>
-            <a:pPr lvl="5">
+            <a:pPr lvl="5" marL="2592000" indent="-216000">
+              <a:buClr>
+                <a:srgbClr val="ffffff"/>
+              </a:buClr>
               <a:buSzPct val="45000"/>
               <a:buFont typeface="StarSymbol"/>
               <a:buChar char=""/>
             </a:pPr>
             <a:r>
-              <a:rPr lang="en-AU" sz="2000">
+              <a:rPr lang="en-AU" sz="2000" spc="-1">
                 <a:latin typeface="Arial"/>
               </a:rPr>
               <a:t>Sixth Outline Level</a:t>
@@ -3642,13 +3660,16 @@
             <a:endParaRPr/>
           </a:p>
           <a:p>
-            <a:pPr lvl="6">
+            <a:pPr lvl="6" marL="3024000" indent="-216000">
+              <a:buClr>
+                <a:srgbClr val="ffffff"/>
+              </a:buClr>
               <a:buSzPct val="45000"/>
               <a:buFont typeface="StarSymbol"/>
               <a:buChar char=""/>
             </a:pPr>
             <a:r>
-              <a:rPr lang="en-AU" sz="2000">
+              <a:rPr lang="en-AU" sz="2000" spc="-1">
                 <a:latin typeface="Arial"/>
               </a:rPr>
               <a:t>Seventh Outline Level</a:t>
@@ -3718,7 +3739,7 @@
           <a:p>
             <a:pPr algn="ctr"/>
             <a:r>
-              <a:rPr lang="en-AU" sz="4400">
+              <a:rPr lang="en-AU" sz="4400" spc="-1">
                 <a:latin typeface="Arial"/>
               </a:rPr>
               <a:t>Click to edit the title text format</a:t>
@@ -3749,13 +3770,16 @@
         <p:txBody>
           <a:bodyPr lIns="0" rIns="0" tIns="0" bIns="0"/>
           <a:p>
-            <a:pPr>
+            <a:pPr marL="432000" indent="-324000">
+              <a:buClr>
+                <a:srgbClr val="ffffff"/>
+              </a:buClr>
               <a:buSzPct val="45000"/>
               <a:buFont typeface="StarSymbol"/>
               <a:buChar char=""/>
             </a:pPr>
             <a:r>
-              <a:rPr lang="en-AU" sz="3200">
+              <a:rPr lang="en-AU" sz="3200" spc="-1">
                 <a:latin typeface="Arial"/>
               </a:rPr>
               <a:t>Click to edit the outline text format</a:t>
@@ -3763,13 +3787,16 @@
             <a:endParaRPr/>
           </a:p>
           <a:p>
-            <a:pPr lvl="1">
+            <a:pPr lvl="1" marL="864000" indent="-324000">
+              <a:buClr>
+                <a:srgbClr val="ffffff"/>
+              </a:buClr>
               <a:buSzPct val="75000"/>
               <a:buFont typeface="StarSymbol"/>
               <a:buChar char=""/>
             </a:pPr>
             <a:r>
-              <a:rPr lang="en-AU" sz="2800">
+              <a:rPr lang="en-AU" sz="2800" spc="-1">
                 <a:latin typeface="Arial"/>
               </a:rPr>
               <a:t>Second Outline Level</a:t>
@@ -3777,13 +3804,16 @@
             <a:endParaRPr/>
           </a:p>
           <a:p>
-            <a:pPr lvl="2">
+            <a:pPr lvl="2" marL="1296000" indent="-288000">
+              <a:buClr>
+                <a:srgbClr val="ffffff"/>
+              </a:buClr>
               <a:buSzPct val="45000"/>
               <a:buFont typeface="StarSymbol"/>
               <a:buChar char=""/>
             </a:pPr>
             <a:r>
-              <a:rPr lang="en-AU" sz="2400">
+              <a:rPr lang="en-AU" sz="2400" spc="-1">
                 <a:latin typeface="Arial"/>
               </a:rPr>
               <a:t>Third Outline Level</a:t>
@@ -3791,13 +3821,16 @@
             <a:endParaRPr/>
           </a:p>
           <a:p>
-            <a:pPr lvl="3">
+            <a:pPr lvl="3" marL="1728000" indent="-216000">
+              <a:buClr>
+                <a:srgbClr val="ffffff"/>
+              </a:buClr>
               <a:buSzPct val="75000"/>
               <a:buFont typeface="StarSymbol"/>
               <a:buChar char=""/>
             </a:pPr>
             <a:r>
-              <a:rPr lang="en-AU" sz="2000">
+              <a:rPr lang="en-AU" sz="2000" spc="-1">
                 <a:latin typeface="Arial"/>
               </a:rPr>
               <a:t>Fourth Outline Level</a:t>
@@ -3805,13 +3838,16 @@
             <a:endParaRPr/>
           </a:p>
           <a:p>
-            <a:pPr lvl="4">
+            <a:pPr lvl="4" marL="2160000" indent="-216000">
+              <a:buClr>
+                <a:srgbClr val="ffffff"/>
+              </a:buClr>
               <a:buSzPct val="45000"/>
               <a:buFont typeface="StarSymbol"/>
               <a:buChar char=""/>
             </a:pPr>
             <a:r>
-              <a:rPr lang="en-AU" sz="2000">
+              <a:rPr lang="en-AU" sz="2000" spc="-1">
                 <a:latin typeface="Arial"/>
               </a:rPr>
               <a:t>Fifth Outline Level</a:t>
@@ -3819,13 +3855,16 @@
             <a:endParaRPr/>
           </a:p>
           <a:p>
-            <a:pPr lvl="5">
+            <a:pPr lvl="5" marL="2592000" indent="-216000">
+              <a:buClr>
+                <a:srgbClr val="ffffff"/>
+              </a:buClr>
               <a:buSzPct val="45000"/>
               <a:buFont typeface="StarSymbol"/>
               <a:buChar char=""/>
             </a:pPr>
             <a:r>
-              <a:rPr lang="en-AU" sz="2000">
+              <a:rPr lang="en-AU" sz="2000" spc="-1">
                 <a:latin typeface="Arial"/>
               </a:rPr>
               <a:t>Sixth Outline Level</a:t>
@@ -3833,13 +3872,16 @@
             <a:endParaRPr/>
           </a:p>
           <a:p>
-            <a:pPr lvl="6">
+            <a:pPr lvl="6" marL="3024000" indent="-216000">
+              <a:buClr>
+                <a:srgbClr val="ffffff"/>
+              </a:buClr>
               <a:buSzPct val="45000"/>
               <a:buFont typeface="StarSymbol"/>
               <a:buChar char=""/>
             </a:pPr>
             <a:r>
-              <a:rPr lang="en-AU" sz="2000">
+              <a:rPr lang="en-AU" sz="2000" spc="-1">
                 <a:latin typeface="Arial"/>
               </a:rPr>
               <a:t>Seventh Outline Level</a:t>
@@ -3909,7 +3951,7 @@
           <a:p>
             <a:pPr algn="ctr"/>
             <a:r>
-              <a:rPr lang="en-AU" sz="4400">
+              <a:rPr lang="en-AU" sz="4400" spc="-1">
                 <a:latin typeface="Arial"/>
               </a:rPr>
               <a:t>Click to edit the title text format</a:t>
@@ -3940,13 +3982,16 @@
         <p:txBody>
           <a:bodyPr lIns="0" rIns="0" tIns="0" bIns="0"/>
           <a:p>
-            <a:pPr>
+            <a:pPr marL="432000" indent="-324000">
+              <a:buClr>
+                <a:srgbClr val="ffffff"/>
+              </a:buClr>
               <a:buSzPct val="45000"/>
               <a:buFont typeface="StarSymbol"/>
               <a:buChar char=""/>
             </a:pPr>
             <a:r>
-              <a:rPr lang="en-AU" sz="3200">
+              <a:rPr lang="en-AU" sz="3200" spc="-1">
                 <a:latin typeface="Arial"/>
               </a:rPr>
               <a:t>Click to edit the outline text format</a:t>
@@ -3954,13 +3999,16 @@
             <a:endParaRPr/>
           </a:p>
           <a:p>
-            <a:pPr lvl="1">
+            <a:pPr lvl="1" marL="864000" indent="-324000">
+              <a:buClr>
+                <a:srgbClr val="ffffff"/>
+              </a:buClr>
               <a:buSzPct val="75000"/>
               <a:buFont typeface="StarSymbol"/>
               <a:buChar char=""/>
             </a:pPr>
             <a:r>
-              <a:rPr lang="en-AU" sz="2800">
+              <a:rPr lang="en-AU" sz="2800" spc="-1">
                 <a:latin typeface="Arial"/>
               </a:rPr>
               <a:t>Second Outline Level</a:t>
@@ -3968,13 +4016,16 @@
             <a:endParaRPr/>
           </a:p>
           <a:p>
-            <a:pPr lvl="2">
+            <a:pPr lvl="2" marL="1296000" indent="-288000">
+              <a:buClr>
+                <a:srgbClr val="ffffff"/>
+              </a:buClr>
               <a:buSzPct val="45000"/>
               <a:buFont typeface="StarSymbol"/>
               <a:buChar char=""/>
             </a:pPr>
             <a:r>
-              <a:rPr lang="en-AU" sz="2400">
+              <a:rPr lang="en-AU" sz="2400" spc="-1">
                 <a:latin typeface="Arial"/>
               </a:rPr>
               <a:t>Third Outline Level</a:t>
@@ -3982,13 +4033,16 @@
             <a:endParaRPr/>
           </a:p>
           <a:p>
-            <a:pPr lvl="3">
+            <a:pPr lvl="3" marL="1728000" indent="-216000">
+              <a:buClr>
+                <a:srgbClr val="ffffff"/>
+              </a:buClr>
               <a:buSzPct val="75000"/>
               <a:buFont typeface="StarSymbol"/>
               <a:buChar char=""/>
             </a:pPr>
             <a:r>
-              <a:rPr lang="en-AU" sz="2000">
+              <a:rPr lang="en-AU" sz="2000" spc="-1">
                 <a:latin typeface="Arial"/>
               </a:rPr>
               <a:t>Fourth Outline Level</a:t>
@@ -3996,13 +4050,16 @@
             <a:endParaRPr/>
           </a:p>
           <a:p>
-            <a:pPr lvl="4">
+            <a:pPr lvl="4" marL="2160000" indent="-216000">
+              <a:buClr>
+                <a:srgbClr val="ffffff"/>
+              </a:buClr>
               <a:buSzPct val="45000"/>
               <a:buFont typeface="StarSymbol"/>
               <a:buChar char=""/>
             </a:pPr>
             <a:r>
-              <a:rPr lang="en-AU" sz="2000">
+              <a:rPr lang="en-AU" sz="2000" spc="-1">
                 <a:latin typeface="Arial"/>
               </a:rPr>
               <a:t>Fifth Outline Level</a:t>
@@ -4010,13 +4067,16 @@
             <a:endParaRPr/>
           </a:p>
           <a:p>
-            <a:pPr lvl="5">
+            <a:pPr lvl="5" marL="2592000" indent="-216000">
+              <a:buClr>
+                <a:srgbClr val="ffffff"/>
+              </a:buClr>
               <a:buSzPct val="45000"/>
               <a:buFont typeface="StarSymbol"/>
               <a:buChar char=""/>
             </a:pPr>
             <a:r>
-              <a:rPr lang="en-AU" sz="2000">
+              <a:rPr lang="en-AU" sz="2000" spc="-1">
                 <a:latin typeface="Arial"/>
               </a:rPr>
               <a:t>Sixth Outline Level</a:t>
@@ -4024,13 +4084,16 @@
             <a:endParaRPr/>
           </a:p>
           <a:p>
-            <a:pPr lvl="6">
+            <a:pPr lvl="6" marL="3024000" indent="-216000">
+              <a:buClr>
+                <a:srgbClr val="ffffff"/>
+              </a:buClr>
               <a:buSzPct val="45000"/>
               <a:buFont typeface="StarSymbol"/>
               <a:buChar char=""/>
             </a:pPr>
             <a:r>
-              <a:rPr lang="en-AU" sz="2000">
+              <a:rPr lang="en-AU" sz="2000" spc="-1">
                 <a:latin typeface="Arial"/>
               </a:rPr>
               <a:t>Seventh Outline Level</a:t>
@@ -4085,7 +4148,7 @@
         <p:spPr>
           <a:xfrm>
             <a:off x="504000" y="301320"/>
-            <a:ext cx="9070560" cy="1261080"/>
+            <a:ext cx="9070200" cy="1260720"/>
           </a:xfrm>
           <a:prstGeom prst="rect">
             <a:avLst/>
@@ -4105,10 +4168,15 @@
           <a:bodyPr lIns="0" rIns="0" tIns="0" bIns="0" anchor="ctr"/>
           <a:p>
             <a:r>
-              <a:rPr b="1" lang="en-AU" sz="4400" strike="noStrike">
+              <a:rPr b="1" lang="en-AU" sz="4400" spc="-1" strike="noStrike">
                 <a:solidFill>
                   <a:srgbClr val="000000"/>
                 </a:solidFill>
+                <a:uFill>
+                  <a:solidFill>
+                    <a:srgbClr val="ffffff"/>
+                  </a:solidFill>
+                </a:uFill>
                 <a:latin typeface="Arial"/>
                 <a:ea typeface="DejaVu Sans"/>
               </a:rPr>
@@ -4127,7 +4195,7 @@
         <p:spPr>
           <a:xfrm>
             <a:off x="504000" y="1769040"/>
-            <a:ext cx="9070560" cy="4383360"/>
+            <a:ext cx="9070200" cy="4383000"/>
           </a:xfrm>
           <a:prstGeom prst="rect">
             <a:avLst/>
@@ -4147,10 +4215,15 @@
           <a:bodyPr lIns="0" rIns="0" tIns="0" bIns="0" anchor="ctr"/>
           <a:p>
             <a:r>
-              <a:rPr lang="en-AU" sz="4000" strike="noStrike">
+              <a:rPr lang="en-AU" sz="4000" spc="-1" strike="noStrike">
                 <a:solidFill>
                   <a:srgbClr val="000000"/>
                 </a:solidFill>
+                <a:uFill>
+                  <a:solidFill>
+                    <a:srgbClr val="ffffff"/>
+                  </a:solidFill>
+                </a:uFill>
                 <a:latin typeface="Arial"/>
                 <a:ea typeface="DejaVu Sans"/>
               </a:rPr>
@@ -4173,32 +4246,19 @@
               </a:lnSpc>
             </a:pPr>
             <a:r>
-              <a:rPr lang="en-AU" sz="3200" strike="noStrike">
+              <a:rPr lang="en-AU" sz="3200" spc="-1" strike="noStrike">
                 <a:solidFill>
                   <a:srgbClr val="018a8a"/>
                 </a:solidFill>
+                <a:uFill>
+                  <a:solidFill>
+                    <a:srgbClr val="ffffff"/>
+                  </a:solidFill>
+                </a:uFill>
                 <a:latin typeface="Menlo"/>
                 <a:ea typeface="Menlo"/>
               </a:rPr>
-              <a:t>http://cygwin.com/install.html</a:t>
-            </a:r>
-            <a:endParaRPr/>
-          </a:p>
-          <a:p>
-            <a:pPr>
-              <a:lnSpc>
-                <a:spcPct val="100000"/>
-              </a:lnSpc>
-            </a:pPr>
-            <a:r>
-              <a:rPr lang="en-AU" sz="3200" strike="noStrike">
-                <a:solidFill>
-                  <a:srgbClr val="018a8a"/>
-                </a:solidFill>
-                <a:latin typeface="Menlo"/>
-                <a:ea typeface="Menlo"/>
-              </a:rPr>
-              <a:t>http://tinyurl.com/install-cygwin</a:t>
+              <a:t>http://tinyurl.com/n9o7t9c</a:t>
             </a:r>
             <a:endParaRPr/>
           </a:p>
@@ -4262,7 +4322,7 @@
         <p:spPr>
           <a:xfrm>
             <a:off x="504000" y="301320"/>
-            <a:ext cx="9070560" cy="1261080"/>
+            <a:ext cx="9070200" cy="1260720"/>
           </a:xfrm>
           <a:prstGeom prst="rect">
             <a:avLst/>
@@ -4287,10 +4347,15 @@
               </a:lnSpc>
             </a:pPr>
             <a:r>
-              <a:rPr b="1" lang="en-AU" sz="4400" strike="noStrike">
+              <a:rPr b="1" lang="en-AU" sz="4400" spc="-1" strike="noStrike">
                 <a:solidFill>
                   <a:srgbClr val="000000"/>
                 </a:solidFill>
+                <a:uFill>
+                  <a:solidFill>
+                    <a:srgbClr val="ffffff"/>
+                  </a:solidFill>
+                </a:uFill>
                 <a:latin typeface="Arial"/>
                 <a:ea typeface="DejaVu Sans"/>
               </a:rPr>
@@ -4309,7 +4374,7 @@
         <p:spPr>
           <a:xfrm>
             <a:off x="504000" y="1769040"/>
-            <a:ext cx="9070560" cy="4383360"/>
+            <a:ext cx="9070200" cy="4383000"/>
           </a:xfrm>
           <a:prstGeom prst="rect">
             <a:avLst/>
@@ -4329,10 +4394,15 @@
           <a:bodyPr lIns="0" rIns="0" tIns="0" bIns="0"/>
           <a:p>
             <a:r>
-              <a:rPr i="1" lang="en-AU" sz="2000" strike="noStrike">
+              <a:rPr i="1" lang="en-AU" sz="2000" spc="-1" strike="noStrike">
                 <a:solidFill>
                   <a:srgbClr val="808080"/>
                 </a:solidFill>
+                <a:uFill>
+                  <a:solidFill>
+                    <a:srgbClr val="ffffff"/>
+                  </a:solidFill>
+                </a:uFill>
                 <a:latin typeface="Menlo"/>
                 <a:ea typeface="Menlo"/>
               </a:rPr>
@@ -4342,10 +4412,15 @@
           </a:p>
           <a:p>
             <a:r>
-              <a:rPr i="1" lang="en-AU" sz="2000" strike="noStrike">
+              <a:rPr i="1" lang="en-AU" sz="2000" spc="-1" strike="noStrike">
                 <a:solidFill>
                   <a:srgbClr val="808080"/>
                 </a:solidFill>
+                <a:uFill>
+                  <a:solidFill>
+                    <a:srgbClr val="ffffff"/>
+                  </a:solidFill>
+                </a:uFill>
                 <a:latin typeface="Menlo"/>
                 <a:ea typeface="Menlo"/>
               </a:rPr>
@@ -4355,10 +4430,15 @@
           </a:p>
           <a:p>
             <a:r>
-              <a:rPr i="1" lang="en-AU" sz="2000" strike="noStrike">
+              <a:rPr i="1" lang="en-AU" sz="2000" spc="-1" strike="noStrike">
                 <a:solidFill>
                   <a:srgbClr val="808080"/>
                 </a:solidFill>
+                <a:uFill>
+                  <a:solidFill>
+                    <a:srgbClr val="ffffff"/>
+                  </a:solidFill>
+                </a:uFill>
                 <a:latin typeface="Menlo"/>
                 <a:ea typeface="Menlo"/>
               </a:rPr>
@@ -4426,7 +4506,7 @@
         <p:spPr>
           <a:xfrm>
             <a:off x="504000" y="301320"/>
-            <a:ext cx="9070560" cy="1261080"/>
+            <a:ext cx="9070200" cy="1260720"/>
           </a:xfrm>
           <a:prstGeom prst="rect">
             <a:avLst/>
@@ -4451,10 +4531,15 @@
               </a:lnSpc>
             </a:pPr>
             <a:r>
-              <a:rPr b="1" lang="en-AU" sz="4400" strike="noStrike">
+              <a:rPr b="1" lang="en-AU" sz="4400" spc="-1" strike="noStrike">
                 <a:solidFill>
                   <a:srgbClr val="000000"/>
                 </a:solidFill>
+                <a:uFill>
+                  <a:solidFill>
+                    <a:srgbClr val="ffffff"/>
+                  </a:solidFill>
+                </a:uFill>
                 <a:latin typeface="Arial"/>
                 <a:ea typeface="DejaVu Sans"/>
               </a:rPr>
@@ -4473,7 +4558,7 @@
         <p:spPr>
           <a:xfrm>
             <a:off x="504000" y="1769040"/>
-            <a:ext cx="9070560" cy="4383360"/>
+            <a:ext cx="9070200" cy="4383000"/>
           </a:xfrm>
           <a:prstGeom prst="rect">
             <a:avLst/>
@@ -4493,10 +4578,15 @@
           <a:bodyPr lIns="0" rIns="0" tIns="0" bIns="0"/>
           <a:p>
             <a:r>
-              <a:rPr i="1" lang="en-AU" sz="2000" strike="noStrike">
+              <a:rPr i="1" lang="en-AU" sz="2000" spc="-1" strike="noStrike">
                 <a:solidFill>
                   <a:srgbClr val="808080"/>
                 </a:solidFill>
+                <a:uFill>
+                  <a:solidFill>
+                    <a:srgbClr val="ffffff"/>
+                  </a:solidFill>
+                </a:uFill>
                 <a:latin typeface="Menlo"/>
                 <a:ea typeface="Menlo"/>
               </a:rPr>
@@ -4506,10 +4596,15 @@
           </a:p>
           <a:p>
             <a:r>
-              <a:rPr i="1" lang="en-AU" sz="2000" strike="noStrike">
+              <a:rPr i="1" lang="en-AU" sz="2000" spc="-1" strike="noStrike">
                 <a:solidFill>
                   <a:srgbClr val="808080"/>
                 </a:solidFill>
+                <a:uFill>
+                  <a:solidFill>
+                    <a:srgbClr val="ffffff"/>
+                  </a:solidFill>
+                </a:uFill>
                 <a:latin typeface="Menlo"/>
                 <a:ea typeface="Menlo"/>
               </a:rPr>
@@ -4519,10 +4614,15 @@
           </a:p>
           <a:p>
             <a:r>
-              <a:rPr i="1" lang="en-AU" sz="2000" strike="noStrike">
+              <a:rPr i="1" lang="en-AU" sz="2000" spc="-1" strike="noStrike">
                 <a:solidFill>
                   <a:srgbClr val="808080"/>
                 </a:solidFill>
+                <a:uFill>
+                  <a:solidFill>
+                    <a:srgbClr val="ffffff"/>
+                  </a:solidFill>
+                </a:uFill>
                 <a:latin typeface="Menlo"/>
                 <a:ea typeface="Menlo"/>
               </a:rPr>
@@ -4532,10 +4632,15 @@
           </a:p>
           <a:p>
             <a:r>
-              <a:rPr i="1" lang="en-AU" sz="2000" strike="noStrike">
+              <a:rPr i="1" lang="en-AU" sz="2000" spc="-1" strike="noStrike">
                 <a:solidFill>
                   <a:srgbClr val="808080"/>
                 </a:solidFill>
+                <a:uFill>
+                  <a:solidFill>
+                    <a:srgbClr val="ffffff"/>
+                  </a:solidFill>
+                </a:uFill>
                 <a:latin typeface="Menlo"/>
                 <a:ea typeface="Menlo"/>
               </a:rPr>
@@ -4545,10 +4650,15 @@
           </a:p>
           <a:p>
             <a:r>
-              <a:rPr i="1" lang="en-AU" sz="2000" strike="noStrike">
+              <a:rPr i="1" lang="en-AU" sz="2000" spc="-1" strike="noStrike">
                 <a:solidFill>
                   <a:srgbClr val="808080"/>
                 </a:solidFill>
+                <a:uFill>
+                  <a:solidFill>
+                    <a:srgbClr val="ffffff"/>
+                  </a:solidFill>
+                </a:uFill>
                 <a:latin typeface="Menlo"/>
                 <a:ea typeface="Menlo"/>
               </a:rPr>
@@ -4558,10 +4668,15 @@
           </a:p>
           <a:p>
             <a:r>
-              <a:rPr i="1" lang="en-AU" sz="2000" strike="noStrike">
+              <a:rPr i="1" lang="en-AU" sz="2000" spc="-1" strike="noStrike">
                 <a:solidFill>
                   <a:srgbClr val="808080"/>
                 </a:solidFill>
+                <a:uFill>
+                  <a:solidFill>
+                    <a:srgbClr val="ffffff"/>
+                  </a:solidFill>
+                </a:uFill>
                 <a:latin typeface="Menlo"/>
                 <a:ea typeface="Menlo"/>
               </a:rPr>
@@ -4571,10 +4686,15 @@
           </a:p>
           <a:p>
             <a:r>
-              <a:rPr i="1" lang="en-AU" sz="2000" strike="noStrike">
+              <a:rPr i="1" lang="en-AU" sz="2000" spc="-1" strike="noStrike">
                 <a:solidFill>
                   <a:srgbClr val="808080"/>
                 </a:solidFill>
+                <a:uFill>
+                  <a:solidFill>
+                    <a:srgbClr val="ffffff"/>
+                  </a:solidFill>
+                </a:uFill>
                 <a:latin typeface="Menlo"/>
                 <a:ea typeface="Menlo"/>
               </a:rPr>
@@ -4584,10 +4704,15 @@
           </a:p>
           <a:p>
             <a:r>
-              <a:rPr i="1" lang="en-AU" sz="2000" strike="noStrike">
+              <a:rPr i="1" lang="en-AU" sz="2000" spc="-1" strike="noStrike">
                 <a:solidFill>
                   <a:srgbClr val="808080"/>
                 </a:solidFill>
+                <a:uFill>
+                  <a:solidFill>
+                    <a:srgbClr val="ffffff"/>
+                  </a:solidFill>
+                </a:uFill>
                 <a:latin typeface="Menlo"/>
                 <a:ea typeface="Menlo"/>
               </a:rPr>
@@ -4597,10 +4722,15 @@
           </a:p>
           <a:p>
             <a:r>
-              <a:rPr i="1" lang="en-AU" sz="2000" strike="noStrike">
+              <a:rPr i="1" lang="en-AU" sz="2000" spc="-1" strike="noStrike">
                 <a:solidFill>
                   <a:srgbClr val="808080"/>
                 </a:solidFill>
+                <a:uFill>
+                  <a:solidFill>
+                    <a:srgbClr val="ffffff"/>
+                  </a:solidFill>
+                </a:uFill>
                 <a:latin typeface="Menlo"/>
                 <a:ea typeface="Menlo"/>
               </a:rPr>
@@ -4610,10 +4740,15 @@
           </a:p>
           <a:p>
             <a:r>
-              <a:rPr i="1" lang="en-AU" sz="2000" strike="noStrike">
+              <a:rPr i="1" lang="en-AU" sz="2000" spc="-1" strike="noStrike">
                 <a:solidFill>
                   <a:srgbClr val="808080"/>
                 </a:solidFill>
+                <a:uFill>
+                  <a:solidFill>
+                    <a:srgbClr val="ffffff"/>
+                  </a:solidFill>
+                </a:uFill>
                 <a:latin typeface="Menlo"/>
                 <a:ea typeface="Menlo"/>
               </a:rPr>
@@ -4623,10 +4758,15 @@
           </a:p>
           <a:p>
             <a:r>
-              <a:rPr i="1" lang="en-AU" sz="2000" strike="noStrike">
+              <a:rPr i="1" lang="en-AU" sz="2000" spc="-1" strike="noStrike">
                 <a:solidFill>
                   <a:srgbClr val="808080"/>
                 </a:solidFill>
+                <a:uFill>
+                  <a:solidFill>
+                    <a:srgbClr val="ffffff"/>
+                  </a:solidFill>
+                </a:uFill>
                 <a:latin typeface="Menlo"/>
                 <a:ea typeface="Menlo"/>
               </a:rPr>
@@ -4636,10 +4776,15 @@
           </a:p>
           <a:p>
             <a:r>
-              <a:rPr i="1" lang="en-AU" sz="2000" strike="noStrike">
+              <a:rPr i="1" lang="en-AU" sz="2000" spc="-1" strike="noStrike">
                 <a:solidFill>
                   <a:srgbClr val="808080"/>
                 </a:solidFill>
+                <a:uFill>
+                  <a:solidFill>
+                    <a:srgbClr val="ffffff"/>
+                  </a:solidFill>
+                </a:uFill>
                 <a:latin typeface="Menlo"/>
                 <a:ea typeface="Menlo"/>
               </a:rPr>
@@ -4649,10 +4794,15 @@
           </a:p>
           <a:p>
             <a:r>
-              <a:rPr i="1" lang="en-AU" sz="2000" strike="noStrike">
+              <a:rPr i="1" lang="en-AU" sz="2000" spc="-1" strike="noStrike">
                 <a:solidFill>
                   <a:srgbClr val="808080"/>
                 </a:solidFill>
+                <a:uFill>
+                  <a:solidFill>
+                    <a:srgbClr val="ffffff"/>
+                  </a:solidFill>
+                </a:uFill>
                 <a:latin typeface="Menlo"/>
                 <a:ea typeface="Menlo"/>
               </a:rPr>
@@ -4720,7 +4870,7 @@
         <p:spPr>
           <a:xfrm>
             <a:off x="504000" y="301320"/>
-            <a:ext cx="9070560" cy="1261080"/>
+            <a:ext cx="9070200" cy="1260720"/>
           </a:xfrm>
           <a:prstGeom prst="rect">
             <a:avLst/>
@@ -4745,50 +4895,75 @@
               </a:lnSpc>
             </a:pPr>
             <a:r>
-              <a:rPr lang="en-AU" sz="4400" strike="noStrike">
+              <a:rPr lang="en-AU" sz="4400" spc="-1" strike="noStrike">
                 <a:solidFill>
                   <a:srgbClr val="000000"/>
                 </a:solidFill>
+                <a:uFill>
+                  <a:solidFill>
+                    <a:srgbClr val="ffffff"/>
+                  </a:solidFill>
+                </a:uFill>
                 <a:latin typeface="Arial"/>
                 <a:ea typeface="DejaVu Sans"/>
               </a:rPr>
               <a:t>ssh (</a:t>
             </a:r>
             <a:r>
-              <a:rPr b="1" lang="en-AU" sz="4400" strike="noStrike">
+              <a:rPr b="1" lang="en-AU" sz="4400" spc="-1" strike="noStrike">
                 <a:solidFill>
                   <a:srgbClr val="000000"/>
                 </a:solidFill>
+                <a:uFill>
+                  <a:solidFill>
+                    <a:srgbClr val="ffffff"/>
+                  </a:solidFill>
+                </a:uFill>
                 <a:latin typeface="Arial"/>
                 <a:ea typeface="DejaVu Sans"/>
               </a:rPr>
               <a:t>s</a:t>
             </a:r>
             <a:r>
-              <a:rPr lang="en-AU" sz="4400" strike="noStrike">
+              <a:rPr lang="en-AU" sz="4400" spc="-1" strike="noStrike">
                 <a:solidFill>
                   <a:srgbClr val="000000"/>
                 </a:solidFill>
+                <a:uFill>
+                  <a:solidFill>
+                    <a:srgbClr val="ffffff"/>
+                  </a:solidFill>
+                </a:uFill>
                 <a:latin typeface="Arial"/>
                 <a:ea typeface="DejaVu Sans"/>
               </a:rPr>
               <a:t>ecure </a:t>
             </a:r>
             <a:r>
-              <a:rPr b="1" lang="en-AU" sz="4400" strike="noStrike">
+              <a:rPr b="1" lang="en-AU" sz="4400" spc="-1" strike="noStrike">
                 <a:solidFill>
                   <a:srgbClr val="000000"/>
                 </a:solidFill>
+                <a:uFill>
+                  <a:solidFill>
+                    <a:srgbClr val="ffffff"/>
+                  </a:solidFill>
+                </a:uFill>
                 <a:latin typeface="Arial"/>
                 <a:ea typeface="DejaVu Sans"/>
               </a:rPr>
               <a:t>sh</a:t>
             </a:r>
             <a:r>
-              <a:rPr lang="en-AU" sz="4400" strike="noStrike">
+              <a:rPr lang="en-AU" sz="4400" spc="-1" strike="noStrike">
                 <a:solidFill>
                   <a:srgbClr val="000000"/>
                 </a:solidFill>
+                <a:uFill>
+                  <a:solidFill>
+                    <a:srgbClr val="ffffff"/>
+                  </a:solidFill>
+                </a:uFill>
                 <a:latin typeface="Arial"/>
                 <a:ea typeface="DejaVu Sans"/>
               </a:rPr>
@@ -4807,7 +4982,7 @@
         <p:spPr>
           <a:xfrm>
             <a:off x="504000" y="1769040"/>
-            <a:ext cx="9070560" cy="4383360"/>
+            <a:ext cx="9070200" cy="4383000"/>
           </a:xfrm>
           <a:prstGeom prst="rect">
             <a:avLst/>
@@ -4830,10 +5005,15 @@
           </a:p>
           <a:p>
             <a:r>
-              <a:rPr i="1" lang="en-AU" sz="3200" strike="noStrike">
+              <a:rPr i="1" lang="en-AU" sz="3200" spc="-1" strike="noStrike">
                 <a:solidFill>
                   <a:srgbClr val="000000"/>
                 </a:solidFill>
+                <a:uFill>
+                  <a:solidFill>
+                    <a:srgbClr val="ffffff"/>
+                  </a:solidFill>
+                </a:uFill>
                 <a:latin typeface="Menlo"/>
                 <a:ea typeface="Menlo"/>
               </a:rPr>
@@ -4843,10 +5023,15 @@
           </a:p>
           <a:p>
             <a:r>
-              <a:rPr b="1" lang="en-AU" sz="3200" strike="noStrike">
+              <a:rPr b="1" lang="en-AU" sz="3200" spc="-1" strike="noStrike">
                 <a:solidFill>
                   <a:srgbClr val="000000"/>
                 </a:solidFill>
+                <a:uFill>
+                  <a:solidFill>
+                    <a:srgbClr val="ffffff"/>
+                  </a:solidFill>
+                </a:uFill>
                 <a:latin typeface="Menlo"/>
                 <a:ea typeface="Menlo"/>
               </a:rPr>
@@ -4856,10 +5041,15 @@
           </a:p>
           <a:p>
             <a:r>
-              <a:rPr i="1" lang="en-AU" sz="3200" strike="noStrike">
+              <a:rPr i="1" lang="en-AU" sz="3200" spc="-1" strike="noStrike">
                 <a:solidFill>
                   <a:srgbClr val="000000"/>
                 </a:solidFill>
+                <a:uFill>
+                  <a:solidFill>
+                    <a:srgbClr val="ffffff"/>
+                  </a:solidFill>
+                </a:uFill>
                 <a:latin typeface="Menlo"/>
                 <a:ea typeface="Menlo"/>
               </a:rPr>
@@ -4927,7 +5117,7 @@
         <p:spPr>
           <a:xfrm>
             <a:off x="504000" y="301320"/>
-            <a:ext cx="9070560" cy="1261080"/>
+            <a:ext cx="9070200" cy="1260720"/>
           </a:xfrm>
           <a:prstGeom prst="rect">
             <a:avLst/>
@@ -4947,10 +5137,15 @@
           <a:bodyPr lIns="0" rIns="0" tIns="0" bIns="0" anchor="ctr"/>
           <a:p>
             <a:r>
-              <a:rPr b="1" lang="en-AU" sz="4400" strike="noStrike">
+              <a:rPr b="1" lang="en-AU" sz="4400" spc="-1" strike="noStrike">
                 <a:solidFill>
                   <a:srgbClr val="000000"/>
                 </a:solidFill>
+                <a:uFill>
+                  <a:solidFill>
+                    <a:srgbClr val="ffffff"/>
+                  </a:solidFill>
+                </a:uFill>
                 <a:latin typeface="Arial"/>
                 <a:ea typeface="DejaVu Sans"/>
               </a:rPr>
@@ -4969,7 +5164,7 @@
         <p:spPr>
           <a:xfrm>
             <a:off x="504000" y="1563480"/>
-            <a:ext cx="9070560" cy="5476320"/>
+            <a:ext cx="9070200" cy="5475960"/>
           </a:xfrm>
           <a:prstGeom prst="rect">
             <a:avLst/>
@@ -4989,10 +5184,15 @@
           <a:bodyPr lIns="0" rIns="0" tIns="0" bIns="0"/>
           <a:p>
             <a:r>
-              <a:rPr lang="en-AU" sz="3200" strike="noStrike">
+              <a:rPr lang="en-AU" sz="3200" spc="-1" strike="noStrike">
                 <a:solidFill>
                   <a:srgbClr val="000000"/>
                 </a:solidFill>
+                <a:uFill>
+                  <a:solidFill>
+                    <a:srgbClr val="ffffff"/>
+                  </a:solidFill>
+                </a:uFill>
                 <a:latin typeface="Arial"/>
                 <a:ea typeface="DejaVu Sans"/>
               </a:rPr>
@@ -5002,10 +5202,15 @@
           </a:p>
           <a:p>
             <a:r>
-              <a:rPr lang="en-AU" sz="3200" strike="noStrike">
+              <a:rPr lang="en-AU" sz="3200" spc="-1" strike="noStrike">
                 <a:solidFill>
                   <a:srgbClr val="000000"/>
                 </a:solidFill>
+                <a:uFill>
+                  <a:solidFill>
+                    <a:srgbClr val="ffffff"/>
+                  </a:solidFill>
+                </a:uFill>
                 <a:latin typeface="Arial"/>
                 <a:ea typeface="DejaVu Sans"/>
               </a:rPr>
@@ -5015,10 +5220,15 @@
           </a:p>
           <a:p>
             <a:r>
-              <a:rPr lang="en-AU" sz="3200" strike="noStrike">
+              <a:rPr lang="en-AU" sz="3200" spc="-1" strike="noStrike">
                 <a:solidFill>
                   <a:srgbClr val="000000"/>
                 </a:solidFill>
+                <a:uFill>
+                  <a:solidFill>
+                    <a:srgbClr val="ffffff"/>
+                  </a:solidFill>
+                </a:uFill>
                 <a:latin typeface="Arial"/>
                 <a:ea typeface="DejaVu Sans"/>
               </a:rPr>
@@ -5027,7 +5237,7 @@
             <a:endParaRPr/>
           </a:p>
           <a:p>
-            <a:pPr>
+            <a:pPr marL="216000" indent="-216000">
               <a:lnSpc>
                 <a:spcPct val="100000"/>
               </a:lnSpc>
@@ -5035,20 +5245,30 @@
               <a:buAutoNum type="alphaUcParenR"/>
             </a:pPr>
             <a:r>
-              <a:rPr lang="en-AU" sz="3200" strike="noStrike">
+              <a:rPr lang="en-AU" sz="3200" spc="-1" strike="noStrike">
                 <a:solidFill>
                   <a:srgbClr val="000000"/>
                 </a:solidFill>
+                <a:uFill>
+                  <a:solidFill>
+                    <a:srgbClr val="ffffff"/>
+                  </a:solidFill>
+                </a:uFill>
                 <a:latin typeface="Arial"/>
                 <a:ea typeface="DejaVu Sans"/>
               </a:rPr>
               <a:t> </a:t>
             </a:r>
             <a:r>
-              <a:rPr lang="en-AU" sz="3200" strike="noStrike">
+              <a:rPr lang="en-AU" sz="3200" spc="-1" strike="noStrike">
                 <a:solidFill>
                   <a:srgbClr val="000000"/>
                 </a:solidFill>
+                <a:uFill>
+                  <a:solidFill>
+                    <a:srgbClr val="ffffff"/>
+                  </a:solidFill>
+                </a:uFill>
                 <a:latin typeface="Arial"/>
                 <a:ea typeface="DejaVu Sans"/>
               </a:rPr>
@@ -5057,7 +5277,7 @@
             <a:endParaRPr/>
           </a:p>
           <a:p>
-            <a:pPr>
+            <a:pPr marL="216000" indent="-216000">
               <a:lnSpc>
                 <a:spcPct val="100000"/>
               </a:lnSpc>
@@ -5065,20 +5285,30 @@
               <a:buAutoNum type="alphaUcParenR"/>
             </a:pPr>
             <a:r>
-              <a:rPr lang="en-AU" sz="3200" strike="noStrike">
+              <a:rPr lang="en-AU" sz="3200" spc="-1" strike="noStrike">
                 <a:solidFill>
                   <a:srgbClr val="000000"/>
                 </a:solidFill>
+                <a:uFill>
+                  <a:solidFill>
+                    <a:srgbClr val="ffffff"/>
+                  </a:solidFill>
+                </a:uFill>
                 <a:latin typeface="Arial"/>
                 <a:ea typeface="DejaVu Sans"/>
               </a:rPr>
               <a:t> </a:t>
             </a:r>
             <a:r>
-              <a:rPr lang="en-AU" sz="3200" strike="noStrike">
+              <a:rPr lang="en-AU" sz="3200" spc="-1" strike="noStrike">
                 <a:solidFill>
                   <a:srgbClr val="000000"/>
                 </a:solidFill>
+                <a:uFill>
+                  <a:solidFill>
+                    <a:srgbClr val="ffffff"/>
+                  </a:solidFill>
+                </a:uFill>
                 <a:latin typeface="Arial"/>
                 <a:ea typeface="DejaVu Sans"/>
               </a:rPr>
@@ -5087,7 +5317,7 @@
             <a:endParaRPr/>
           </a:p>
           <a:p>
-            <a:pPr>
+            <a:pPr marL="216000" indent="-216000">
               <a:lnSpc>
                 <a:spcPct val="100000"/>
               </a:lnSpc>
@@ -5095,20 +5325,30 @@
               <a:buAutoNum type="alphaUcParenR"/>
             </a:pPr>
             <a:r>
-              <a:rPr lang="en-AU" sz="3200" strike="noStrike">
+              <a:rPr lang="en-AU" sz="3200" spc="-1" strike="noStrike">
                 <a:solidFill>
                   <a:srgbClr val="000000"/>
                 </a:solidFill>
+                <a:uFill>
+                  <a:solidFill>
+                    <a:srgbClr val="ffffff"/>
+                  </a:solidFill>
+                </a:uFill>
                 <a:latin typeface="Arial"/>
                 <a:ea typeface="DejaVu Sans"/>
               </a:rPr>
               <a:t> </a:t>
             </a:r>
             <a:r>
-              <a:rPr lang="en-AU" sz="3200" strike="noStrike">
+              <a:rPr lang="en-AU" sz="3200" spc="-1" strike="noStrike">
                 <a:solidFill>
                   <a:srgbClr val="000000"/>
                 </a:solidFill>
+                <a:uFill>
+                  <a:solidFill>
+                    <a:srgbClr val="ffffff"/>
+                  </a:solidFill>
+                </a:uFill>
                 <a:latin typeface="Arial"/>
                 <a:ea typeface="DejaVu Sans"/>
               </a:rPr>
@@ -5117,7 +5357,7 @@
             <a:endParaRPr/>
           </a:p>
           <a:p>
-            <a:pPr>
+            <a:pPr marL="216000" indent="-216000">
               <a:lnSpc>
                 <a:spcPct val="100000"/>
               </a:lnSpc>
@@ -5125,20 +5365,30 @@
               <a:buAutoNum type="alphaUcParenR"/>
             </a:pPr>
             <a:r>
-              <a:rPr lang="en-AU" sz="3200" strike="noStrike">
+              <a:rPr lang="en-AU" sz="3200" spc="-1" strike="noStrike">
                 <a:solidFill>
                   <a:srgbClr val="000000"/>
                 </a:solidFill>
+                <a:uFill>
+                  <a:solidFill>
+                    <a:srgbClr val="ffffff"/>
+                  </a:solidFill>
+                </a:uFill>
                 <a:latin typeface="Arial"/>
                 <a:ea typeface="DejaVu Sans"/>
               </a:rPr>
               <a:t> </a:t>
             </a:r>
             <a:r>
-              <a:rPr lang="en-AU" sz="3200" strike="noStrike">
+              <a:rPr lang="en-AU" sz="3200" spc="-1" strike="noStrike">
                 <a:solidFill>
                   <a:srgbClr val="000000"/>
                 </a:solidFill>
+                <a:uFill>
+                  <a:solidFill>
+                    <a:srgbClr val="ffffff"/>
+                  </a:solidFill>
+                </a:uFill>
                 <a:latin typeface="Arial"/>
                 <a:ea typeface="DejaVu Sans"/>
               </a:rPr>
@@ -5147,7 +5397,7 @@
             <a:endParaRPr/>
           </a:p>
           <a:p>
-            <a:pPr>
+            <a:pPr marL="216000" indent="-216000">
               <a:lnSpc>
                 <a:spcPct val="100000"/>
               </a:lnSpc>
@@ -5155,20 +5405,30 @@
               <a:buAutoNum type="alphaUcParenR"/>
             </a:pPr>
             <a:r>
-              <a:rPr lang="en-AU" sz="3200" strike="noStrike">
+              <a:rPr lang="en-AU" sz="3200" spc="-1" strike="noStrike">
                 <a:solidFill>
                   <a:srgbClr val="000000"/>
                 </a:solidFill>
+                <a:uFill>
+                  <a:solidFill>
+                    <a:srgbClr val="ffffff"/>
+                  </a:solidFill>
+                </a:uFill>
                 <a:latin typeface="Arial"/>
                 <a:ea typeface="DejaVu Sans"/>
               </a:rPr>
               <a:t> </a:t>
             </a:r>
             <a:r>
-              <a:rPr lang="en-AU" sz="3200" strike="noStrike">
+              <a:rPr lang="en-AU" sz="3200" spc="-1" strike="noStrike">
                 <a:solidFill>
                   <a:srgbClr val="000000"/>
                 </a:solidFill>
+                <a:uFill>
+                  <a:solidFill>
+                    <a:srgbClr val="ffffff"/>
+                  </a:solidFill>
+                </a:uFill>
                 <a:latin typeface="Arial"/>
                 <a:ea typeface="DejaVu Sans"/>
               </a:rPr>
@@ -5183,10 +5443,15 @@
               </a:lnSpc>
             </a:pPr>
             <a:r>
-              <a:rPr b="1" lang="en-AU" sz="3600" strike="noStrike">
+              <a:rPr b="1" lang="en-AU" sz="3600" spc="-1" strike="noStrike">
                 <a:solidFill>
                   <a:srgbClr val="000000"/>
                 </a:solidFill>
+                <a:uFill>
+                  <a:solidFill>
+                    <a:srgbClr val="ffffff"/>
+                  </a:solidFill>
+                </a:uFill>
                 <a:latin typeface="Arial"/>
                 <a:ea typeface="DejaVu Sans"/>
               </a:rPr>
@@ -5254,7 +5519,7 @@
         <p:spPr>
           <a:xfrm>
             <a:off x="504000" y="301320"/>
-            <a:ext cx="9070560" cy="1261080"/>
+            <a:ext cx="9070200" cy="1260720"/>
           </a:xfrm>
           <a:prstGeom prst="rect">
             <a:avLst/>
@@ -5279,10 +5544,15 @@
               </a:lnSpc>
             </a:pPr>
             <a:r>
-              <a:rPr b="1" lang="en-AU" sz="4400" strike="noStrike">
+              <a:rPr b="1" lang="en-AU" sz="4400" spc="-1" strike="noStrike">
                 <a:solidFill>
                   <a:srgbClr val="000000"/>
                 </a:solidFill>
+                <a:uFill>
+                  <a:solidFill>
+                    <a:srgbClr val="ffffff"/>
+                  </a:solidFill>
+                </a:uFill>
                 <a:latin typeface="Arial"/>
                 <a:ea typeface="DejaVu Sans"/>
               </a:rPr>
@@ -5301,7 +5571,7 @@
         <p:spPr>
           <a:xfrm>
             <a:off x="504000" y="1769040"/>
-            <a:ext cx="9070560" cy="4383360"/>
+            <a:ext cx="9070200" cy="4383000"/>
           </a:xfrm>
           <a:prstGeom prst="rect">
             <a:avLst/>
@@ -5324,10 +5594,15 @@
           </a:p>
           <a:p>
             <a:r>
-              <a:rPr i="1" lang="en-AU" sz="2000" strike="noStrike">
+              <a:rPr i="1" lang="en-AU" sz="2000" spc="-1" strike="noStrike">
                 <a:solidFill>
                   <a:srgbClr val="808080"/>
                 </a:solidFill>
+                <a:uFill>
+                  <a:solidFill>
+                    <a:srgbClr val="ffffff"/>
+                  </a:solidFill>
+                </a:uFill>
                 <a:latin typeface="Menlo"/>
                 <a:ea typeface="Menlo"/>
               </a:rPr>
@@ -5337,10 +5612,15 @@
           </a:p>
           <a:p>
             <a:r>
-              <a:rPr i="1" lang="en-AU" sz="2000" strike="noStrike">
+              <a:rPr i="1" lang="en-AU" sz="2000" spc="-1" strike="noStrike">
                 <a:solidFill>
                   <a:srgbClr val="808080"/>
                 </a:solidFill>
+                <a:uFill>
+                  <a:solidFill>
+                    <a:srgbClr val="ffffff"/>
+                  </a:solidFill>
+                </a:uFill>
                 <a:latin typeface="Menlo"/>
                 <a:ea typeface="Menlo"/>
               </a:rPr>
@@ -5350,10 +5630,15 @@
           </a:p>
           <a:p>
             <a:r>
-              <a:rPr i="1" lang="en-AU" sz="2000" strike="noStrike">
+              <a:rPr i="1" lang="en-AU" sz="2000" spc="-1" strike="noStrike">
                 <a:solidFill>
                   <a:srgbClr val="808080"/>
                 </a:solidFill>
+                <a:uFill>
+                  <a:solidFill>
+                    <a:srgbClr val="ffffff"/>
+                  </a:solidFill>
+                </a:uFill>
                 <a:latin typeface="Menlo"/>
                 <a:ea typeface="Menlo"/>
               </a:rPr>
@@ -5363,10 +5648,15 @@
           </a:p>
           <a:p>
             <a:r>
-              <a:rPr i="1" lang="en-AU" sz="2000" strike="noStrike">
+              <a:rPr i="1" lang="en-AU" sz="2000" spc="-1" strike="noStrike">
                 <a:solidFill>
                   <a:srgbClr val="808080"/>
                 </a:solidFill>
+                <a:uFill>
+                  <a:solidFill>
+                    <a:srgbClr val="ffffff"/>
+                  </a:solidFill>
+                </a:uFill>
                 <a:latin typeface="Menlo"/>
                 <a:ea typeface="Menlo"/>
               </a:rPr>
@@ -5376,10 +5666,15 @@
           </a:p>
           <a:p>
             <a:r>
-              <a:rPr i="1" lang="en-AU" sz="2000" strike="noStrike">
+              <a:rPr i="1" lang="en-AU" sz="2000" spc="-1" strike="noStrike">
                 <a:solidFill>
                   <a:srgbClr val="808080"/>
                 </a:solidFill>
+                <a:uFill>
+                  <a:solidFill>
+                    <a:srgbClr val="ffffff"/>
+                  </a:solidFill>
+                </a:uFill>
                 <a:latin typeface="Menlo"/>
                 <a:ea typeface="Menlo"/>
               </a:rPr>
@@ -5389,10 +5684,15 @@
           </a:p>
           <a:p>
             <a:r>
-              <a:rPr i="1" lang="en-AU" sz="2000" strike="noStrike">
+              <a:rPr i="1" lang="en-AU" sz="2000" spc="-1" strike="noStrike">
                 <a:solidFill>
                   <a:srgbClr val="808080"/>
                 </a:solidFill>
+                <a:uFill>
+                  <a:solidFill>
+                    <a:srgbClr val="ffffff"/>
+                  </a:solidFill>
+                </a:uFill>
                 <a:latin typeface="Menlo"/>
                 <a:ea typeface="Menlo"/>
               </a:rPr>
@@ -5402,10 +5702,15 @@
           </a:p>
           <a:p>
             <a:r>
-              <a:rPr i="1" lang="en-AU" sz="2000" strike="noStrike">
+              <a:rPr i="1" lang="en-AU" sz="2000" spc="-1" strike="noStrike">
                 <a:solidFill>
                   <a:srgbClr val="808080"/>
                 </a:solidFill>
+                <a:uFill>
+                  <a:solidFill>
+                    <a:srgbClr val="ffffff"/>
+                  </a:solidFill>
+                </a:uFill>
                 <a:latin typeface="Menlo"/>
                 <a:ea typeface="Menlo"/>
               </a:rPr>
@@ -5415,10 +5720,15 @@
           </a:p>
           <a:p>
             <a:r>
-              <a:rPr i="1" lang="en-AU" sz="2000" strike="noStrike">
+              <a:rPr i="1" lang="en-AU" sz="2000" spc="-1" strike="noStrike">
                 <a:solidFill>
                   <a:srgbClr val="808080"/>
                 </a:solidFill>
+                <a:uFill>
+                  <a:solidFill>
+                    <a:srgbClr val="ffffff"/>
+                  </a:solidFill>
+                </a:uFill>
                 <a:latin typeface="Menlo"/>
                 <a:ea typeface="Menlo"/>
               </a:rPr>
@@ -5486,7 +5796,7 @@
         <p:spPr>
           <a:xfrm>
             <a:off x="504000" y="301320"/>
-            <a:ext cx="9070560" cy="1261080"/>
+            <a:ext cx="9070200" cy="1260720"/>
           </a:xfrm>
           <a:prstGeom prst="rect">
             <a:avLst/>
@@ -5511,10 +5821,15 @@
               </a:lnSpc>
             </a:pPr>
             <a:r>
-              <a:rPr b="1" lang="en-AU" sz="4400" strike="noStrike">
+              <a:rPr b="1" lang="en-AU" sz="4400" spc="-1" strike="noStrike">
                 <a:solidFill>
                   <a:srgbClr val="000000"/>
                 </a:solidFill>
+                <a:uFill>
+                  <a:solidFill>
+                    <a:srgbClr val="ffffff"/>
+                  </a:solidFill>
+                </a:uFill>
                 <a:latin typeface="Arial"/>
                 <a:ea typeface="DejaVu Sans"/>
               </a:rPr>
@@ -5533,7 +5848,7 @@
         <p:spPr>
           <a:xfrm>
             <a:off x="504000" y="1769040"/>
-            <a:ext cx="9070560" cy="4383360"/>
+            <a:ext cx="9070200" cy="4383000"/>
           </a:xfrm>
           <a:prstGeom prst="rect">
             <a:avLst/>
@@ -5553,50 +5868,75 @@
           <a:bodyPr lIns="0" rIns="0" tIns="0" bIns="0"/>
           <a:p>
             <a:r>
-              <a:rPr lang="en-AU" sz="3200" strike="noStrike">
+              <a:rPr lang="en-AU" sz="3200" spc="-1" strike="noStrike">
                 <a:solidFill>
                   <a:srgbClr val="000000"/>
                 </a:solidFill>
+                <a:uFill>
+                  <a:solidFill>
+                    <a:srgbClr val="ffffff"/>
+                  </a:solidFill>
+                </a:uFill>
                 <a:latin typeface="Arial"/>
                 <a:ea typeface="DejaVu Sans"/>
               </a:rPr>
               <a:t>chmod (</a:t>
             </a:r>
             <a:r>
-              <a:rPr b="1" lang="en-AU" sz="3200" strike="noStrike">
+              <a:rPr b="1" lang="en-AU" sz="3200" spc="-1" strike="noStrike">
                 <a:solidFill>
                   <a:srgbClr val="000000"/>
                 </a:solidFill>
+                <a:uFill>
+                  <a:solidFill>
+                    <a:srgbClr val="ffffff"/>
+                  </a:solidFill>
+                </a:uFill>
                 <a:latin typeface="Arial"/>
                 <a:ea typeface="DejaVu Sans"/>
               </a:rPr>
               <a:t>ch</a:t>
             </a:r>
             <a:r>
-              <a:rPr lang="en-AU" sz="3200" strike="noStrike">
+              <a:rPr lang="en-AU" sz="3200" spc="-1" strike="noStrike">
                 <a:solidFill>
                   <a:srgbClr val="000000"/>
                 </a:solidFill>
+                <a:uFill>
+                  <a:solidFill>
+                    <a:srgbClr val="ffffff"/>
+                  </a:solidFill>
+                </a:uFill>
                 <a:latin typeface="Arial"/>
                 <a:ea typeface="DejaVu Sans"/>
               </a:rPr>
               <a:t>ange file </a:t>
             </a:r>
             <a:r>
-              <a:rPr b="1" lang="en-AU" sz="3200" strike="noStrike">
+              <a:rPr b="1" lang="en-AU" sz="3200" spc="-1" strike="noStrike">
                 <a:solidFill>
                   <a:srgbClr val="000000"/>
                 </a:solidFill>
+                <a:uFill>
+                  <a:solidFill>
+                    <a:srgbClr val="ffffff"/>
+                  </a:solidFill>
+                </a:uFill>
                 <a:latin typeface="Arial"/>
                 <a:ea typeface="DejaVu Sans"/>
               </a:rPr>
               <a:t>mod</a:t>
             </a:r>
             <a:r>
-              <a:rPr lang="en-AU" sz="3200" strike="noStrike">
+              <a:rPr lang="en-AU" sz="3200" spc="-1" strike="noStrike">
                 <a:solidFill>
                   <a:srgbClr val="000000"/>
                 </a:solidFill>
+                <a:uFill>
+                  <a:solidFill>
+                    <a:srgbClr val="ffffff"/>
+                  </a:solidFill>
+                </a:uFill>
                 <a:latin typeface="Arial"/>
                 <a:ea typeface="DejaVu Sans"/>
               </a:rPr>
@@ -5609,10 +5949,15 @@
           </a:p>
           <a:p>
             <a:r>
-              <a:rPr lang="en-AU" sz="3200" strike="noStrike">
+              <a:rPr lang="en-AU" sz="3200" spc="-1" strike="noStrike">
                 <a:solidFill>
                   <a:srgbClr val="000000"/>
                 </a:solidFill>
+                <a:uFill>
+                  <a:solidFill>
+                    <a:srgbClr val="ffffff"/>
+                  </a:solidFill>
+                </a:uFill>
                 <a:latin typeface="Arial"/>
                 <a:ea typeface="DejaVu Sans"/>
               </a:rPr>
@@ -5622,10 +5967,15 @@
           </a:p>
           <a:p>
             <a:r>
-              <a:rPr i="1" lang="en-AU" sz="3200" strike="noStrike">
+              <a:rPr i="1" lang="en-AU" sz="3200" spc="-1" strike="noStrike">
                 <a:solidFill>
                   <a:srgbClr val="808080"/>
                 </a:solidFill>
+                <a:uFill>
+                  <a:solidFill>
+                    <a:srgbClr val="ffffff"/>
+                  </a:solidFill>
+                </a:uFill>
                 <a:latin typeface="Menlo"/>
                 <a:ea typeface="Menlo"/>
               </a:rPr>
@@ -5638,10 +5988,15 @@
           </a:p>
           <a:p>
             <a:r>
-              <a:rPr lang="en-AU" sz="3200" strike="noStrike">
+              <a:rPr lang="en-AU" sz="3200" spc="-1" strike="noStrike">
                 <a:solidFill>
                   <a:srgbClr val="000000"/>
                 </a:solidFill>
+                <a:uFill>
+                  <a:solidFill>
+                    <a:srgbClr val="ffffff"/>
+                  </a:solidFill>
+                </a:uFill>
                 <a:latin typeface="Arial"/>
                 <a:ea typeface="Menlo"/>
               </a:rPr>
@@ -5651,10 +6006,15 @@
           </a:p>
           <a:p>
             <a:r>
-              <a:rPr lang="en-AU" sz="3200" strike="noStrike">
+              <a:rPr lang="en-AU" sz="3200" spc="-1" strike="noStrike">
                 <a:solidFill>
                   <a:srgbClr val="808080"/>
                 </a:solidFill>
+                <a:uFill>
+                  <a:solidFill>
+                    <a:srgbClr val="ffffff"/>
+                  </a:solidFill>
+                </a:uFill>
                 <a:latin typeface="Menlo"/>
                 <a:ea typeface="Menlo"/>
               </a:rPr>
@@ -5725,7 +6085,7 @@
         <p:spPr>
           <a:xfrm>
             <a:off x="504000" y="301320"/>
-            <a:ext cx="9070560" cy="1261080"/>
+            <a:ext cx="9070200" cy="1260720"/>
           </a:xfrm>
           <a:prstGeom prst="rect">
             <a:avLst/>
@@ -5750,10 +6110,15 @@
               </a:lnSpc>
             </a:pPr>
             <a:r>
-              <a:rPr b="1" lang="en-AU" sz="4400" strike="noStrike">
+              <a:rPr b="1" lang="en-AU" sz="4400" spc="-1" strike="noStrike">
                 <a:solidFill>
                   <a:srgbClr val="000000"/>
                 </a:solidFill>
+                <a:uFill>
+                  <a:solidFill>
+                    <a:srgbClr val="ffffff"/>
+                  </a:solidFill>
+                </a:uFill>
                 <a:latin typeface="Arial"/>
                 <a:ea typeface="DejaVu Sans"/>
               </a:rPr>
@@ -5772,7 +6137,7 @@
         <p:spPr>
           <a:xfrm>
             <a:off x="504000" y="1769040"/>
-            <a:ext cx="9070560" cy="4383360"/>
+            <a:ext cx="9070200" cy="4383000"/>
           </a:xfrm>
           <a:prstGeom prst="rect">
             <a:avLst/>
@@ -5792,10 +6157,15 @@
           <a:bodyPr lIns="0" rIns="0" tIns="0" bIns="0"/>
           <a:p>
             <a:r>
-              <a:rPr i="1" lang="en-AU" sz="2000" strike="noStrike">
+              <a:rPr i="1" lang="en-AU" sz="2000" spc="-1" strike="noStrike">
                 <a:solidFill>
                   <a:srgbClr val="808080"/>
                 </a:solidFill>
+                <a:uFill>
+                  <a:solidFill>
+                    <a:srgbClr val="ffffff"/>
+                  </a:solidFill>
+                </a:uFill>
                 <a:latin typeface="Menlo"/>
                 <a:ea typeface="Menlo"/>
               </a:rPr>
@@ -5808,20 +6178,30 @@
           </a:p>
           <a:p>
             <a:r>
-              <a:rPr i="1" lang="en-AU" sz="2000" strike="noStrike">
+              <a:rPr i="1" lang="en-AU" sz="2000" spc="-1" strike="noStrike">
                 <a:solidFill>
                   <a:srgbClr val="808080"/>
                 </a:solidFill>
+                <a:uFill>
+                  <a:solidFill>
+                    <a:srgbClr val="ffffff"/>
+                  </a:solidFill>
+                </a:uFill>
                 <a:latin typeface="Menlo"/>
                 <a:ea typeface="Menlo"/>
               </a:rPr>
               <a:t> </a:t>
             </a:r>
             <a:r>
-              <a:rPr i="1" lang="en-AU" sz="2000" strike="noStrike">
+              <a:rPr i="1" lang="en-AU" sz="2000" spc="-1" strike="noStrike">
                 <a:solidFill>
                   <a:srgbClr val="808080"/>
                 </a:solidFill>
+                <a:uFill>
+                  <a:solidFill>
+                    <a:srgbClr val="ffffff"/>
+                  </a:solidFill>
+                </a:uFill>
                 <a:latin typeface="Menlo"/>
                 <a:ea typeface="Menlo"/>
               </a:rPr>
@@ -5831,10 +6211,15 @@
           </a:p>
           <a:p>
             <a:r>
-              <a:rPr i="1" lang="en-AU" sz="2000" strike="noStrike">
+              <a:rPr i="1" lang="en-AU" sz="2000" spc="-1" strike="noStrike">
                 <a:solidFill>
                   <a:srgbClr val="808080"/>
                 </a:solidFill>
+                <a:uFill>
+                  <a:solidFill>
+                    <a:srgbClr val="ffffff"/>
+                  </a:solidFill>
+                </a:uFill>
                 <a:latin typeface="Menlo"/>
                 <a:ea typeface="Menlo"/>
               </a:rPr>
@@ -5844,10 +6229,15 @@
           </a:p>
           <a:p>
             <a:r>
-              <a:rPr i="1" lang="en-AU" sz="2000" strike="noStrike">
+              <a:rPr i="1" lang="en-AU" sz="2000" spc="-1" strike="noStrike">
                 <a:solidFill>
                   <a:srgbClr val="808080"/>
                 </a:solidFill>
+                <a:uFill>
+                  <a:solidFill>
+                    <a:srgbClr val="ffffff"/>
+                  </a:solidFill>
+                </a:uFill>
                 <a:latin typeface="Menlo"/>
                 <a:ea typeface="Menlo"/>
               </a:rPr>
@@ -5915,7 +6305,7 @@
         <p:spPr>
           <a:xfrm>
             <a:off x="504000" y="301320"/>
-            <a:ext cx="9070560" cy="1261080"/>
+            <a:ext cx="9070200" cy="1260720"/>
           </a:xfrm>
           <a:prstGeom prst="rect">
             <a:avLst/>
@@ -5940,10 +6330,15 @@
               </a:lnSpc>
             </a:pPr>
             <a:r>
-              <a:rPr b="1" lang="en-AU" sz="4400" strike="noStrike">
+              <a:rPr b="1" lang="en-AU" sz="4400" spc="-1" strike="noStrike">
                 <a:solidFill>
                   <a:srgbClr val="000000"/>
                 </a:solidFill>
+                <a:uFill>
+                  <a:solidFill>
+                    <a:srgbClr val="ffffff"/>
+                  </a:solidFill>
+                </a:uFill>
                 <a:latin typeface="Arial"/>
                 <a:ea typeface="DejaVu Sans"/>
               </a:rPr>
@@ -5962,7 +6357,7 @@
         <p:spPr>
           <a:xfrm>
             <a:off x="504000" y="1769040"/>
-            <a:ext cx="9070560" cy="4383360"/>
+            <a:ext cx="9070200" cy="4383000"/>
           </a:xfrm>
           <a:prstGeom prst="rect">
             <a:avLst/>
@@ -5982,10 +6377,15 @@
           <a:bodyPr lIns="0" rIns="0" tIns="0" bIns="0"/>
           <a:p>
             <a:r>
-              <a:rPr lang="en-AU" sz="3200" strike="noStrike">
+              <a:rPr lang="en-AU" sz="3200" spc="-1" strike="noStrike">
                 <a:solidFill>
                   <a:srgbClr val="000000"/>
                 </a:solidFill>
+                <a:uFill>
+                  <a:solidFill>
+                    <a:srgbClr val="ffffff"/>
+                  </a:solidFill>
+                </a:uFill>
                 <a:latin typeface="Menlo"/>
                 <a:ea typeface="DejaVu Sans"/>
               </a:rPr>
@@ -5995,10 +6395,15 @@
           </a:p>
           <a:p>
             <a:r>
-              <a:rPr i="1" lang="en-AU" strike="noStrike">
+              <a:rPr i="1" lang="en-AU" sz="1800" spc="-1" strike="noStrike">
                 <a:solidFill>
                   <a:srgbClr val="808080"/>
                 </a:solidFill>
+                <a:uFill>
+                  <a:solidFill>
+                    <a:srgbClr val="ffffff"/>
+                  </a:solidFill>
+                </a:uFill>
                 <a:latin typeface="Menlo"/>
                 <a:ea typeface="Menlo"/>
               </a:rPr>
@@ -6008,10 +6413,15 @@
           </a:p>
           <a:p>
             <a:r>
-              <a:rPr i="1" lang="en-AU" strike="noStrike">
+              <a:rPr i="1" lang="en-AU" sz="1800" spc="-1" strike="noStrike">
                 <a:solidFill>
                   <a:srgbClr val="808080"/>
                 </a:solidFill>
+                <a:uFill>
+                  <a:solidFill>
+                    <a:srgbClr val="ffffff"/>
+                  </a:solidFill>
+                </a:uFill>
                 <a:latin typeface="Menlo"/>
                 <a:ea typeface="Menlo"/>
               </a:rPr>
@@ -6021,10 +6431,15 @@
           </a:p>
           <a:p>
             <a:r>
-              <a:rPr i="1" lang="en-AU" strike="noStrike">
+              <a:rPr i="1" lang="en-AU" sz="1800" spc="-1" strike="noStrike">
                 <a:solidFill>
                   <a:srgbClr val="808080"/>
                 </a:solidFill>
+                <a:uFill>
+                  <a:solidFill>
+                    <a:srgbClr val="ffffff"/>
+                  </a:solidFill>
+                </a:uFill>
                 <a:latin typeface="Menlo"/>
                 <a:ea typeface="Menlo"/>
               </a:rPr>
@@ -6034,10 +6449,15 @@
           </a:p>
           <a:p>
             <a:r>
-              <a:rPr i="1" lang="en-AU" strike="noStrike">
+              <a:rPr i="1" lang="en-AU" sz="1800" spc="-1" strike="noStrike">
                 <a:solidFill>
                   <a:srgbClr val="808080"/>
                 </a:solidFill>
+                <a:uFill>
+                  <a:solidFill>
+                    <a:srgbClr val="ffffff"/>
+                  </a:solidFill>
+                </a:uFill>
                 <a:latin typeface="Menlo"/>
                 <a:ea typeface="Menlo"/>
               </a:rPr>
@@ -6108,7 +6528,7 @@
         <p:spPr>
           <a:xfrm>
             <a:off x="504000" y="301320"/>
-            <a:ext cx="9070560" cy="1261080"/>
+            <a:ext cx="9070200" cy="1260720"/>
           </a:xfrm>
           <a:prstGeom prst="rect">
             <a:avLst/>
@@ -6133,20 +6553,30 @@
               </a:lnSpc>
             </a:pPr>
             <a:r>
-              <a:rPr b="1" lang="en-AU" sz="4400" strike="noStrike">
+              <a:rPr b="1" lang="en-AU" sz="4400" spc="-1" strike="noStrike">
                 <a:solidFill>
                   <a:srgbClr val="000000"/>
                 </a:solidFill>
+                <a:uFill>
+                  <a:solidFill>
+                    <a:srgbClr val="ffffff"/>
+                  </a:solidFill>
+                </a:uFill>
                 <a:latin typeface="Arial"/>
                 <a:ea typeface="DejaVu Sans"/>
               </a:rPr>
               <a:t>sudo</a:t>
             </a:r>
             <a:r>
-              <a:rPr lang="en-AU" sz="4400" strike="noStrike">
+              <a:rPr lang="en-AU" sz="4400" spc="-1" strike="noStrike">
                 <a:solidFill>
                   <a:srgbClr val="000000"/>
                 </a:solidFill>
+                <a:uFill>
+                  <a:solidFill>
+                    <a:srgbClr val="ffffff"/>
+                  </a:solidFill>
+                </a:uFill>
                 <a:latin typeface="Arial"/>
                 <a:ea typeface="DejaVu Sans"/>
               </a:rPr>
@@ -6165,7 +6595,7 @@
         <p:spPr>
           <a:xfrm>
             <a:off x="504000" y="1805040"/>
-            <a:ext cx="9070560" cy="4383360"/>
+            <a:ext cx="9070200" cy="4383000"/>
           </a:xfrm>
           <a:prstGeom prst="rect">
             <a:avLst/>
@@ -6185,80 +6615,120 @@
           <a:bodyPr lIns="0" rIns="0" tIns="0" bIns="0"/>
           <a:p>
             <a:r>
-              <a:rPr lang="en-AU" sz="3200" strike="noStrike">
+              <a:rPr lang="en-AU" sz="3200" spc="-1" strike="noStrike">
                 <a:solidFill>
                   <a:srgbClr val="000000"/>
                 </a:solidFill>
+                <a:uFill>
+                  <a:solidFill>
+                    <a:srgbClr val="ffffff"/>
+                  </a:solidFill>
+                </a:uFill>
                 <a:latin typeface="Menlo"/>
                 <a:ea typeface="DejaVu Sans"/>
               </a:rPr>
               <a:t>sudo</a:t>
             </a:r>
             <a:r>
-              <a:rPr lang="en-AU" sz="3200" strike="noStrike">
+              <a:rPr lang="en-AU" sz="3200" spc="-1" strike="noStrike">
                 <a:solidFill>
                   <a:srgbClr val="000000"/>
                 </a:solidFill>
+                <a:uFill>
+                  <a:solidFill>
+                    <a:srgbClr val="ffffff"/>
+                  </a:solidFill>
+                </a:uFill>
                 <a:latin typeface="Arial"/>
                 <a:ea typeface="DejaVu Sans"/>
               </a:rPr>
               <a:t> (</a:t>
             </a:r>
             <a:r>
-              <a:rPr b="1" lang="en-AU" sz="3200" strike="noStrike">
+              <a:rPr b="1" lang="en-AU" sz="3200" spc="-1" strike="noStrike">
                 <a:solidFill>
                   <a:srgbClr val="000000"/>
                 </a:solidFill>
+                <a:uFill>
+                  <a:solidFill>
+                    <a:srgbClr val="ffffff"/>
+                  </a:solidFill>
+                </a:uFill>
                 <a:latin typeface="Arial"/>
                 <a:ea typeface="DejaVu Sans"/>
               </a:rPr>
               <a:t>s</a:t>
             </a:r>
             <a:r>
-              <a:rPr lang="en-AU" sz="3200" strike="noStrike">
+              <a:rPr lang="en-AU" sz="3200" spc="-1" strike="noStrike">
                 <a:solidFill>
                   <a:srgbClr val="000000"/>
                 </a:solidFill>
+                <a:uFill>
+                  <a:solidFill>
+                    <a:srgbClr val="ffffff"/>
+                  </a:solidFill>
+                </a:uFill>
                 <a:latin typeface="Arial"/>
                 <a:ea typeface="DejaVu Sans"/>
               </a:rPr>
               <a:t>uper </a:t>
             </a:r>
             <a:r>
-              <a:rPr b="1" lang="en-AU" sz="3200" strike="noStrike">
+              <a:rPr b="1" lang="en-AU" sz="3200" spc="-1" strike="noStrike">
                 <a:solidFill>
                   <a:srgbClr val="000000"/>
                 </a:solidFill>
+                <a:uFill>
+                  <a:solidFill>
+                    <a:srgbClr val="ffffff"/>
+                  </a:solidFill>
+                </a:uFill>
                 <a:latin typeface="Arial"/>
                 <a:ea typeface="DejaVu Sans"/>
               </a:rPr>
               <a:t>u</a:t>
             </a:r>
             <a:r>
-              <a:rPr lang="en-AU" sz="3200" strike="noStrike">
+              <a:rPr lang="en-AU" sz="3200" spc="-1" strike="noStrike">
                 <a:solidFill>
                   <a:srgbClr val="000000"/>
                 </a:solidFill>
+                <a:uFill>
+                  <a:solidFill>
+                    <a:srgbClr val="ffffff"/>
+                  </a:solidFill>
+                </a:uFill>
                 <a:latin typeface="Arial"/>
                 <a:ea typeface="DejaVu Sans"/>
               </a:rPr>
               <a:t>ser </a:t>
             </a:r>
             <a:r>
-              <a:rPr b="1" lang="en-AU" sz="3200" strike="noStrike">
+              <a:rPr b="1" lang="en-AU" sz="3200" spc="-1" strike="noStrike">
                 <a:solidFill>
                   <a:srgbClr val="000000"/>
                 </a:solidFill>
+                <a:uFill>
+                  <a:solidFill>
+                    <a:srgbClr val="ffffff"/>
+                  </a:solidFill>
+                </a:uFill>
                 <a:latin typeface="Arial"/>
                 <a:ea typeface="DejaVu Sans"/>
               </a:rPr>
               <a:t>do</a:t>
             </a:r>
             <a:r>
-              <a:rPr lang="en-AU" sz="3200" strike="noStrike">
+              <a:rPr lang="en-AU" sz="3200" spc="-1" strike="noStrike">
                 <a:solidFill>
                   <a:srgbClr val="000000"/>
                 </a:solidFill>
+                <a:uFill>
+                  <a:solidFill>
+                    <a:srgbClr val="ffffff"/>
+                  </a:solidFill>
+                </a:uFill>
                 <a:latin typeface="Arial"/>
                 <a:ea typeface="DejaVu Sans"/>
               </a:rPr>
@@ -6268,10 +6738,15 @@
           </a:p>
           <a:p>
             <a:r>
-              <a:rPr lang="en-AU" sz="3200" strike="noStrike">
+              <a:rPr lang="en-AU" sz="3200" spc="-1" strike="noStrike">
                 <a:solidFill>
                   <a:srgbClr val="000000"/>
                 </a:solidFill>
+                <a:uFill>
+                  <a:solidFill>
+                    <a:srgbClr val="ffffff"/>
+                  </a:solidFill>
+                </a:uFill>
                 <a:latin typeface="Arial"/>
                 <a:ea typeface="DejaVu Sans"/>
               </a:rPr>
@@ -6281,10 +6756,15 @@
           </a:p>
           <a:p>
             <a:r>
-              <a:rPr i="1" lang="en-AU" sz="3200" strike="noStrike">
+              <a:rPr i="1" lang="en-AU" sz="3200" spc="-1" strike="noStrike">
                 <a:solidFill>
                   <a:srgbClr val="808080"/>
                 </a:solidFill>
+                <a:uFill>
+                  <a:solidFill>
+                    <a:srgbClr val="ffffff"/>
+                  </a:solidFill>
+                </a:uFill>
                 <a:latin typeface="Menlo"/>
                 <a:ea typeface="Menlo"/>
               </a:rPr>
@@ -6294,10 +6774,15 @@
           </a:p>
           <a:p>
             <a:r>
-              <a:rPr i="1" lang="en-AU" sz="3200" strike="noStrike">
+              <a:rPr i="1" lang="en-AU" sz="3200" spc="-1" strike="noStrike">
                 <a:solidFill>
                   <a:srgbClr val="808080"/>
                 </a:solidFill>
+                <a:uFill>
+                  <a:solidFill>
+                    <a:srgbClr val="ffffff"/>
+                  </a:solidFill>
+                </a:uFill>
                 <a:latin typeface="Menlo"/>
                 <a:ea typeface="Menlo"/>
               </a:rPr>
@@ -6368,7 +6853,7 @@
         <p:spPr>
           <a:xfrm>
             <a:off x="504000" y="301320"/>
-            <a:ext cx="9070560" cy="1261080"/>
+            <a:ext cx="9070200" cy="1260720"/>
           </a:xfrm>
           <a:prstGeom prst="rect">
             <a:avLst/>
@@ -6388,10 +6873,15 @@
           <a:bodyPr lIns="0" rIns="0" tIns="0" bIns="0" anchor="ctr"/>
           <a:p>
             <a:r>
-              <a:rPr b="1" lang="en-AU" sz="4400" strike="noStrike">
+              <a:rPr b="1" lang="en-AU" sz="4400" spc="-1" strike="noStrike">
                 <a:solidFill>
                   <a:srgbClr val="000000"/>
                 </a:solidFill>
+                <a:uFill>
+                  <a:solidFill>
+                    <a:srgbClr val="ffffff"/>
+                  </a:solidFill>
+                </a:uFill>
                 <a:latin typeface="Arial"/>
                 <a:ea typeface="DejaVu Sans"/>
               </a:rPr>
@@ -6410,7 +6900,7 @@
         <p:spPr>
           <a:xfrm>
             <a:off x="504000" y="1563480"/>
-            <a:ext cx="9070560" cy="5476320"/>
+            <a:ext cx="9070200" cy="5475960"/>
           </a:xfrm>
           <a:prstGeom prst="rect">
             <a:avLst/>
@@ -6430,10 +6920,15 @@
           <a:bodyPr lIns="0" rIns="0" tIns="0" bIns="0"/>
           <a:p>
             <a:r>
-              <a:rPr lang="en-AU" sz="3200" strike="noStrike">
+              <a:rPr lang="en-AU" sz="3200" spc="-1" strike="noStrike">
                 <a:solidFill>
                   <a:srgbClr val="000000"/>
                 </a:solidFill>
+                <a:uFill>
+                  <a:solidFill>
+                    <a:srgbClr val="ffffff"/>
+                  </a:solidFill>
+                </a:uFill>
                 <a:latin typeface="Arial"/>
                 <a:ea typeface="DejaVu Sans"/>
               </a:rPr>
@@ -6442,7 +6937,7 @@
             <a:endParaRPr/>
           </a:p>
           <a:p>
-            <a:pPr>
+            <a:pPr marL="216000" indent="-216000">
               <a:lnSpc>
                 <a:spcPct val="100000"/>
               </a:lnSpc>
@@ -6450,20 +6945,30 @@
               <a:buAutoNum type="alphaUcParenR"/>
             </a:pPr>
             <a:r>
-              <a:rPr lang="en-AU" sz="3200" strike="noStrike">
+              <a:rPr lang="en-AU" sz="3200" spc="-1" strike="noStrike">
                 <a:solidFill>
                   <a:srgbClr val="000000"/>
                 </a:solidFill>
+                <a:uFill>
+                  <a:solidFill>
+                    <a:srgbClr val="ffffff"/>
+                  </a:solidFill>
+                </a:uFill>
                 <a:latin typeface="Arial"/>
                 <a:ea typeface="DejaVu Sans"/>
               </a:rPr>
               <a:t> </a:t>
             </a:r>
             <a:r>
-              <a:rPr lang="en-AU" sz="3200" strike="noStrike">
+              <a:rPr lang="en-AU" sz="3200" spc="-1" strike="noStrike">
                 <a:solidFill>
                   <a:srgbClr val="000000"/>
                 </a:solidFill>
+                <a:uFill>
+                  <a:solidFill>
+                    <a:srgbClr val="ffffff"/>
+                  </a:solidFill>
+                </a:uFill>
                 <a:latin typeface="Arial"/>
                 <a:ea typeface="DejaVu Sans"/>
               </a:rPr>
@@ -6472,7 +6977,7 @@
             <a:endParaRPr/>
           </a:p>
           <a:p>
-            <a:pPr>
+            <a:pPr marL="216000" indent="-216000">
               <a:lnSpc>
                 <a:spcPct val="100000"/>
               </a:lnSpc>
@@ -6480,20 +6985,30 @@
               <a:buAutoNum type="alphaUcParenR"/>
             </a:pPr>
             <a:r>
-              <a:rPr lang="en-AU" sz="3200" strike="noStrike">
+              <a:rPr lang="en-AU" sz="3200" spc="-1" strike="noStrike">
                 <a:solidFill>
                   <a:srgbClr val="000000"/>
                 </a:solidFill>
+                <a:uFill>
+                  <a:solidFill>
+                    <a:srgbClr val="ffffff"/>
+                  </a:solidFill>
+                </a:uFill>
                 <a:latin typeface="Arial"/>
                 <a:ea typeface="DejaVu Sans"/>
               </a:rPr>
               <a:t> </a:t>
             </a:r>
             <a:r>
-              <a:rPr lang="en-AU" sz="3200" strike="noStrike">
+              <a:rPr lang="en-AU" sz="3200" spc="-1" strike="noStrike">
                 <a:solidFill>
                   <a:srgbClr val="000000"/>
                 </a:solidFill>
+                <a:uFill>
+                  <a:solidFill>
+                    <a:srgbClr val="ffffff"/>
+                  </a:solidFill>
+                </a:uFill>
                 <a:latin typeface="Arial"/>
                 <a:ea typeface="DejaVu Sans"/>
               </a:rPr>
@@ -6502,7 +7017,7 @@
             <a:endParaRPr/>
           </a:p>
           <a:p>
-            <a:pPr>
+            <a:pPr marL="216000" indent="-216000">
               <a:lnSpc>
                 <a:spcPct val="100000"/>
               </a:lnSpc>
@@ -6510,20 +7025,30 @@
               <a:buAutoNum type="alphaUcParenR"/>
             </a:pPr>
             <a:r>
-              <a:rPr lang="en-AU" sz="3200" strike="noStrike">
+              <a:rPr lang="en-AU" sz="3200" spc="-1" strike="noStrike">
                 <a:solidFill>
                   <a:srgbClr val="000000"/>
                 </a:solidFill>
+                <a:uFill>
+                  <a:solidFill>
+                    <a:srgbClr val="ffffff"/>
+                  </a:solidFill>
+                </a:uFill>
                 <a:latin typeface="Arial"/>
                 <a:ea typeface="DejaVu Sans"/>
               </a:rPr>
               <a:t> </a:t>
             </a:r>
             <a:r>
-              <a:rPr lang="en-AU" sz="3200" strike="noStrike">
+              <a:rPr lang="en-AU" sz="3200" spc="-1" strike="noStrike">
                 <a:solidFill>
                   <a:srgbClr val="000000"/>
                 </a:solidFill>
+                <a:uFill>
+                  <a:solidFill>
+                    <a:srgbClr val="ffffff"/>
+                  </a:solidFill>
+                </a:uFill>
                 <a:latin typeface="Arial"/>
                 <a:ea typeface="DejaVu Sans"/>
               </a:rPr>
@@ -6538,20 +7063,30 @@
               </a:lnSpc>
             </a:pPr>
             <a:r>
-              <a:rPr lang="en-AU" sz="3200" strike="noStrike">
+              <a:rPr lang="en-AU" sz="3200" spc="-1" strike="noStrike">
                 <a:solidFill>
                   <a:srgbClr val="000000"/>
                 </a:solidFill>
+                <a:uFill>
+                  <a:solidFill>
+                    <a:srgbClr val="ffffff"/>
+                  </a:solidFill>
+                </a:uFill>
                 <a:latin typeface="Arial"/>
                 <a:ea typeface="DejaVu Sans"/>
               </a:rPr>
               <a:t> </a:t>
             </a:r>
             <a:r>
-              <a:rPr b="1" lang="en-AU" sz="3600" strike="noStrike">
+              <a:rPr b="1" lang="en-AU" sz="3600" spc="-1" strike="noStrike">
                 <a:solidFill>
                   <a:srgbClr val="000000"/>
                 </a:solidFill>
+                <a:uFill>
+                  <a:solidFill>
+                    <a:srgbClr val="ffffff"/>
+                  </a:solidFill>
+                </a:uFill>
                 <a:latin typeface="Arial"/>
                 <a:ea typeface="DejaVu Sans"/>
               </a:rPr>

</xml_diff>